<commit_message>
Newest presentation from 2013-07-03.
git-svn-id: svn://mmix.cs.hm.edu@38 bd757dd8-b88b-4aad-9aa6-ce29af76ea0b
</commit_message>
<xml_diff>
--- a/util/trunk/mmixedit/doc/MMIXEdit.pptx
+++ b/util/trunk/mmixedit/doc/MMIXEdit.pptx
@@ -7,6 +7,31 @@
   <p:sldIdLst>
     <p:sldId id="256" r:id="rId2"/>
     <p:sldId id="257" r:id="rId3"/>
+    <p:sldId id="258" r:id="rId4"/>
+    <p:sldId id="259" r:id="rId5"/>
+    <p:sldId id="260" r:id="rId6"/>
+    <p:sldId id="261" r:id="rId7"/>
+    <p:sldId id="262" r:id="rId8"/>
+    <p:sldId id="263" r:id="rId9"/>
+    <p:sldId id="264" r:id="rId10"/>
+    <p:sldId id="265" r:id="rId11"/>
+    <p:sldId id="266" r:id="rId12"/>
+    <p:sldId id="267" r:id="rId13"/>
+    <p:sldId id="268" r:id="rId14"/>
+    <p:sldId id="269" r:id="rId15"/>
+    <p:sldId id="270" r:id="rId16"/>
+    <p:sldId id="271" r:id="rId17"/>
+    <p:sldId id="272" r:id="rId18"/>
+    <p:sldId id="273" r:id="rId19"/>
+    <p:sldId id="274" r:id="rId20"/>
+    <p:sldId id="275" r:id="rId21"/>
+    <p:sldId id="276" r:id="rId22"/>
+    <p:sldId id="277" r:id="rId23"/>
+    <p:sldId id="278" r:id="rId24"/>
+    <p:sldId id="279" r:id="rId25"/>
+    <p:sldId id="280" r:id="rId26"/>
+    <p:sldId id="281" r:id="rId27"/>
+    <p:sldId id="282" r:id="rId28"/>
   </p:sldIdLst>
   <p:sldSz cx="9144000" cy="6858000" type="screen4x3"/>
   <p:notesSz cx="6858000" cy="9144000"/>
@@ -289,7 +314,7 @@
           <a:p>
             <a:fld id="{1BA50D42-C9CD-4801-B293-61D1F53EC57E}" type="datetimeFigureOut">
               <a:rPr lang="de-DE" smtClean="0"/>
-              <a:t>25.06.2013</a:t>
+              <a:t>02.07.2013</a:t>
             </a:fld>
             <a:endParaRPr lang="de-DE"/>
           </a:p>
@@ -454,7 +479,7 @@
           <a:p>
             <a:fld id="{1BA50D42-C9CD-4801-B293-61D1F53EC57E}" type="datetimeFigureOut">
               <a:rPr lang="de-DE" smtClean="0"/>
-              <a:t>25.06.2013</a:t>
+              <a:t>02.07.2013</a:t>
             </a:fld>
             <a:endParaRPr lang="de-DE"/>
           </a:p>
@@ -629,7 +654,7 @@
           <a:p>
             <a:fld id="{1BA50D42-C9CD-4801-B293-61D1F53EC57E}" type="datetimeFigureOut">
               <a:rPr lang="de-DE" smtClean="0"/>
-              <a:t>25.06.2013</a:t>
+              <a:t>02.07.2013</a:t>
             </a:fld>
             <a:endParaRPr lang="de-DE"/>
           </a:p>
@@ -794,7 +819,7 @@
           <a:p>
             <a:fld id="{1BA50D42-C9CD-4801-B293-61D1F53EC57E}" type="datetimeFigureOut">
               <a:rPr lang="de-DE" smtClean="0"/>
-              <a:t>25.06.2013</a:t>
+              <a:t>02.07.2013</a:t>
             </a:fld>
             <a:endParaRPr lang="de-DE"/>
           </a:p>
@@ -1035,7 +1060,7 @@
           <a:p>
             <a:fld id="{1BA50D42-C9CD-4801-B293-61D1F53EC57E}" type="datetimeFigureOut">
               <a:rPr lang="de-DE" smtClean="0"/>
-              <a:t>25.06.2013</a:t>
+              <a:t>02.07.2013</a:t>
             </a:fld>
             <a:endParaRPr lang="de-DE"/>
           </a:p>
@@ -1318,7 +1343,7 @@
           <a:p>
             <a:fld id="{1BA50D42-C9CD-4801-B293-61D1F53EC57E}" type="datetimeFigureOut">
               <a:rPr lang="de-DE" smtClean="0"/>
-              <a:t>25.06.2013</a:t>
+              <a:t>02.07.2013</a:t>
             </a:fld>
             <a:endParaRPr lang="de-DE"/>
           </a:p>
@@ -1735,7 +1760,7 @@
           <a:p>
             <a:fld id="{1BA50D42-C9CD-4801-B293-61D1F53EC57E}" type="datetimeFigureOut">
               <a:rPr lang="de-DE" smtClean="0"/>
-              <a:t>25.06.2013</a:t>
+              <a:t>02.07.2013</a:t>
             </a:fld>
             <a:endParaRPr lang="de-DE"/>
           </a:p>
@@ -1848,7 +1873,7 @@
           <a:p>
             <a:fld id="{1BA50D42-C9CD-4801-B293-61D1F53EC57E}" type="datetimeFigureOut">
               <a:rPr lang="de-DE" smtClean="0"/>
-              <a:t>25.06.2013</a:t>
+              <a:t>02.07.2013</a:t>
             </a:fld>
             <a:endParaRPr lang="de-DE"/>
           </a:p>
@@ -1938,7 +1963,7 @@
           <a:p>
             <a:fld id="{1BA50D42-C9CD-4801-B293-61D1F53EC57E}" type="datetimeFigureOut">
               <a:rPr lang="de-DE" smtClean="0"/>
-              <a:t>25.06.2013</a:t>
+              <a:t>02.07.2013</a:t>
             </a:fld>
             <a:endParaRPr lang="de-DE"/>
           </a:p>
@@ -2210,7 +2235,7 @@
           <a:p>
             <a:fld id="{1BA50D42-C9CD-4801-B293-61D1F53EC57E}" type="datetimeFigureOut">
               <a:rPr lang="de-DE" smtClean="0"/>
-              <a:t>25.06.2013</a:t>
+              <a:t>02.07.2013</a:t>
             </a:fld>
             <a:endParaRPr lang="de-DE"/>
           </a:p>
@@ -2458,7 +2483,7 @@
           <a:p>
             <a:fld id="{1BA50D42-C9CD-4801-B293-61D1F53EC57E}" type="datetimeFigureOut">
               <a:rPr lang="de-DE" smtClean="0"/>
-              <a:t>25.06.2013</a:t>
+              <a:t>02.07.2013</a:t>
             </a:fld>
             <a:endParaRPr lang="de-DE"/>
           </a:p>
@@ -2666,7 +2691,7 @@
           <a:p>
             <a:fld id="{1BA50D42-C9CD-4801-B293-61D1F53EC57E}" type="datetimeFigureOut">
               <a:rPr lang="de-DE" smtClean="0"/>
-              <a:t>25.06.2013</a:t>
+              <a:t>02.07.2013</a:t>
             </a:fld>
             <a:endParaRPr lang="de-DE"/>
           </a:p>
@@ -3046,16 +3071,54 @@
             <p:ph type="ctrTitle"/>
           </p:nvPr>
         </p:nvSpPr>
-        <p:spPr/>
-        <p:txBody>
-          <a:bodyPr/>
-          <a:lstStyle/>
-          <a:p>
-            <a:r>
-              <a:rPr lang="de-DE" dirty="0" smtClean="0"/>
+        <p:spPr>
+          <a:xfrm>
+            <a:off x="685800" y="44624"/>
+            <a:ext cx="7772400" cy="6754726"/>
+          </a:xfrm>
+        </p:spPr>
+        <p:txBody>
+          <a:bodyPr>
+            <a:normAutofit/>
+          </a:bodyPr>
+          <a:lstStyle/>
+          <a:p>
+            <a:r>
+              <a:rPr lang="de-DE" sz="6400" dirty="0" smtClean="0"/>
               <a:t>MMIX-Edit</a:t>
             </a:r>
-            <a:endParaRPr lang="de-DE" dirty="0"/>
+            <a:endParaRPr lang="de-DE" sz="6400" dirty="0"/>
+          </a:p>
+        </p:txBody>
+      </p:sp>
+      <p:sp>
+        <p:nvSpPr>
+          <p:cNvPr id="3" name="Textfeld 2"/>
+          <p:cNvSpPr txBox="1"/>
+          <p:nvPr/>
+        </p:nvSpPr>
+        <p:spPr>
+          <a:xfrm>
+            <a:off x="3363261" y="6237312"/>
+            <a:ext cx="2444131" cy="584775"/>
+          </a:xfrm>
+          <a:prstGeom prst="rect">
+            <a:avLst/>
+          </a:prstGeom>
+          <a:noFill/>
+        </p:spPr>
+        <p:txBody>
+          <a:bodyPr wrap="none" rtlCol="0">
+            <a:spAutoFit/>
+          </a:bodyPr>
+          <a:lstStyle/>
+          <a:p>
+            <a:pPr algn="ctr"/>
+            <a:r>
+              <a:rPr lang="de-DE" sz="3200" dirty="0" smtClean="0"/>
+              <a:t>Felix Albrecht</a:t>
+            </a:r>
+            <a:endParaRPr lang="de-DE" sz="3200" dirty="0"/>
           </a:p>
         </p:txBody>
       </p:sp>
@@ -3063,6 +3126,1331 @@
     <p:extLst>
       <p:ext uri="{BB962C8B-B14F-4D97-AF65-F5344CB8AC3E}">
         <p14:creationId xmlns:p14="http://schemas.microsoft.com/office/powerpoint/2010/main" val="4100223877"/>
+      </p:ext>
+    </p:extLst>
+  </p:cSld>
+  <p:clrMapOvr>
+    <a:masterClrMapping/>
+  </p:clrMapOvr>
+  <p:timing>
+    <p:tnLst>
+      <p:par>
+        <p:cTn id="1" dur="indefinite" restart="never" nodeType="tmRoot"/>
+      </p:par>
+    </p:tnLst>
+  </p:timing>
+</p:sld>
+</file>
+
+<file path=ppt/slides/slide10.xml><?xml version="1.0" encoding="utf-8"?>
+<p:sld xmlns:a="http://schemas.openxmlformats.org/drawingml/2006/main" xmlns:r="http://schemas.openxmlformats.org/officeDocument/2006/relationships" xmlns:p="http://schemas.openxmlformats.org/presentationml/2006/main">
+  <p:cSld>
+    <p:spTree>
+      <p:nvGrpSpPr>
+        <p:cNvPr id="1" name=""/>
+        <p:cNvGrpSpPr/>
+        <p:nvPr/>
+      </p:nvGrpSpPr>
+      <p:grpSpPr>
+        <a:xfrm>
+          <a:off x="0" y="0"/>
+          <a:ext cx="0" cy="0"/>
+          <a:chOff x="0" y="0"/>
+          <a:chExt cx="0" cy="0"/>
+        </a:xfrm>
+      </p:grpSpPr>
+      <p:sp>
+        <p:nvSpPr>
+          <p:cNvPr id="2" name="Titel 1"/>
+          <p:cNvSpPr>
+            <a:spLocks noGrp="1"/>
+          </p:cNvSpPr>
+          <p:nvPr>
+            <p:ph type="title"/>
+          </p:nvPr>
+        </p:nvSpPr>
+        <p:spPr/>
+        <p:txBody>
+          <a:bodyPr/>
+          <a:lstStyle/>
+          <a:p>
+            <a:r>
+              <a:rPr lang="de-DE" dirty="0" smtClean="0"/>
+              <a:t>Win32</a:t>
+            </a:r>
+            <a:endParaRPr lang="de-DE" dirty="0"/>
+          </a:p>
+        </p:txBody>
+      </p:sp>
+      <p:sp>
+        <p:nvSpPr>
+          <p:cNvPr id="3" name="Inhaltsplatzhalter 2"/>
+          <p:cNvSpPr>
+            <a:spLocks noGrp="1"/>
+          </p:cNvSpPr>
+          <p:nvPr>
+            <p:ph idx="1"/>
+          </p:nvPr>
+        </p:nvSpPr>
+        <p:spPr/>
+        <p:txBody>
+          <a:bodyPr/>
+          <a:lstStyle/>
+          <a:p>
+            <a:pPr marL="0" indent="0">
+              <a:buNone/>
+            </a:pPr>
+            <a:endParaRPr lang="de-DE" dirty="0" smtClean="0"/>
+          </a:p>
+          <a:p>
+            <a:pPr marL="0" indent="0">
+              <a:buNone/>
+            </a:pPr>
+            <a:r>
+              <a:rPr lang="de-DE" dirty="0" smtClean="0"/>
+              <a:t>WNDCLASSEX </a:t>
+            </a:r>
+            <a:r>
+              <a:rPr lang="de-DE" dirty="0" err="1" smtClean="0"/>
+              <a:t>windowClass</a:t>
+            </a:r>
+            <a:endParaRPr lang="de-DE" dirty="0" smtClean="0"/>
+          </a:p>
+          <a:p>
+            <a:pPr marL="0" indent="0">
+              <a:buNone/>
+            </a:pPr>
+            <a:endParaRPr lang="de-DE" dirty="0"/>
+          </a:p>
+          <a:p>
+            <a:pPr marL="0" indent="0">
+              <a:buNone/>
+            </a:pPr>
+            <a:r>
+              <a:rPr lang="de-DE" dirty="0" smtClean="0"/>
+              <a:t> - speichert Informationen der Anwendung</a:t>
+            </a:r>
+          </a:p>
+          <a:p>
+            <a:pPr marL="0" indent="0">
+              <a:buNone/>
+            </a:pPr>
+            <a:endParaRPr lang="de-DE" dirty="0"/>
+          </a:p>
+          <a:p>
+            <a:pPr marL="0" indent="0">
+              <a:buNone/>
+            </a:pPr>
+            <a:r>
+              <a:rPr lang="de-DE" dirty="0" smtClean="0"/>
+              <a:t> - benötigt zum Erstellen des Hauptfensters</a:t>
+            </a:r>
+            <a:endParaRPr lang="de-DE" dirty="0"/>
+          </a:p>
+        </p:txBody>
+      </p:sp>
+    </p:spTree>
+    <p:extLst>
+      <p:ext uri="{BB962C8B-B14F-4D97-AF65-F5344CB8AC3E}">
+        <p14:creationId xmlns:p14="http://schemas.microsoft.com/office/powerpoint/2010/main" val="1021439753"/>
+      </p:ext>
+    </p:extLst>
+  </p:cSld>
+  <p:clrMapOvr>
+    <a:masterClrMapping/>
+  </p:clrMapOvr>
+  <p:timing>
+    <p:tnLst>
+      <p:par>
+        <p:cTn id="1" dur="indefinite" restart="never" nodeType="tmRoot"/>
+      </p:par>
+    </p:tnLst>
+  </p:timing>
+</p:sld>
+</file>
+
+<file path=ppt/slides/slide11.xml><?xml version="1.0" encoding="utf-8"?>
+<p:sld xmlns:a="http://schemas.openxmlformats.org/drawingml/2006/main" xmlns:r="http://schemas.openxmlformats.org/officeDocument/2006/relationships" xmlns:p="http://schemas.openxmlformats.org/presentationml/2006/main">
+  <p:cSld>
+    <p:spTree>
+      <p:nvGrpSpPr>
+        <p:cNvPr id="1" name=""/>
+        <p:cNvGrpSpPr/>
+        <p:nvPr/>
+      </p:nvGrpSpPr>
+      <p:grpSpPr>
+        <a:xfrm>
+          <a:off x="0" y="0"/>
+          <a:ext cx="0" cy="0"/>
+          <a:chOff x="0" y="0"/>
+          <a:chExt cx="0" cy="0"/>
+        </a:xfrm>
+      </p:grpSpPr>
+      <p:sp>
+        <p:nvSpPr>
+          <p:cNvPr id="2" name="Titel 1"/>
+          <p:cNvSpPr>
+            <a:spLocks noGrp="1"/>
+          </p:cNvSpPr>
+          <p:nvPr>
+            <p:ph type="title"/>
+          </p:nvPr>
+        </p:nvSpPr>
+        <p:spPr/>
+        <p:txBody>
+          <a:bodyPr/>
+          <a:lstStyle/>
+          <a:p>
+            <a:r>
+              <a:rPr lang="de-DE" dirty="0" smtClean="0"/>
+              <a:t>Win32</a:t>
+            </a:r>
+            <a:endParaRPr lang="de-DE" dirty="0"/>
+          </a:p>
+        </p:txBody>
+      </p:sp>
+      <p:sp>
+        <p:nvSpPr>
+          <p:cNvPr id="3" name="Inhaltsplatzhalter 2"/>
+          <p:cNvSpPr>
+            <a:spLocks noGrp="1"/>
+          </p:cNvSpPr>
+          <p:nvPr>
+            <p:ph idx="1"/>
+          </p:nvPr>
+        </p:nvSpPr>
+        <p:spPr/>
+        <p:txBody>
+          <a:bodyPr/>
+          <a:lstStyle/>
+          <a:p>
+            <a:pPr marL="0" indent="0">
+              <a:buNone/>
+            </a:pPr>
+            <a:endParaRPr lang="de-DE" dirty="0" smtClean="0"/>
+          </a:p>
+          <a:p>
+            <a:pPr marL="0" indent="0">
+              <a:buNone/>
+            </a:pPr>
+            <a:r>
+              <a:rPr lang="de-DE" dirty="0" smtClean="0"/>
+              <a:t>Atom WINAPI </a:t>
+            </a:r>
+            <a:r>
+              <a:rPr lang="de-DE" dirty="0" err="1" smtClean="0"/>
+              <a:t>RegisterClassEx</a:t>
+            </a:r>
+            <a:r>
+              <a:rPr lang="de-DE" dirty="0" smtClean="0"/>
+              <a:t>([…])</a:t>
+            </a:r>
+          </a:p>
+          <a:p>
+            <a:pPr marL="0" indent="0">
+              <a:buNone/>
+            </a:pPr>
+            <a:endParaRPr lang="de-DE" dirty="0"/>
+          </a:p>
+          <a:p>
+            <a:pPr marL="0" indent="0">
+              <a:buNone/>
+            </a:pPr>
+            <a:r>
+              <a:rPr lang="de-DE" dirty="0" smtClean="0"/>
+              <a:t> - Registrieren des Hauptfensters</a:t>
+            </a:r>
+          </a:p>
+          <a:p>
+            <a:pPr marL="0" indent="0">
+              <a:buNone/>
+            </a:pPr>
+            <a:endParaRPr lang="de-DE" dirty="0"/>
+          </a:p>
+          <a:p>
+            <a:pPr marL="0" indent="0">
+              <a:buNone/>
+            </a:pPr>
+            <a:r>
+              <a:rPr lang="de-DE" dirty="0"/>
+              <a:t> </a:t>
+            </a:r>
+            <a:r>
+              <a:rPr lang="de-DE" dirty="0" smtClean="0"/>
+              <a:t>- benötigt die WNDCLASSEX</a:t>
+            </a:r>
+            <a:endParaRPr lang="de-DE" dirty="0"/>
+          </a:p>
+        </p:txBody>
+      </p:sp>
+    </p:spTree>
+    <p:extLst>
+      <p:ext uri="{BB962C8B-B14F-4D97-AF65-F5344CB8AC3E}">
+        <p14:creationId xmlns:p14="http://schemas.microsoft.com/office/powerpoint/2010/main" val="3333458768"/>
+      </p:ext>
+    </p:extLst>
+  </p:cSld>
+  <p:clrMapOvr>
+    <a:masterClrMapping/>
+  </p:clrMapOvr>
+  <p:timing>
+    <p:tnLst>
+      <p:par>
+        <p:cTn id="1" dur="indefinite" restart="never" nodeType="tmRoot"/>
+      </p:par>
+    </p:tnLst>
+  </p:timing>
+</p:sld>
+</file>
+
+<file path=ppt/slides/slide12.xml><?xml version="1.0" encoding="utf-8"?>
+<p:sld xmlns:a="http://schemas.openxmlformats.org/drawingml/2006/main" xmlns:r="http://schemas.openxmlformats.org/officeDocument/2006/relationships" xmlns:p="http://schemas.openxmlformats.org/presentationml/2006/main">
+  <p:cSld>
+    <p:spTree>
+      <p:nvGrpSpPr>
+        <p:cNvPr id="1" name=""/>
+        <p:cNvGrpSpPr/>
+        <p:nvPr/>
+      </p:nvGrpSpPr>
+      <p:grpSpPr>
+        <a:xfrm>
+          <a:off x="0" y="0"/>
+          <a:ext cx="0" cy="0"/>
+          <a:chOff x="0" y="0"/>
+          <a:chExt cx="0" cy="0"/>
+        </a:xfrm>
+      </p:grpSpPr>
+      <p:sp>
+        <p:nvSpPr>
+          <p:cNvPr id="2" name="Titel 1"/>
+          <p:cNvSpPr>
+            <a:spLocks noGrp="1"/>
+          </p:cNvSpPr>
+          <p:nvPr>
+            <p:ph type="title"/>
+          </p:nvPr>
+        </p:nvSpPr>
+        <p:spPr/>
+        <p:txBody>
+          <a:bodyPr/>
+          <a:lstStyle/>
+          <a:p>
+            <a:r>
+              <a:rPr lang="de-DE" dirty="0" smtClean="0"/>
+              <a:t>Win32</a:t>
+            </a:r>
+            <a:endParaRPr lang="de-DE" dirty="0"/>
+          </a:p>
+        </p:txBody>
+      </p:sp>
+      <p:sp>
+        <p:nvSpPr>
+          <p:cNvPr id="3" name="Inhaltsplatzhalter 2"/>
+          <p:cNvSpPr>
+            <a:spLocks noGrp="1"/>
+          </p:cNvSpPr>
+          <p:nvPr>
+            <p:ph idx="1"/>
+          </p:nvPr>
+        </p:nvSpPr>
+        <p:spPr/>
+        <p:txBody>
+          <a:bodyPr/>
+          <a:lstStyle/>
+          <a:p>
+            <a:pPr marL="0" indent="0">
+              <a:buNone/>
+            </a:pPr>
+            <a:endParaRPr lang="de-DE" dirty="0" smtClean="0"/>
+          </a:p>
+          <a:p>
+            <a:pPr marL="0" indent="0">
+              <a:buNone/>
+            </a:pPr>
+            <a:r>
+              <a:rPr lang="de-DE" dirty="0" smtClean="0"/>
+              <a:t>HWND WINAPI </a:t>
+            </a:r>
+            <a:r>
+              <a:rPr lang="de-DE" dirty="0" err="1" smtClean="0"/>
+              <a:t>CreateWindow</a:t>
+            </a:r>
+            <a:r>
+              <a:rPr lang="de-DE" dirty="0" smtClean="0"/>
+              <a:t>([…])</a:t>
+            </a:r>
+          </a:p>
+          <a:p>
+            <a:pPr marL="0" indent="0">
+              <a:buNone/>
+            </a:pPr>
+            <a:endParaRPr lang="de-DE" dirty="0"/>
+          </a:p>
+          <a:p>
+            <a:pPr marL="0" indent="0">
+              <a:buNone/>
+            </a:pPr>
+            <a:r>
+              <a:rPr lang="de-DE" dirty="0" smtClean="0"/>
+              <a:t> - erstellt registriertes Hauptfenster</a:t>
+            </a:r>
+          </a:p>
+          <a:p>
+            <a:pPr marL="0" indent="0">
+              <a:buNone/>
+            </a:pPr>
+            <a:endParaRPr lang="de-DE" dirty="0"/>
+          </a:p>
+          <a:p>
+            <a:pPr marL="0" indent="0">
+              <a:buNone/>
+            </a:pPr>
+            <a:r>
+              <a:rPr lang="de-DE" dirty="0" smtClean="0"/>
+              <a:t> - gibt Handle des Fensters zurück</a:t>
+            </a:r>
+            <a:endParaRPr lang="de-DE" dirty="0"/>
+          </a:p>
+        </p:txBody>
+      </p:sp>
+    </p:spTree>
+    <p:extLst>
+      <p:ext uri="{BB962C8B-B14F-4D97-AF65-F5344CB8AC3E}">
+        <p14:creationId xmlns:p14="http://schemas.microsoft.com/office/powerpoint/2010/main" val="1168424612"/>
+      </p:ext>
+    </p:extLst>
+  </p:cSld>
+  <p:clrMapOvr>
+    <a:masterClrMapping/>
+  </p:clrMapOvr>
+  <p:timing>
+    <p:tnLst>
+      <p:par>
+        <p:cTn id="1" dur="indefinite" restart="never" nodeType="tmRoot"/>
+      </p:par>
+    </p:tnLst>
+  </p:timing>
+</p:sld>
+</file>
+
+<file path=ppt/slides/slide13.xml><?xml version="1.0" encoding="utf-8"?>
+<p:sld xmlns:a="http://schemas.openxmlformats.org/drawingml/2006/main" xmlns:r="http://schemas.openxmlformats.org/officeDocument/2006/relationships" xmlns:p="http://schemas.openxmlformats.org/presentationml/2006/main">
+  <p:cSld>
+    <p:spTree>
+      <p:nvGrpSpPr>
+        <p:cNvPr id="1" name=""/>
+        <p:cNvGrpSpPr/>
+        <p:nvPr/>
+      </p:nvGrpSpPr>
+      <p:grpSpPr>
+        <a:xfrm>
+          <a:off x="0" y="0"/>
+          <a:ext cx="0" cy="0"/>
+          <a:chOff x="0" y="0"/>
+          <a:chExt cx="0" cy="0"/>
+        </a:xfrm>
+      </p:grpSpPr>
+      <p:sp>
+        <p:nvSpPr>
+          <p:cNvPr id="2" name="Titel 1"/>
+          <p:cNvSpPr>
+            <a:spLocks noGrp="1"/>
+          </p:cNvSpPr>
+          <p:nvPr>
+            <p:ph type="title"/>
+          </p:nvPr>
+        </p:nvSpPr>
+        <p:spPr/>
+        <p:txBody>
+          <a:bodyPr/>
+          <a:lstStyle/>
+          <a:p>
+            <a:r>
+              <a:rPr lang="de-DE" dirty="0" smtClean="0"/>
+              <a:t>Win32</a:t>
+            </a:r>
+            <a:endParaRPr lang="de-DE" dirty="0"/>
+          </a:p>
+        </p:txBody>
+      </p:sp>
+      <p:sp>
+        <p:nvSpPr>
+          <p:cNvPr id="3" name="Inhaltsplatzhalter 2"/>
+          <p:cNvSpPr>
+            <a:spLocks noGrp="1"/>
+          </p:cNvSpPr>
+          <p:nvPr>
+            <p:ph idx="1"/>
+          </p:nvPr>
+        </p:nvSpPr>
+        <p:spPr/>
+        <p:txBody>
+          <a:bodyPr/>
+          <a:lstStyle/>
+          <a:p>
+            <a:pPr marL="0" indent="0">
+              <a:buNone/>
+            </a:pPr>
+            <a:endParaRPr lang="de-DE" dirty="0" smtClean="0"/>
+          </a:p>
+          <a:p>
+            <a:pPr marL="0" indent="0">
+              <a:buNone/>
+            </a:pPr>
+            <a:r>
+              <a:rPr lang="de-DE" dirty="0" smtClean="0"/>
+              <a:t>BOOL WINAPI </a:t>
+            </a:r>
+            <a:r>
+              <a:rPr lang="de-DE" dirty="0" err="1" smtClean="0"/>
+              <a:t>ShowWindow</a:t>
+            </a:r>
+            <a:r>
+              <a:rPr lang="de-DE" dirty="0" smtClean="0"/>
+              <a:t>([…])</a:t>
+            </a:r>
+          </a:p>
+          <a:p>
+            <a:pPr marL="0" indent="0">
+              <a:buNone/>
+            </a:pPr>
+            <a:endParaRPr lang="de-DE" dirty="0"/>
+          </a:p>
+          <a:p>
+            <a:pPr marL="0" indent="0">
+              <a:buNone/>
+            </a:pPr>
+            <a:r>
+              <a:rPr lang="de-DE" dirty="0" smtClean="0"/>
+              <a:t> - ändert Sichtbarkeit des angegebenen Fensters</a:t>
+            </a:r>
+          </a:p>
+          <a:p>
+            <a:pPr marL="0" indent="0">
+              <a:buNone/>
+            </a:pPr>
+            <a:endParaRPr lang="de-DE" dirty="0"/>
+          </a:p>
+          <a:p>
+            <a:pPr marL="0" indent="0">
+              <a:buNone/>
+            </a:pPr>
+            <a:r>
+              <a:rPr lang="de-DE" dirty="0" smtClean="0"/>
+              <a:t> - Minimierung oder Maximierung möglich</a:t>
+            </a:r>
+            <a:endParaRPr lang="de-DE" dirty="0"/>
+          </a:p>
+        </p:txBody>
+      </p:sp>
+    </p:spTree>
+    <p:extLst>
+      <p:ext uri="{BB962C8B-B14F-4D97-AF65-F5344CB8AC3E}">
+        <p14:creationId xmlns:p14="http://schemas.microsoft.com/office/powerpoint/2010/main" val="141720191"/>
+      </p:ext>
+    </p:extLst>
+  </p:cSld>
+  <p:clrMapOvr>
+    <a:masterClrMapping/>
+  </p:clrMapOvr>
+  <p:timing>
+    <p:tnLst>
+      <p:par>
+        <p:cTn id="1" dur="indefinite" restart="never" nodeType="tmRoot"/>
+      </p:par>
+    </p:tnLst>
+  </p:timing>
+</p:sld>
+</file>
+
+<file path=ppt/slides/slide14.xml><?xml version="1.0" encoding="utf-8"?>
+<p:sld xmlns:a="http://schemas.openxmlformats.org/drawingml/2006/main" xmlns:r="http://schemas.openxmlformats.org/officeDocument/2006/relationships" xmlns:p="http://schemas.openxmlformats.org/presentationml/2006/main">
+  <p:cSld>
+    <p:spTree>
+      <p:nvGrpSpPr>
+        <p:cNvPr id="1" name=""/>
+        <p:cNvGrpSpPr/>
+        <p:nvPr/>
+      </p:nvGrpSpPr>
+      <p:grpSpPr>
+        <a:xfrm>
+          <a:off x="0" y="0"/>
+          <a:ext cx="0" cy="0"/>
+          <a:chOff x="0" y="0"/>
+          <a:chExt cx="0" cy="0"/>
+        </a:xfrm>
+      </p:grpSpPr>
+      <p:sp>
+        <p:nvSpPr>
+          <p:cNvPr id="2" name="Titel 1"/>
+          <p:cNvSpPr>
+            <a:spLocks noGrp="1"/>
+          </p:cNvSpPr>
+          <p:nvPr>
+            <p:ph type="title"/>
+          </p:nvPr>
+        </p:nvSpPr>
+        <p:spPr/>
+        <p:txBody>
+          <a:bodyPr/>
+          <a:lstStyle/>
+          <a:p>
+            <a:r>
+              <a:rPr lang="de-DE" dirty="0" smtClean="0"/>
+              <a:t>Win32</a:t>
+            </a:r>
+            <a:endParaRPr lang="de-DE" dirty="0"/>
+          </a:p>
+        </p:txBody>
+      </p:sp>
+      <p:sp>
+        <p:nvSpPr>
+          <p:cNvPr id="3" name="Inhaltsplatzhalter 2"/>
+          <p:cNvSpPr>
+            <a:spLocks noGrp="1"/>
+          </p:cNvSpPr>
+          <p:nvPr>
+            <p:ph idx="1"/>
+          </p:nvPr>
+        </p:nvSpPr>
+        <p:spPr/>
+        <p:txBody>
+          <a:bodyPr/>
+          <a:lstStyle/>
+          <a:p>
+            <a:pPr marL="0" indent="0">
+              <a:buNone/>
+            </a:pPr>
+            <a:endParaRPr lang="de-DE" dirty="0" smtClean="0"/>
+          </a:p>
+          <a:p>
+            <a:pPr marL="0" indent="0">
+              <a:buNone/>
+            </a:pPr>
+            <a:r>
+              <a:rPr lang="de-DE" dirty="0" smtClean="0"/>
+              <a:t>Nachrichtenschleife</a:t>
+            </a:r>
+          </a:p>
+          <a:p>
+            <a:pPr marL="0" indent="0">
+              <a:buNone/>
+            </a:pPr>
+            <a:endParaRPr lang="de-DE" dirty="0"/>
+          </a:p>
+          <a:p>
+            <a:pPr marL="0" indent="0">
+              <a:buNone/>
+            </a:pPr>
+            <a:r>
+              <a:rPr lang="de-DE" dirty="0" smtClean="0"/>
+              <a:t> - </a:t>
+            </a:r>
+            <a:r>
+              <a:rPr lang="de-DE" dirty="0" err="1" smtClean="0"/>
+              <a:t>while</a:t>
+            </a:r>
+            <a:r>
+              <a:rPr lang="de-DE" dirty="0" smtClean="0"/>
+              <a:t> mit </a:t>
+            </a:r>
+            <a:r>
+              <a:rPr lang="de-DE" dirty="0" err="1" smtClean="0"/>
+              <a:t>GetMessage</a:t>
+            </a:r>
+            <a:endParaRPr lang="de-DE" dirty="0" smtClean="0"/>
+          </a:p>
+          <a:p>
+            <a:pPr marL="0" indent="0">
+              <a:buNone/>
+            </a:pPr>
+            <a:endParaRPr lang="de-DE" dirty="0"/>
+          </a:p>
+          <a:p>
+            <a:pPr marL="0" indent="0">
+              <a:buNone/>
+            </a:pPr>
+            <a:r>
+              <a:rPr lang="de-DE" dirty="0" smtClean="0"/>
+              <a:t> - leitet Nachrichten weiter</a:t>
+            </a:r>
+            <a:endParaRPr lang="de-DE" dirty="0"/>
+          </a:p>
+        </p:txBody>
+      </p:sp>
+    </p:spTree>
+    <p:extLst>
+      <p:ext uri="{BB962C8B-B14F-4D97-AF65-F5344CB8AC3E}">
+        <p14:creationId xmlns:p14="http://schemas.microsoft.com/office/powerpoint/2010/main" val="1405832138"/>
+      </p:ext>
+    </p:extLst>
+  </p:cSld>
+  <p:clrMapOvr>
+    <a:masterClrMapping/>
+  </p:clrMapOvr>
+  <p:timing>
+    <p:tnLst>
+      <p:par>
+        <p:cTn id="1" dur="indefinite" restart="never" nodeType="tmRoot"/>
+      </p:par>
+    </p:tnLst>
+  </p:timing>
+</p:sld>
+</file>
+
+<file path=ppt/slides/slide15.xml><?xml version="1.0" encoding="utf-8"?>
+<p:sld xmlns:a="http://schemas.openxmlformats.org/drawingml/2006/main" xmlns:r="http://schemas.openxmlformats.org/officeDocument/2006/relationships" xmlns:p="http://schemas.openxmlformats.org/presentationml/2006/main">
+  <p:cSld>
+    <p:spTree>
+      <p:nvGrpSpPr>
+        <p:cNvPr id="1" name=""/>
+        <p:cNvGrpSpPr/>
+        <p:nvPr/>
+      </p:nvGrpSpPr>
+      <p:grpSpPr>
+        <a:xfrm>
+          <a:off x="0" y="0"/>
+          <a:ext cx="0" cy="0"/>
+          <a:chOff x="0" y="0"/>
+          <a:chExt cx="0" cy="0"/>
+        </a:xfrm>
+      </p:grpSpPr>
+      <p:sp>
+        <p:nvSpPr>
+          <p:cNvPr id="2" name="Titel 1"/>
+          <p:cNvSpPr>
+            <a:spLocks noGrp="1"/>
+          </p:cNvSpPr>
+          <p:nvPr>
+            <p:ph type="title"/>
+          </p:nvPr>
+        </p:nvSpPr>
+        <p:spPr/>
+        <p:txBody>
+          <a:bodyPr/>
+          <a:lstStyle/>
+          <a:p>
+            <a:r>
+              <a:rPr lang="de-DE" dirty="0" smtClean="0"/>
+              <a:t>Win32</a:t>
+            </a:r>
+            <a:endParaRPr lang="de-DE" dirty="0"/>
+          </a:p>
+        </p:txBody>
+      </p:sp>
+      <p:sp>
+        <p:nvSpPr>
+          <p:cNvPr id="3" name="Inhaltsplatzhalter 2"/>
+          <p:cNvSpPr>
+            <a:spLocks noGrp="1"/>
+          </p:cNvSpPr>
+          <p:nvPr>
+            <p:ph idx="1"/>
+          </p:nvPr>
+        </p:nvSpPr>
+        <p:spPr/>
+        <p:txBody>
+          <a:bodyPr/>
+          <a:lstStyle/>
+          <a:p>
+            <a:pPr marL="0" indent="0">
+              <a:buNone/>
+            </a:pPr>
+            <a:endParaRPr lang="de-DE" dirty="0" smtClean="0"/>
+          </a:p>
+          <a:p>
+            <a:pPr marL="0" indent="0">
+              <a:buNone/>
+            </a:pPr>
+            <a:r>
+              <a:rPr lang="de-DE" dirty="0" smtClean="0"/>
+              <a:t>BOOL WINAPI </a:t>
+            </a:r>
+            <a:r>
+              <a:rPr lang="de-DE" dirty="0" err="1" smtClean="0"/>
+              <a:t>GetMessage</a:t>
+            </a:r>
+            <a:r>
+              <a:rPr lang="de-DE" dirty="0" smtClean="0"/>
+              <a:t>([…])</a:t>
+            </a:r>
+          </a:p>
+          <a:p>
+            <a:pPr marL="0" indent="0">
+              <a:buNone/>
+            </a:pPr>
+            <a:endParaRPr lang="de-DE" dirty="0"/>
+          </a:p>
+          <a:p>
+            <a:pPr marL="0" indent="0">
+              <a:buNone/>
+            </a:pPr>
+            <a:r>
+              <a:rPr lang="de-DE" dirty="0" smtClean="0"/>
+              <a:t> - holt oberste Nachricht von </a:t>
+            </a:r>
+            <a:r>
+              <a:rPr lang="de-DE" dirty="0" err="1" smtClean="0"/>
+              <a:t>Messagequeue</a:t>
+            </a:r>
+            <a:endParaRPr lang="de-DE" dirty="0" smtClean="0"/>
+          </a:p>
+          <a:p>
+            <a:pPr marL="0" indent="0">
+              <a:buNone/>
+            </a:pPr>
+            <a:endParaRPr lang="de-DE" dirty="0"/>
+          </a:p>
+          <a:p>
+            <a:pPr marL="0" indent="0">
+              <a:buNone/>
+            </a:pPr>
+            <a:r>
+              <a:rPr lang="de-DE" dirty="0" smtClean="0"/>
+              <a:t> - filtert Nachrichten nach Kriterien</a:t>
+            </a:r>
+            <a:endParaRPr lang="de-DE" dirty="0"/>
+          </a:p>
+        </p:txBody>
+      </p:sp>
+    </p:spTree>
+    <p:extLst>
+      <p:ext uri="{BB962C8B-B14F-4D97-AF65-F5344CB8AC3E}">
+        <p14:creationId xmlns:p14="http://schemas.microsoft.com/office/powerpoint/2010/main" val="3103746599"/>
+      </p:ext>
+    </p:extLst>
+  </p:cSld>
+  <p:clrMapOvr>
+    <a:masterClrMapping/>
+  </p:clrMapOvr>
+  <p:timing>
+    <p:tnLst>
+      <p:par>
+        <p:cTn id="1" dur="indefinite" restart="never" nodeType="tmRoot"/>
+      </p:par>
+    </p:tnLst>
+  </p:timing>
+</p:sld>
+</file>
+
+<file path=ppt/slides/slide16.xml><?xml version="1.0" encoding="utf-8"?>
+<p:sld xmlns:a="http://schemas.openxmlformats.org/drawingml/2006/main" xmlns:r="http://schemas.openxmlformats.org/officeDocument/2006/relationships" xmlns:p="http://schemas.openxmlformats.org/presentationml/2006/main">
+  <p:cSld>
+    <p:spTree>
+      <p:nvGrpSpPr>
+        <p:cNvPr id="1" name=""/>
+        <p:cNvGrpSpPr/>
+        <p:nvPr/>
+      </p:nvGrpSpPr>
+      <p:grpSpPr>
+        <a:xfrm>
+          <a:off x="0" y="0"/>
+          <a:ext cx="0" cy="0"/>
+          <a:chOff x="0" y="0"/>
+          <a:chExt cx="0" cy="0"/>
+        </a:xfrm>
+      </p:grpSpPr>
+      <p:sp>
+        <p:nvSpPr>
+          <p:cNvPr id="2" name="Titel 1"/>
+          <p:cNvSpPr>
+            <a:spLocks noGrp="1"/>
+          </p:cNvSpPr>
+          <p:nvPr>
+            <p:ph type="title"/>
+          </p:nvPr>
+        </p:nvSpPr>
+        <p:spPr/>
+        <p:txBody>
+          <a:bodyPr/>
+          <a:lstStyle/>
+          <a:p>
+            <a:r>
+              <a:rPr lang="de-DE" dirty="0" smtClean="0"/>
+              <a:t>Win32</a:t>
+            </a:r>
+            <a:endParaRPr lang="de-DE" dirty="0"/>
+          </a:p>
+        </p:txBody>
+      </p:sp>
+      <p:sp>
+        <p:nvSpPr>
+          <p:cNvPr id="3" name="Inhaltsplatzhalter 2"/>
+          <p:cNvSpPr>
+            <a:spLocks noGrp="1"/>
+          </p:cNvSpPr>
+          <p:nvPr>
+            <p:ph idx="1"/>
+          </p:nvPr>
+        </p:nvSpPr>
+        <p:spPr/>
+        <p:txBody>
+          <a:bodyPr/>
+          <a:lstStyle/>
+          <a:p>
+            <a:pPr marL="0" indent="0">
+              <a:buNone/>
+            </a:pPr>
+            <a:endParaRPr lang="de-DE" dirty="0" smtClean="0"/>
+          </a:p>
+          <a:p>
+            <a:pPr marL="0" indent="0">
+              <a:buNone/>
+            </a:pPr>
+            <a:r>
+              <a:rPr lang="de-DE" dirty="0" smtClean="0"/>
+              <a:t>LRESULT WINAPI </a:t>
+            </a:r>
+            <a:r>
+              <a:rPr lang="de-DE" dirty="0" err="1" smtClean="0"/>
+              <a:t>DispatchMessage</a:t>
+            </a:r>
+            <a:r>
+              <a:rPr lang="de-DE" dirty="0" smtClean="0"/>
+              <a:t>([…])</a:t>
+            </a:r>
+          </a:p>
+          <a:p>
+            <a:pPr marL="0" indent="0">
+              <a:buNone/>
+            </a:pPr>
+            <a:endParaRPr lang="de-DE" dirty="0"/>
+          </a:p>
+          <a:p>
+            <a:pPr marL="0" indent="0">
+              <a:buNone/>
+            </a:pPr>
+            <a:r>
+              <a:rPr lang="de-DE" dirty="0" smtClean="0"/>
+              <a:t> - leitet Nachricht an richtiges Fenster weiter</a:t>
+            </a:r>
+          </a:p>
+          <a:p>
+            <a:pPr marL="0" indent="0">
+              <a:buNone/>
+            </a:pPr>
+            <a:endParaRPr lang="de-DE" dirty="0"/>
+          </a:p>
+          <a:p>
+            <a:pPr marL="0" indent="0">
+              <a:buNone/>
+            </a:pPr>
+            <a:r>
+              <a:rPr lang="de-DE" dirty="0" smtClean="0"/>
+              <a:t> - bei Hauptfenster an </a:t>
+            </a:r>
+            <a:r>
+              <a:rPr lang="de-DE" dirty="0" err="1" smtClean="0"/>
+              <a:t>WndProc</a:t>
+            </a:r>
+            <a:endParaRPr lang="de-DE" dirty="0"/>
+          </a:p>
+        </p:txBody>
+      </p:sp>
+    </p:spTree>
+    <p:extLst>
+      <p:ext uri="{BB962C8B-B14F-4D97-AF65-F5344CB8AC3E}">
+        <p14:creationId xmlns:p14="http://schemas.microsoft.com/office/powerpoint/2010/main" val="3000571530"/>
+      </p:ext>
+    </p:extLst>
+  </p:cSld>
+  <p:clrMapOvr>
+    <a:masterClrMapping/>
+  </p:clrMapOvr>
+  <p:timing>
+    <p:tnLst>
+      <p:par>
+        <p:cTn id="1" dur="indefinite" restart="never" nodeType="tmRoot"/>
+      </p:par>
+    </p:tnLst>
+  </p:timing>
+</p:sld>
+</file>
+
+<file path=ppt/slides/slide17.xml><?xml version="1.0" encoding="utf-8"?>
+<p:sld xmlns:a="http://schemas.openxmlformats.org/drawingml/2006/main" xmlns:r="http://schemas.openxmlformats.org/officeDocument/2006/relationships" xmlns:p="http://schemas.openxmlformats.org/presentationml/2006/main">
+  <p:cSld>
+    <p:spTree>
+      <p:nvGrpSpPr>
+        <p:cNvPr id="1" name=""/>
+        <p:cNvGrpSpPr/>
+        <p:nvPr/>
+      </p:nvGrpSpPr>
+      <p:grpSpPr>
+        <a:xfrm>
+          <a:off x="0" y="0"/>
+          <a:ext cx="0" cy="0"/>
+          <a:chOff x="0" y="0"/>
+          <a:chExt cx="0" cy="0"/>
+        </a:xfrm>
+      </p:grpSpPr>
+      <p:sp>
+        <p:nvSpPr>
+          <p:cNvPr id="2" name="Titel 1"/>
+          <p:cNvSpPr>
+            <a:spLocks noGrp="1"/>
+          </p:cNvSpPr>
+          <p:nvPr>
+            <p:ph type="title"/>
+          </p:nvPr>
+        </p:nvSpPr>
+        <p:spPr/>
+        <p:txBody>
+          <a:bodyPr/>
+          <a:lstStyle/>
+          <a:p>
+            <a:r>
+              <a:rPr lang="de-DE" dirty="0" smtClean="0"/>
+              <a:t>Win32</a:t>
+            </a:r>
+            <a:endParaRPr lang="de-DE" dirty="0"/>
+          </a:p>
+        </p:txBody>
+      </p:sp>
+      <p:sp>
+        <p:nvSpPr>
+          <p:cNvPr id="3" name="Inhaltsplatzhalter 2"/>
+          <p:cNvSpPr>
+            <a:spLocks noGrp="1"/>
+          </p:cNvSpPr>
+          <p:nvPr>
+            <p:ph idx="1"/>
+          </p:nvPr>
+        </p:nvSpPr>
+        <p:spPr/>
+        <p:txBody>
+          <a:bodyPr/>
+          <a:lstStyle/>
+          <a:p>
+            <a:pPr marL="0" indent="0">
+              <a:buNone/>
+            </a:pPr>
+            <a:endParaRPr lang="de-DE" dirty="0" smtClean="0"/>
+          </a:p>
+          <a:p>
+            <a:pPr marL="0" indent="0">
+              <a:buNone/>
+            </a:pPr>
+            <a:r>
+              <a:rPr lang="de-DE" dirty="0" smtClean="0"/>
+              <a:t>LRESULT CALLBACK </a:t>
+            </a:r>
+            <a:r>
+              <a:rPr lang="de-DE" dirty="0" err="1" smtClean="0"/>
+              <a:t>WndProc</a:t>
+            </a:r>
+            <a:r>
+              <a:rPr lang="de-DE" dirty="0" smtClean="0"/>
+              <a:t>([…])</a:t>
+            </a:r>
+          </a:p>
+          <a:p>
+            <a:pPr marL="0" indent="0">
+              <a:buNone/>
+            </a:pPr>
+            <a:endParaRPr lang="de-DE" dirty="0"/>
+          </a:p>
+          <a:p>
+            <a:pPr marL="0" indent="0">
+              <a:buNone/>
+            </a:pPr>
+            <a:r>
+              <a:rPr lang="de-DE" dirty="0" smtClean="0"/>
+              <a:t> - verarbeitet Nachrichten an Fenster</a:t>
+            </a:r>
+          </a:p>
+          <a:p>
+            <a:pPr marL="0" indent="0">
+              <a:buNone/>
+            </a:pPr>
+            <a:endParaRPr lang="de-DE" dirty="0"/>
+          </a:p>
+          <a:p>
+            <a:pPr marL="0" indent="0">
+              <a:buNone/>
+            </a:pPr>
+            <a:r>
+              <a:rPr lang="de-DE" dirty="0" smtClean="0"/>
+              <a:t> - muss WNDCLASSEX zugeordnet werden</a:t>
+            </a:r>
+            <a:endParaRPr lang="de-DE" dirty="0"/>
+          </a:p>
+        </p:txBody>
+      </p:sp>
+    </p:spTree>
+    <p:extLst>
+      <p:ext uri="{BB962C8B-B14F-4D97-AF65-F5344CB8AC3E}">
+        <p14:creationId xmlns:p14="http://schemas.microsoft.com/office/powerpoint/2010/main" val="3248034319"/>
+      </p:ext>
+    </p:extLst>
+  </p:cSld>
+  <p:clrMapOvr>
+    <a:masterClrMapping/>
+  </p:clrMapOvr>
+  <p:timing>
+    <p:tnLst>
+      <p:par>
+        <p:cTn id="1" dur="indefinite" restart="never" nodeType="tmRoot"/>
+      </p:par>
+    </p:tnLst>
+  </p:timing>
+</p:sld>
+</file>
+
+<file path=ppt/slides/slide18.xml><?xml version="1.0" encoding="utf-8"?>
+<p:sld xmlns:a="http://schemas.openxmlformats.org/drawingml/2006/main" xmlns:r="http://schemas.openxmlformats.org/officeDocument/2006/relationships" xmlns:p="http://schemas.openxmlformats.org/presentationml/2006/main">
+  <p:cSld>
+    <p:spTree>
+      <p:nvGrpSpPr>
+        <p:cNvPr id="1" name=""/>
+        <p:cNvGrpSpPr/>
+        <p:nvPr/>
+      </p:nvGrpSpPr>
+      <p:grpSpPr>
+        <a:xfrm>
+          <a:off x="0" y="0"/>
+          <a:ext cx="0" cy="0"/>
+          <a:chOff x="0" y="0"/>
+          <a:chExt cx="0" cy="0"/>
+        </a:xfrm>
+      </p:grpSpPr>
+      <p:sp>
+        <p:nvSpPr>
+          <p:cNvPr id="2" name="Titel 1"/>
+          <p:cNvSpPr>
+            <a:spLocks noGrp="1"/>
+          </p:cNvSpPr>
+          <p:nvPr>
+            <p:ph type="title"/>
+          </p:nvPr>
+        </p:nvSpPr>
+        <p:spPr/>
+        <p:txBody>
+          <a:bodyPr/>
+          <a:lstStyle/>
+          <a:p>
+            <a:r>
+              <a:rPr lang="de-DE" dirty="0" err="1" smtClean="0"/>
+              <a:t>Scintilla</a:t>
+            </a:r>
+            <a:r>
+              <a:rPr lang="de-DE" dirty="0" smtClean="0"/>
+              <a:t> Integration</a:t>
+            </a:r>
+            <a:endParaRPr lang="de-DE" dirty="0"/>
+          </a:p>
+        </p:txBody>
+      </p:sp>
+      <p:sp>
+        <p:nvSpPr>
+          <p:cNvPr id="3" name="Inhaltsplatzhalter 2"/>
+          <p:cNvSpPr>
+            <a:spLocks noGrp="1"/>
+          </p:cNvSpPr>
+          <p:nvPr>
+            <p:ph idx="1"/>
+          </p:nvPr>
+        </p:nvSpPr>
+        <p:spPr/>
+        <p:txBody>
+          <a:bodyPr/>
+          <a:lstStyle/>
+          <a:p>
+            <a:pPr marL="0" indent="0">
+              <a:buNone/>
+            </a:pPr>
+            <a:endParaRPr lang="de-DE" dirty="0" smtClean="0"/>
+          </a:p>
+          <a:p>
+            <a:r>
+              <a:rPr lang="de-DE" dirty="0" err="1" smtClean="0"/>
+              <a:t>Scintilla.h</a:t>
+            </a:r>
+            <a:r>
+              <a:rPr lang="de-DE" dirty="0"/>
+              <a:t/>
+            </a:r>
+            <a:br>
+              <a:rPr lang="de-DE" dirty="0"/>
+            </a:br>
+            <a:r>
+              <a:rPr lang="de-DE" dirty="0" smtClean="0"/>
+              <a:t>	muss </a:t>
+            </a:r>
+            <a:r>
+              <a:rPr lang="de-DE" dirty="0" err="1" smtClean="0"/>
+              <a:t>includiert</a:t>
+            </a:r>
+            <a:r>
+              <a:rPr lang="de-DE" dirty="0" smtClean="0"/>
+              <a:t> werden</a:t>
+            </a:r>
+          </a:p>
+          <a:p>
+            <a:endParaRPr lang="de-DE" dirty="0"/>
+          </a:p>
+          <a:p>
+            <a:r>
+              <a:rPr lang="de-DE" dirty="0" smtClean="0"/>
+              <a:t>Scintilla.dll</a:t>
+            </a:r>
+            <a:br>
+              <a:rPr lang="de-DE" dirty="0" smtClean="0"/>
+            </a:br>
+            <a:r>
+              <a:rPr lang="de-DE" dirty="0" smtClean="0"/>
+              <a:t>	brauch nicht eingebunden werden</a:t>
+            </a:r>
+            <a:br>
+              <a:rPr lang="de-DE" dirty="0" smtClean="0"/>
+            </a:br>
+            <a:r>
+              <a:rPr lang="de-DE" dirty="0" smtClean="0"/>
+              <a:t>	muss nur in Ordner sein</a:t>
+            </a:r>
+            <a:endParaRPr lang="de-DE" dirty="0"/>
+          </a:p>
+        </p:txBody>
+      </p:sp>
+    </p:spTree>
+    <p:extLst>
+      <p:ext uri="{BB962C8B-B14F-4D97-AF65-F5344CB8AC3E}">
+        <p14:creationId xmlns:p14="http://schemas.microsoft.com/office/powerpoint/2010/main" val="2755479760"/>
+      </p:ext>
+    </p:extLst>
+  </p:cSld>
+  <p:clrMapOvr>
+    <a:masterClrMapping/>
+  </p:clrMapOvr>
+  <p:timing>
+    <p:tnLst>
+      <p:par>
+        <p:cTn id="1" dur="indefinite" restart="never" nodeType="tmRoot"/>
+      </p:par>
+    </p:tnLst>
+  </p:timing>
+</p:sld>
+</file>
+
+<file path=ppt/slides/slide19.xml><?xml version="1.0" encoding="utf-8"?>
+<p:sld xmlns:a="http://schemas.openxmlformats.org/drawingml/2006/main" xmlns:r="http://schemas.openxmlformats.org/officeDocument/2006/relationships" xmlns:p="http://schemas.openxmlformats.org/presentationml/2006/main">
+  <p:cSld>
+    <p:spTree>
+      <p:nvGrpSpPr>
+        <p:cNvPr id="1" name=""/>
+        <p:cNvGrpSpPr/>
+        <p:nvPr/>
+      </p:nvGrpSpPr>
+      <p:grpSpPr>
+        <a:xfrm>
+          <a:off x="0" y="0"/>
+          <a:ext cx="0" cy="0"/>
+          <a:chOff x="0" y="0"/>
+          <a:chExt cx="0" cy="0"/>
+        </a:xfrm>
+      </p:grpSpPr>
+      <p:sp>
+        <p:nvSpPr>
+          <p:cNvPr id="2" name="Titel 1"/>
+          <p:cNvSpPr>
+            <a:spLocks noGrp="1"/>
+          </p:cNvSpPr>
+          <p:nvPr>
+            <p:ph type="title"/>
+          </p:nvPr>
+        </p:nvSpPr>
+        <p:spPr/>
+        <p:txBody>
+          <a:bodyPr/>
+          <a:lstStyle/>
+          <a:p>
+            <a:r>
+              <a:rPr lang="de-DE" dirty="0" err="1" smtClean="0"/>
+              <a:t>Scintilla</a:t>
+            </a:r>
+            <a:r>
+              <a:rPr lang="de-DE" dirty="0" smtClean="0"/>
+              <a:t> Integration</a:t>
+            </a:r>
+            <a:endParaRPr lang="de-DE" dirty="0"/>
+          </a:p>
+        </p:txBody>
+      </p:sp>
+      <p:sp>
+        <p:nvSpPr>
+          <p:cNvPr id="3" name="Inhaltsplatzhalter 2"/>
+          <p:cNvSpPr>
+            <a:spLocks noGrp="1"/>
+          </p:cNvSpPr>
+          <p:nvPr>
+            <p:ph idx="1"/>
+          </p:nvPr>
+        </p:nvSpPr>
+        <p:spPr/>
+        <p:txBody>
+          <a:bodyPr/>
+          <a:lstStyle/>
+          <a:p>
+            <a:endParaRPr lang="de-DE" dirty="0" smtClean="0"/>
+          </a:p>
+          <a:p>
+            <a:r>
+              <a:rPr lang="de-DE" dirty="0" smtClean="0"/>
+              <a:t>Neuer Editor mit </a:t>
+            </a:r>
+            <a:r>
+              <a:rPr lang="de-DE" dirty="0" err="1" smtClean="0"/>
+              <a:t>CreateWindow</a:t>
+            </a:r>
+            <a:endParaRPr lang="de-DE" dirty="0" smtClean="0"/>
+          </a:p>
+          <a:p>
+            <a:endParaRPr lang="de-DE" dirty="0"/>
+          </a:p>
+          <a:p>
+            <a:r>
+              <a:rPr lang="de-DE" dirty="0" err="1" smtClean="0"/>
+              <a:t>lpClassName</a:t>
+            </a:r>
+            <a:r>
+              <a:rPr lang="de-DE" dirty="0" smtClean="0"/>
+              <a:t> = </a:t>
+            </a:r>
+            <a:r>
+              <a:rPr lang="de-DE" dirty="0" err="1" smtClean="0"/>
+              <a:t>L“Scintilla</a:t>
+            </a:r>
+            <a:r>
+              <a:rPr lang="de-DE" dirty="0" smtClean="0"/>
+              <a:t>“</a:t>
+            </a:r>
+            <a:br>
+              <a:rPr lang="de-DE" dirty="0" smtClean="0"/>
+            </a:br>
+            <a:r>
+              <a:rPr lang="de-DE" dirty="0" err="1" smtClean="0"/>
+              <a:t>lpWindowName</a:t>
+            </a:r>
+            <a:r>
+              <a:rPr lang="de-DE" dirty="0" smtClean="0"/>
+              <a:t> = </a:t>
+            </a:r>
+            <a:r>
+              <a:rPr lang="de-DE" dirty="0" err="1" smtClean="0"/>
+              <a:t>L“Source</a:t>
+            </a:r>
+            <a:r>
+              <a:rPr lang="de-DE" dirty="0" smtClean="0"/>
+              <a:t>“</a:t>
+            </a:r>
+            <a:endParaRPr lang="de-DE" dirty="0"/>
+          </a:p>
+        </p:txBody>
+      </p:sp>
+    </p:spTree>
+    <p:extLst>
+      <p:ext uri="{BB962C8B-B14F-4D97-AF65-F5344CB8AC3E}">
+        <p14:creationId xmlns:p14="http://schemas.microsoft.com/office/powerpoint/2010/main" val="2892151715"/>
       </p:ext>
     </p:extLst>
   </p:cSld>
@@ -3111,7 +4499,11 @@
           <a:bodyPr/>
           <a:lstStyle/>
           <a:p>
-            <a:endParaRPr lang="de-DE"/>
+            <a:r>
+              <a:rPr lang="de-DE" dirty="0" smtClean="0"/>
+              <a:t>Inhalt</a:t>
+            </a:r>
+            <a:endParaRPr lang="de-DE" dirty="0"/>
           </a:p>
         </p:txBody>
       </p:sp>
@@ -3130,7 +4522,46 @@
           <a:bodyPr/>
           <a:lstStyle/>
           <a:p>
-            <a:endParaRPr lang="de-DE"/>
+            <a:r>
+              <a:rPr lang="de-DE" dirty="0" smtClean="0"/>
+              <a:t>Einleitung</a:t>
+            </a:r>
+          </a:p>
+          <a:p>
+            <a:r>
+              <a:rPr lang="de-DE" dirty="0" smtClean="0"/>
+              <a:t>Was ist </a:t>
+            </a:r>
+            <a:r>
+              <a:rPr lang="de-DE" dirty="0" err="1" smtClean="0"/>
+              <a:t>Scintilla</a:t>
+            </a:r>
+            <a:endParaRPr lang="de-DE" dirty="0" smtClean="0"/>
+          </a:p>
+          <a:p>
+            <a:r>
+              <a:rPr lang="de-DE" dirty="0" smtClean="0"/>
+              <a:t>Wie baut man eine Win32 Anwendung</a:t>
+            </a:r>
+            <a:endParaRPr lang="de-DE" dirty="0" smtClean="0"/>
+          </a:p>
+          <a:p>
+            <a:r>
+              <a:rPr lang="de-DE" dirty="0" smtClean="0"/>
+              <a:t>Wie integriert man </a:t>
+            </a:r>
+            <a:r>
+              <a:rPr lang="de-DE" dirty="0" err="1" smtClean="0"/>
+              <a:t>Scintilla</a:t>
+            </a:r>
+            <a:endParaRPr lang="de-DE" dirty="0" smtClean="0"/>
+          </a:p>
+          <a:p>
+            <a:r>
+              <a:rPr lang="de-DE" dirty="0" smtClean="0"/>
+              <a:t>Wie integriert man MMIX</a:t>
+            </a:r>
+            <a:endParaRPr lang="de-DE" dirty="0"/>
           </a:p>
         </p:txBody>
       </p:sp>
@@ -3138,6 +4569,1754 @@
     <p:extLst>
       <p:ext uri="{BB962C8B-B14F-4D97-AF65-F5344CB8AC3E}">
         <p14:creationId xmlns:p14="http://schemas.microsoft.com/office/powerpoint/2010/main" val="1435556123"/>
+      </p:ext>
+    </p:extLst>
+  </p:cSld>
+  <p:clrMapOvr>
+    <a:masterClrMapping/>
+  </p:clrMapOvr>
+  <p:timing>
+    <p:tnLst>
+      <p:par>
+        <p:cTn id="1" dur="indefinite" restart="never" nodeType="tmRoot"/>
+      </p:par>
+    </p:tnLst>
+  </p:timing>
+</p:sld>
+</file>
+
+<file path=ppt/slides/slide20.xml><?xml version="1.0" encoding="utf-8"?>
+<p:sld xmlns:a="http://schemas.openxmlformats.org/drawingml/2006/main" xmlns:r="http://schemas.openxmlformats.org/officeDocument/2006/relationships" xmlns:p="http://schemas.openxmlformats.org/presentationml/2006/main">
+  <p:cSld>
+    <p:spTree>
+      <p:nvGrpSpPr>
+        <p:cNvPr id="1" name=""/>
+        <p:cNvGrpSpPr/>
+        <p:nvPr/>
+      </p:nvGrpSpPr>
+      <p:grpSpPr>
+        <a:xfrm>
+          <a:off x="0" y="0"/>
+          <a:ext cx="0" cy="0"/>
+          <a:chOff x="0" y="0"/>
+          <a:chExt cx="0" cy="0"/>
+        </a:xfrm>
+      </p:grpSpPr>
+      <p:sp>
+        <p:nvSpPr>
+          <p:cNvPr id="2" name="Titel 1"/>
+          <p:cNvSpPr>
+            <a:spLocks noGrp="1"/>
+          </p:cNvSpPr>
+          <p:nvPr>
+            <p:ph type="title"/>
+          </p:nvPr>
+        </p:nvSpPr>
+        <p:spPr/>
+        <p:txBody>
+          <a:bodyPr/>
+          <a:lstStyle/>
+          <a:p>
+            <a:r>
+              <a:rPr lang="de-DE" dirty="0" err="1" smtClean="0"/>
+              <a:t>Scintilla</a:t>
+            </a:r>
+            <a:r>
+              <a:rPr lang="de-DE" dirty="0" smtClean="0"/>
+              <a:t> Integration</a:t>
+            </a:r>
+            <a:endParaRPr lang="de-DE" dirty="0"/>
+          </a:p>
+        </p:txBody>
+      </p:sp>
+      <p:sp>
+        <p:nvSpPr>
+          <p:cNvPr id="3" name="Inhaltsplatzhalter 2"/>
+          <p:cNvSpPr>
+            <a:spLocks noGrp="1"/>
+          </p:cNvSpPr>
+          <p:nvPr>
+            <p:ph idx="1"/>
+          </p:nvPr>
+        </p:nvSpPr>
+        <p:spPr/>
+        <p:txBody>
+          <a:bodyPr/>
+          <a:lstStyle/>
+          <a:p>
+            <a:endParaRPr lang="de-DE" dirty="0" smtClean="0"/>
+          </a:p>
+          <a:p>
+            <a:r>
+              <a:rPr lang="de-DE" dirty="0" err="1" smtClean="0"/>
+              <a:t>SciLexer.h</a:t>
+            </a:r>
+            <a:r>
+              <a:rPr lang="de-DE" dirty="0" smtClean="0"/>
+              <a:t> muss eingebunden sein</a:t>
+            </a:r>
+          </a:p>
+          <a:p>
+            <a:endParaRPr lang="de-DE" dirty="0"/>
+          </a:p>
+          <a:p>
+            <a:r>
+              <a:rPr lang="de-DE" dirty="0" smtClean="0"/>
+              <a:t>SciLexer.DLL muss mit </a:t>
+            </a:r>
+            <a:r>
+              <a:rPr lang="de-DE" dirty="0" err="1" smtClean="0"/>
+              <a:t>LoadLibrary</a:t>
+            </a:r>
+            <a:r>
+              <a:rPr lang="de-DE" dirty="0" smtClean="0"/>
+              <a:t> geladen werden</a:t>
+            </a:r>
+          </a:p>
+        </p:txBody>
+      </p:sp>
+    </p:spTree>
+    <p:extLst>
+      <p:ext uri="{BB962C8B-B14F-4D97-AF65-F5344CB8AC3E}">
+        <p14:creationId xmlns:p14="http://schemas.microsoft.com/office/powerpoint/2010/main" val="2018442675"/>
+      </p:ext>
+    </p:extLst>
+  </p:cSld>
+  <p:clrMapOvr>
+    <a:masterClrMapping/>
+  </p:clrMapOvr>
+  <p:timing>
+    <p:tnLst>
+      <p:par>
+        <p:cTn id="1" dur="indefinite" restart="never" nodeType="tmRoot"/>
+      </p:par>
+    </p:tnLst>
+  </p:timing>
+</p:sld>
+</file>
+
+<file path=ppt/slides/slide21.xml><?xml version="1.0" encoding="utf-8"?>
+<p:sld xmlns:a="http://schemas.openxmlformats.org/drawingml/2006/main" xmlns:r="http://schemas.openxmlformats.org/officeDocument/2006/relationships" xmlns:p="http://schemas.openxmlformats.org/presentationml/2006/main">
+  <p:cSld>
+    <p:spTree>
+      <p:nvGrpSpPr>
+        <p:cNvPr id="1" name=""/>
+        <p:cNvGrpSpPr/>
+        <p:nvPr/>
+      </p:nvGrpSpPr>
+      <p:grpSpPr>
+        <a:xfrm>
+          <a:off x="0" y="0"/>
+          <a:ext cx="0" cy="0"/>
+          <a:chOff x="0" y="0"/>
+          <a:chExt cx="0" cy="0"/>
+        </a:xfrm>
+      </p:grpSpPr>
+      <p:sp>
+        <p:nvSpPr>
+          <p:cNvPr id="2" name="Titel 1"/>
+          <p:cNvSpPr>
+            <a:spLocks noGrp="1"/>
+          </p:cNvSpPr>
+          <p:nvPr>
+            <p:ph type="title"/>
+          </p:nvPr>
+        </p:nvSpPr>
+        <p:spPr/>
+        <p:txBody>
+          <a:bodyPr/>
+          <a:lstStyle/>
+          <a:p>
+            <a:r>
+              <a:rPr lang="de-DE" dirty="0" err="1" smtClean="0"/>
+              <a:t>Scintilla</a:t>
+            </a:r>
+            <a:r>
+              <a:rPr lang="de-DE" dirty="0" smtClean="0"/>
+              <a:t> Integration</a:t>
+            </a:r>
+            <a:endParaRPr lang="de-DE" dirty="0"/>
+          </a:p>
+        </p:txBody>
+      </p:sp>
+      <p:sp>
+        <p:nvSpPr>
+          <p:cNvPr id="3" name="Inhaltsplatzhalter 2"/>
+          <p:cNvSpPr>
+            <a:spLocks noGrp="1"/>
+          </p:cNvSpPr>
+          <p:nvPr>
+            <p:ph idx="1"/>
+          </p:nvPr>
+        </p:nvSpPr>
+        <p:spPr/>
+        <p:txBody>
+          <a:bodyPr/>
+          <a:lstStyle/>
+          <a:p>
+            <a:endParaRPr lang="de-DE" dirty="0" smtClean="0"/>
+          </a:p>
+          <a:p>
+            <a:r>
+              <a:rPr lang="de-DE" dirty="0" smtClean="0"/>
+              <a:t>MMIX </a:t>
+            </a:r>
+            <a:r>
+              <a:rPr lang="de-DE" dirty="0" err="1" smtClean="0"/>
+              <a:t>Lexer</a:t>
+            </a:r>
+            <a:r>
+              <a:rPr lang="de-DE" dirty="0" smtClean="0"/>
+              <a:t> existiert bereits</a:t>
+            </a:r>
+          </a:p>
+          <a:p>
+            <a:endParaRPr lang="de-DE" dirty="0"/>
+          </a:p>
+          <a:p>
+            <a:r>
+              <a:rPr lang="de-DE" dirty="0" err="1" smtClean="0"/>
+              <a:t>SendMessage</a:t>
+            </a:r>
+            <a:r>
+              <a:rPr lang="de-DE" dirty="0" smtClean="0"/>
+              <a:t> zum Ändern des </a:t>
+            </a:r>
+            <a:r>
+              <a:rPr lang="de-DE" dirty="0" err="1" smtClean="0"/>
+              <a:t>Lexers</a:t>
+            </a:r>
+            <a:endParaRPr lang="de-DE" dirty="0" smtClean="0"/>
+          </a:p>
+          <a:p>
+            <a:endParaRPr lang="de-DE" dirty="0"/>
+          </a:p>
+          <a:p>
+            <a:r>
+              <a:rPr lang="de-DE" dirty="0" smtClean="0"/>
+              <a:t>SCI_SETLEXER und SCLEX_MMIXAL</a:t>
+            </a:r>
+            <a:endParaRPr lang="de-DE" dirty="0"/>
+          </a:p>
+        </p:txBody>
+      </p:sp>
+    </p:spTree>
+    <p:extLst>
+      <p:ext uri="{BB962C8B-B14F-4D97-AF65-F5344CB8AC3E}">
+        <p14:creationId xmlns:p14="http://schemas.microsoft.com/office/powerpoint/2010/main" val="2147253744"/>
+      </p:ext>
+    </p:extLst>
+  </p:cSld>
+  <p:clrMapOvr>
+    <a:masterClrMapping/>
+  </p:clrMapOvr>
+  <p:timing>
+    <p:tnLst>
+      <p:par>
+        <p:cTn id="1" dur="indefinite" restart="never" nodeType="tmRoot"/>
+      </p:par>
+    </p:tnLst>
+  </p:timing>
+</p:sld>
+</file>
+
+<file path=ppt/slides/slide22.xml><?xml version="1.0" encoding="utf-8"?>
+<p:sld xmlns:a="http://schemas.openxmlformats.org/drawingml/2006/main" xmlns:r="http://schemas.openxmlformats.org/officeDocument/2006/relationships" xmlns:p="http://schemas.openxmlformats.org/presentationml/2006/main">
+  <p:cSld>
+    <p:spTree>
+      <p:nvGrpSpPr>
+        <p:cNvPr id="1" name=""/>
+        <p:cNvGrpSpPr/>
+        <p:nvPr/>
+      </p:nvGrpSpPr>
+      <p:grpSpPr>
+        <a:xfrm>
+          <a:off x="0" y="0"/>
+          <a:ext cx="0" cy="0"/>
+          <a:chOff x="0" y="0"/>
+          <a:chExt cx="0" cy="0"/>
+        </a:xfrm>
+      </p:grpSpPr>
+      <p:sp>
+        <p:nvSpPr>
+          <p:cNvPr id="2" name="Titel 1"/>
+          <p:cNvSpPr>
+            <a:spLocks noGrp="1"/>
+          </p:cNvSpPr>
+          <p:nvPr>
+            <p:ph type="title"/>
+          </p:nvPr>
+        </p:nvSpPr>
+        <p:spPr/>
+        <p:txBody>
+          <a:bodyPr/>
+          <a:lstStyle/>
+          <a:p>
+            <a:r>
+              <a:rPr lang="de-DE" dirty="0" smtClean="0"/>
+              <a:t>MMIX Integration</a:t>
+            </a:r>
+            <a:endParaRPr lang="de-DE" dirty="0"/>
+          </a:p>
+        </p:txBody>
+      </p:sp>
+      <p:sp>
+        <p:nvSpPr>
+          <p:cNvPr id="3" name="Inhaltsplatzhalter 2"/>
+          <p:cNvSpPr>
+            <a:spLocks noGrp="1"/>
+          </p:cNvSpPr>
+          <p:nvPr>
+            <p:ph idx="1"/>
+          </p:nvPr>
+        </p:nvSpPr>
+        <p:spPr/>
+        <p:txBody>
+          <a:bodyPr/>
+          <a:lstStyle/>
+          <a:p>
+            <a:endParaRPr lang="de-DE" dirty="0" smtClean="0"/>
+          </a:p>
+          <a:p>
+            <a:r>
+              <a:rPr lang="de-DE" dirty="0" smtClean="0"/>
+              <a:t>MMIX Quellcode in .w Dateien</a:t>
+            </a:r>
+          </a:p>
+          <a:p>
+            <a:endParaRPr lang="de-DE" dirty="0"/>
+          </a:p>
+          <a:p>
+            <a:r>
+              <a:rPr lang="de-DE" dirty="0" smtClean="0"/>
+              <a:t>Change </a:t>
+            </a:r>
+            <a:r>
+              <a:rPr lang="de-DE" dirty="0" err="1" smtClean="0"/>
+              <a:t>files</a:t>
+            </a:r>
+            <a:r>
+              <a:rPr lang="de-DE" dirty="0" smtClean="0"/>
+              <a:t> in .</a:t>
+            </a:r>
+            <a:r>
+              <a:rPr lang="de-DE" dirty="0" err="1" smtClean="0"/>
+              <a:t>ch</a:t>
+            </a:r>
+            <a:r>
+              <a:rPr lang="de-DE" dirty="0" smtClean="0"/>
+              <a:t> Dateien</a:t>
+            </a:r>
+          </a:p>
+          <a:p>
+            <a:endParaRPr lang="de-DE" dirty="0"/>
+          </a:p>
+          <a:p>
+            <a:r>
+              <a:rPr lang="de-DE" dirty="0" smtClean="0"/>
+              <a:t>Mit </a:t>
+            </a:r>
+            <a:r>
+              <a:rPr lang="de-DE" dirty="0" err="1" smtClean="0"/>
+              <a:t>Ctangle</a:t>
+            </a:r>
+            <a:r>
+              <a:rPr lang="de-DE" dirty="0" smtClean="0"/>
+              <a:t> zu .c Dateien kompilieren</a:t>
+            </a:r>
+            <a:endParaRPr lang="de-DE" dirty="0"/>
+          </a:p>
+        </p:txBody>
+      </p:sp>
+    </p:spTree>
+    <p:extLst>
+      <p:ext uri="{BB962C8B-B14F-4D97-AF65-F5344CB8AC3E}">
+        <p14:creationId xmlns:p14="http://schemas.microsoft.com/office/powerpoint/2010/main" val="1669658461"/>
+      </p:ext>
+    </p:extLst>
+  </p:cSld>
+  <p:clrMapOvr>
+    <a:masterClrMapping/>
+  </p:clrMapOvr>
+  <p:timing>
+    <p:tnLst>
+      <p:par>
+        <p:cTn id="1" dur="indefinite" restart="never" nodeType="tmRoot"/>
+      </p:par>
+    </p:tnLst>
+  </p:timing>
+</p:sld>
+</file>
+
+<file path=ppt/slides/slide23.xml><?xml version="1.0" encoding="utf-8"?>
+<p:sld xmlns:a="http://schemas.openxmlformats.org/drawingml/2006/main" xmlns:r="http://schemas.openxmlformats.org/officeDocument/2006/relationships" xmlns:p="http://schemas.openxmlformats.org/presentationml/2006/main">
+  <p:cSld>
+    <p:spTree>
+      <p:nvGrpSpPr>
+        <p:cNvPr id="1" name=""/>
+        <p:cNvGrpSpPr/>
+        <p:nvPr/>
+      </p:nvGrpSpPr>
+      <p:grpSpPr>
+        <a:xfrm>
+          <a:off x="0" y="0"/>
+          <a:ext cx="0" cy="0"/>
+          <a:chOff x="0" y="0"/>
+          <a:chExt cx="0" cy="0"/>
+        </a:xfrm>
+      </p:grpSpPr>
+      <p:sp>
+        <p:nvSpPr>
+          <p:cNvPr id="2" name="Titel 1"/>
+          <p:cNvSpPr>
+            <a:spLocks noGrp="1"/>
+          </p:cNvSpPr>
+          <p:nvPr>
+            <p:ph type="title"/>
+          </p:nvPr>
+        </p:nvSpPr>
+        <p:spPr/>
+        <p:txBody>
+          <a:bodyPr/>
+          <a:lstStyle/>
+          <a:p>
+            <a:r>
+              <a:rPr lang="de-DE" dirty="0" smtClean="0"/>
+              <a:t>MMIX Integration</a:t>
+            </a:r>
+            <a:endParaRPr lang="de-DE" dirty="0"/>
+          </a:p>
+        </p:txBody>
+      </p:sp>
+      <p:sp>
+        <p:nvSpPr>
+          <p:cNvPr id="3" name="Inhaltsplatzhalter 2"/>
+          <p:cNvSpPr>
+            <a:spLocks noGrp="1"/>
+          </p:cNvSpPr>
+          <p:nvPr>
+            <p:ph idx="1"/>
+          </p:nvPr>
+        </p:nvSpPr>
+        <p:spPr/>
+        <p:txBody>
+          <a:bodyPr/>
+          <a:lstStyle/>
+          <a:p>
+            <a:endParaRPr lang="de-DE" dirty="0" smtClean="0"/>
+          </a:p>
+          <a:p>
+            <a:pPr marL="0" indent="0">
+              <a:buNone/>
+            </a:pPr>
+            <a:r>
+              <a:rPr lang="de-DE" dirty="0" smtClean="0"/>
+              <a:t>@x</a:t>
+            </a:r>
+          </a:p>
+          <a:p>
+            <a:pPr marL="0" indent="0">
+              <a:buNone/>
+            </a:pPr>
+            <a:r>
+              <a:rPr lang="de-DE" dirty="0" smtClean="0"/>
+              <a:t>original Text</a:t>
+            </a:r>
+          </a:p>
+          <a:p>
+            <a:pPr marL="0" indent="0">
+              <a:buNone/>
+            </a:pPr>
+            <a:r>
+              <a:rPr lang="de-DE" dirty="0" smtClean="0"/>
+              <a:t>@y</a:t>
+            </a:r>
+          </a:p>
+          <a:p>
+            <a:pPr marL="0" indent="0">
+              <a:buNone/>
+            </a:pPr>
+            <a:r>
+              <a:rPr lang="de-DE" dirty="0"/>
+              <a:t>n</a:t>
+            </a:r>
+            <a:r>
+              <a:rPr lang="de-DE" dirty="0" smtClean="0"/>
+              <a:t>euer Text</a:t>
+            </a:r>
+          </a:p>
+          <a:p>
+            <a:pPr marL="0" indent="0">
+              <a:buNone/>
+            </a:pPr>
+            <a:r>
+              <a:rPr lang="de-DE" dirty="0" smtClean="0"/>
+              <a:t>@z</a:t>
+            </a:r>
+            <a:endParaRPr lang="de-DE" dirty="0"/>
+          </a:p>
+        </p:txBody>
+      </p:sp>
+    </p:spTree>
+    <p:extLst>
+      <p:ext uri="{BB962C8B-B14F-4D97-AF65-F5344CB8AC3E}">
+        <p14:creationId xmlns:p14="http://schemas.microsoft.com/office/powerpoint/2010/main" val="3461029720"/>
+      </p:ext>
+    </p:extLst>
+  </p:cSld>
+  <p:clrMapOvr>
+    <a:masterClrMapping/>
+  </p:clrMapOvr>
+  <p:timing>
+    <p:tnLst>
+      <p:par>
+        <p:cTn id="1" dur="indefinite" restart="never" nodeType="tmRoot"/>
+      </p:par>
+    </p:tnLst>
+  </p:timing>
+</p:sld>
+</file>
+
+<file path=ppt/slides/slide24.xml><?xml version="1.0" encoding="utf-8"?>
+<p:sld xmlns:a="http://schemas.openxmlformats.org/drawingml/2006/main" xmlns:r="http://schemas.openxmlformats.org/officeDocument/2006/relationships" xmlns:p="http://schemas.openxmlformats.org/presentationml/2006/main">
+  <p:cSld>
+    <p:spTree>
+      <p:nvGrpSpPr>
+        <p:cNvPr id="1" name=""/>
+        <p:cNvGrpSpPr/>
+        <p:nvPr/>
+      </p:nvGrpSpPr>
+      <p:grpSpPr>
+        <a:xfrm>
+          <a:off x="0" y="0"/>
+          <a:ext cx="0" cy="0"/>
+          <a:chOff x="0" y="0"/>
+          <a:chExt cx="0" cy="0"/>
+        </a:xfrm>
+      </p:grpSpPr>
+      <p:sp>
+        <p:nvSpPr>
+          <p:cNvPr id="2" name="Titel 1"/>
+          <p:cNvSpPr>
+            <a:spLocks noGrp="1"/>
+          </p:cNvSpPr>
+          <p:nvPr>
+            <p:ph type="title"/>
+          </p:nvPr>
+        </p:nvSpPr>
+        <p:spPr/>
+        <p:txBody>
+          <a:bodyPr/>
+          <a:lstStyle/>
+          <a:p>
+            <a:r>
+              <a:rPr lang="de-DE" dirty="0" smtClean="0"/>
+              <a:t>MMIX Integration</a:t>
+            </a:r>
+            <a:endParaRPr lang="de-DE" dirty="0"/>
+          </a:p>
+        </p:txBody>
+      </p:sp>
+      <p:sp>
+        <p:nvSpPr>
+          <p:cNvPr id="3" name="Inhaltsplatzhalter 2"/>
+          <p:cNvSpPr>
+            <a:spLocks noGrp="1"/>
+          </p:cNvSpPr>
+          <p:nvPr>
+            <p:ph idx="1"/>
+          </p:nvPr>
+        </p:nvSpPr>
+        <p:spPr/>
+        <p:txBody>
+          <a:bodyPr/>
+          <a:lstStyle/>
+          <a:p>
+            <a:endParaRPr lang="de-DE" dirty="0" smtClean="0"/>
+          </a:p>
+          <a:p>
+            <a:r>
+              <a:rPr lang="de-DE" dirty="0" smtClean="0"/>
+              <a:t>Änderungen müssen in richtiger Reihenfolge sein</a:t>
+            </a:r>
+          </a:p>
+          <a:p>
+            <a:endParaRPr lang="de-DE" dirty="0"/>
+          </a:p>
+          <a:p>
+            <a:endParaRPr lang="de-DE" dirty="0"/>
+          </a:p>
+        </p:txBody>
+      </p:sp>
+    </p:spTree>
+    <p:extLst>
+      <p:ext uri="{BB962C8B-B14F-4D97-AF65-F5344CB8AC3E}">
+        <p14:creationId xmlns:p14="http://schemas.microsoft.com/office/powerpoint/2010/main" val="786868818"/>
+      </p:ext>
+    </p:extLst>
+  </p:cSld>
+  <p:clrMapOvr>
+    <a:masterClrMapping/>
+  </p:clrMapOvr>
+  <p:timing>
+    <p:tnLst>
+      <p:par>
+        <p:cTn id="1" dur="indefinite" restart="never" nodeType="tmRoot"/>
+      </p:par>
+    </p:tnLst>
+  </p:timing>
+</p:sld>
+</file>
+
+<file path=ppt/slides/slide25.xml><?xml version="1.0" encoding="utf-8"?>
+<p:sld xmlns:a="http://schemas.openxmlformats.org/drawingml/2006/main" xmlns:r="http://schemas.openxmlformats.org/officeDocument/2006/relationships" xmlns:p="http://schemas.openxmlformats.org/presentationml/2006/main">
+  <p:cSld>
+    <p:spTree>
+      <p:nvGrpSpPr>
+        <p:cNvPr id="1" name=""/>
+        <p:cNvGrpSpPr/>
+        <p:nvPr/>
+      </p:nvGrpSpPr>
+      <p:grpSpPr>
+        <a:xfrm>
+          <a:off x="0" y="0"/>
+          <a:ext cx="0" cy="0"/>
+          <a:chOff x="0" y="0"/>
+          <a:chExt cx="0" cy="0"/>
+        </a:xfrm>
+      </p:grpSpPr>
+      <p:sp>
+        <p:nvSpPr>
+          <p:cNvPr id="2" name="Titel 1"/>
+          <p:cNvSpPr>
+            <a:spLocks noGrp="1"/>
+          </p:cNvSpPr>
+          <p:nvPr>
+            <p:ph type="title"/>
+          </p:nvPr>
+        </p:nvSpPr>
+        <p:spPr/>
+        <p:txBody>
+          <a:bodyPr/>
+          <a:lstStyle/>
+          <a:p>
+            <a:r>
+              <a:rPr lang="de-DE" dirty="0" smtClean="0"/>
+              <a:t>MMIX Integration</a:t>
+            </a:r>
+            <a:endParaRPr lang="de-DE" dirty="0"/>
+          </a:p>
+        </p:txBody>
+      </p:sp>
+      <p:sp>
+        <p:nvSpPr>
+          <p:cNvPr id="3" name="Inhaltsplatzhalter 2"/>
+          <p:cNvSpPr>
+            <a:spLocks noGrp="1"/>
+          </p:cNvSpPr>
+          <p:nvPr>
+            <p:ph idx="1"/>
+          </p:nvPr>
+        </p:nvSpPr>
+        <p:spPr/>
+        <p:txBody>
+          <a:bodyPr/>
+          <a:lstStyle/>
+          <a:p>
+            <a:endParaRPr lang="de-DE" dirty="0" smtClean="0"/>
+          </a:p>
+          <a:p>
+            <a:r>
+              <a:rPr lang="de-DE" dirty="0" smtClean="0"/>
+              <a:t>Exit und Return müssen geändert werden</a:t>
+            </a:r>
+          </a:p>
+          <a:p>
+            <a:endParaRPr lang="de-DE" dirty="0"/>
+          </a:p>
+          <a:p>
+            <a:r>
+              <a:rPr lang="de-DE" dirty="0" err="1" smtClean="0"/>
+              <a:t>Sourcecode</a:t>
+            </a:r>
+            <a:r>
+              <a:rPr lang="de-DE" dirty="0" smtClean="0"/>
+              <a:t> muss direkt übergeben werden können</a:t>
+            </a:r>
+            <a:endParaRPr lang="de-DE" dirty="0"/>
+          </a:p>
+        </p:txBody>
+      </p:sp>
+    </p:spTree>
+    <p:extLst>
+      <p:ext uri="{BB962C8B-B14F-4D97-AF65-F5344CB8AC3E}">
+        <p14:creationId xmlns:p14="http://schemas.microsoft.com/office/powerpoint/2010/main" val="890052578"/>
+      </p:ext>
+    </p:extLst>
+  </p:cSld>
+  <p:clrMapOvr>
+    <a:masterClrMapping/>
+  </p:clrMapOvr>
+  <p:timing>
+    <p:tnLst>
+      <p:par>
+        <p:cTn id="1" dur="indefinite" restart="never" nodeType="tmRoot"/>
+      </p:par>
+    </p:tnLst>
+  </p:timing>
+</p:sld>
+</file>
+
+<file path=ppt/slides/slide26.xml><?xml version="1.0" encoding="utf-8"?>
+<p:sld xmlns:a="http://schemas.openxmlformats.org/drawingml/2006/main" xmlns:r="http://schemas.openxmlformats.org/officeDocument/2006/relationships" xmlns:p="http://schemas.openxmlformats.org/presentationml/2006/main">
+  <p:cSld>
+    <p:spTree>
+      <p:nvGrpSpPr>
+        <p:cNvPr id="1" name=""/>
+        <p:cNvGrpSpPr/>
+        <p:nvPr/>
+      </p:nvGrpSpPr>
+      <p:grpSpPr>
+        <a:xfrm>
+          <a:off x="0" y="0"/>
+          <a:ext cx="0" cy="0"/>
+          <a:chOff x="0" y="0"/>
+          <a:chExt cx="0" cy="0"/>
+        </a:xfrm>
+      </p:grpSpPr>
+      <p:sp>
+        <p:nvSpPr>
+          <p:cNvPr id="2" name="Titel 1"/>
+          <p:cNvSpPr>
+            <a:spLocks noGrp="1"/>
+          </p:cNvSpPr>
+          <p:nvPr>
+            <p:ph type="title"/>
+          </p:nvPr>
+        </p:nvSpPr>
+        <p:spPr/>
+        <p:txBody>
+          <a:bodyPr/>
+          <a:lstStyle/>
+          <a:p>
+            <a:r>
+              <a:rPr lang="de-DE" dirty="0" smtClean="0"/>
+              <a:t>MMIX Integration</a:t>
+            </a:r>
+            <a:endParaRPr lang="de-DE" dirty="0"/>
+          </a:p>
+        </p:txBody>
+      </p:sp>
+      <p:sp>
+        <p:nvSpPr>
+          <p:cNvPr id="3" name="Inhaltsplatzhalter 2"/>
+          <p:cNvSpPr>
+            <a:spLocks noGrp="1"/>
+          </p:cNvSpPr>
+          <p:nvPr>
+            <p:ph idx="1"/>
+          </p:nvPr>
+        </p:nvSpPr>
+        <p:spPr/>
+        <p:txBody>
+          <a:bodyPr/>
+          <a:lstStyle/>
+          <a:p>
+            <a:endParaRPr lang="de-DE" dirty="0" smtClean="0"/>
+          </a:p>
+          <a:p>
+            <a:r>
+              <a:rPr lang="de-DE" dirty="0" smtClean="0"/>
+              <a:t>Einstiegsfunktionen müssen Prototyp in </a:t>
+            </a:r>
+            <a:r>
+              <a:rPr lang="de-DE" dirty="0" err="1" smtClean="0"/>
+              <a:t>cpp</a:t>
+            </a:r>
+            <a:r>
+              <a:rPr lang="de-DE" dirty="0" smtClean="0"/>
+              <a:t> haben</a:t>
+            </a:r>
+            <a:endParaRPr lang="de-DE" dirty="0"/>
+          </a:p>
+          <a:p>
+            <a:endParaRPr lang="de-DE" dirty="0" smtClean="0"/>
+          </a:p>
+          <a:p>
+            <a:r>
+              <a:rPr lang="de-DE" dirty="0" smtClean="0"/>
+              <a:t>Einbindung als EXTERN_C Funktion</a:t>
+            </a:r>
+          </a:p>
+        </p:txBody>
+      </p:sp>
+    </p:spTree>
+    <p:extLst>
+      <p:ext uri="{BB962C8B-B14F-4D97-AF65-F5344CB8AC3E}">
+        <p14:creationId xmlns:p14="http://schemas.microsoft.com/office/powerpoint/2010/main" val="2369464624"/>
+      </p:ext>
+    </p:extLst>
+  </p:cSld>
+  <p:clrMapOvr>
+    <a:masterClrMapping/>
+  </p:clrMapOvr>
+  <p:timing>
+    <p:tnLst>
+      <p:par>
+        <p:cTn id="1" dur="indefinite" restart="never" nodeType="tmRoot"/>
+      </p:par>
+    </p:tnLst>
+  </p:timing>
+</p:sld>
+</file>
+
+<file path=ppt/slides/slide27.xml><?xml version="1.0" encoding="utf-8"?>
+<p:sld xmlns:a="http://schemas.openxmlformats.org/drawingml/2006/main" xmlns:r="http://schemas.openxmlformats.org/officeDocument/2006/relationships" xmlns:p="http://schemas.openxmlformats.org/presentationml/2006/main">
+  <p:cSld>
+    <p:spTree>
+      <p:nvGrpSpPr>
+        <p:cNvPr id="1" name=""/>
+        <p:cNvGrpSpPr/>
+        <p:nvPr/>
+      </p:nvGrpSpPr>
+      <p:grpSpPr>
+        <a:xfrm>
+          <a:off x="0" y="0"/>
+          <a:ext cx="0" cy="0"/>
+          <a:chOff x="0" y="0"/>
+          <a:chExt cx="0" cy="0"/>
+        </a:xfrm>
+      </p:grpSpPr>
+      <p:sp>
+        <p:nvSpPr>
+          <p:cNvPr id="2" name="Titel 1"/>
+          <p:cNvSpPr>
+            <a:spLocks noGrp="1"/>
+          </p:cNvSpPr>
+          <p:nvPr>
+            <p:ph type="title"/>
+          </p:nvPr>
+        </p:nvSpPr>
+        <p:spPr>
+          <a:xfrm>
+            <a:off x="467544" y="242325"/>
+            <a:ext cx="8229600" cy="6355027"/>
+          </a:xfrm>
+        </p:spPr>
+        <p:txBody>
+          <a:bodyPr>
+            <a:normAutofit/>
+          </a:bodyPr>
+          <a:lstStyle/>
+          <a:p>
+            <a:r>
+              <a:rPr lang="de-DE" sz="5400" dirty="0" smtClean="0"/>
+              <a:t>Fragen!</a:t>
+            </a:r>
+            <a:endParaRPr lang="de-DE" sz="5400" dirty="0"/>
+          </a:p>
+        </p:txBody>
+      </p:sp>
+    </p:spTree>
+    <p:extLst>
+      <p:ext uri="{BB962C8B-B14F-4D97-AF65-F5344CB8AC3E}">
+        <p14:creationId xmlns:p14="http://schemas.microsoft.com/office/powerpoint/2010/main" val="1033685459"/>
+      </p:ext>
+    </p:extLst>
+  </p:cSld>
+  <p:clrMapOvr>
+    <a:masterClrMapping/>
+  </p:clrMapOvr>
+  <p:timing>
+    <p:tnLst>
+      <p:par>
+        <p:cTn id="1" dur="indefinite" restart="never" nodeType="tmRoot"/>
+      </p:par>
+    </p:tnLst>
+  </p:timing>
+</p:sld>
+</file>
+
+<file path=ppt/slides/slide3.xml><?xml version="1.0" encoding="utf-8"?>
+<p:sld xmlns:a="http://schemas.openxmlformats.org/drawingml/2006/main" xmlns:r="http://schemas.openxmlformats.org/officeDocument/2006/relationships" xmlns:p="http://schemas.openxmlformats.org/presentationml/2006/main">
+  <p:cSld>
+    <p:spTree>
+      <p:nvGrpSpPr>
+        <p:cNvPr id="1" name=""/>
+        <p:cNvGrpSpPr/>
+        <p:nvPr/>
+      </p:nvGrpSpPr>
+      <p:grpSpPr>
+        <a:xfrm>
+          <a:off x="0" y="0"/>
+          <a:ext cx="0" cy="0"/>
+          <a:chOff x="0" y="0"/>
+          <a:chExt cx="0" cy="0"/>
+        </a:xfrm>
+      </p:grpSpPr>
+      <p:sp>
+        <p:nvSpPr>
+          <p:cNvPr id="2" name="Titel 1"/>
+          <p:cNvSpPr>
+            <a:spLocks noGrp="1"/>
+          </p:cNvSpPr>
+          <p:nvPr>
+            <p:ph type="title"/>
+          </p:nvPr>
+        </p:nvSpPr>
+        <p:spPr/>
+        <p:txBody>
+          <a:bodyPr/>
+          <a:lstStyle/>
+          <a:p>
+            <a:r>
+              <a:rPr lang="de-DE" dirty="0" smtClean="0"/>
+              <a:t>Einleitung</a:t>
+            </a:r>
+            <a:endParaRPr lang="de-DE" dirty="0"/>
+          </a:p>
+        </p:txBody>
+      </p:sp>
+      <p:sp>
+        <p:nvSpPr>
+          <p:cNvPr id="3" name="Inhaltsplatzhalter 2"/>
+          <p:cNvSpPr>
+            <a:spLocks noGrp="1"/>
+          </p:cNvSpPr>
+          <p:nvPr>
+            <p:ph idx="1"/>
+          </p:nvPr>
+        </p:nvSpPr>
+        <p:spPr/>
+        <p:txBody>
+          <a:bodyPr/>
+          <a:lstStyle/>
+          <a:p>
+            <a:r>
+              <a:rPr lang="de-DE" dirty="0" smtClean="0"/>
+              <a:t>Bachelorarbeit</a:t>
+            </a:r>
+          </a:p>
+          <a:p>
+            <a:endParaRPr lang="de-DE" dirty="0"/>
+          </a:p>
+          <a:p>
+            <a:endParaRPr lang="de-DE" dirty="0" smtClean="0"/>
+          </a:p>
+          <a:p>
+            <a:r>
+              <a:rPr lang="de-DE" dirty="0" smtClean="0"/>
+              <a:t>Erstellung einer MMIX IDE für Windows Systeme mit Hilfe von </a:t>
+            </a:r>
+            <a:r>
+              <a:rPr lang="de-DE" dirty="0" err="1" smtClean="0"/>
+              <a:t>Scintilla</a:t>
+            </a:r>
+            <a:endParaRPr lang="de-DE" dirty="0" smtClean="0"/>
+          </a:p>
+        </p:txBody>
+      </p:sp>
+    </p:spTree>
+    <p:extLst>
+      <p:ext uri="{BB962C8B-B14F-4D97-AF65-F5344CB8AC3E}">
+        <p14:creationId xmlns:p14="http://schemas.microsoft.com/office/powerpoint/2010/main" val="1293772593"/>
+      </p:ext>
+    </p:extLst>
+  </p:cSld>
+  <p:clrMapOvr>
+    <a:masterClrMapping/>
+  </p:clrMapOvr>
+  <p:timing>
+    <p:tnLst>
+      <p:par>
+        <p:cTn id="1" dur="indefinite" restart="never" nodeType="tmRoot"/>
+      </p:par>
+    </p:tnLst>
+  </p:timing>
+</p:sld>
+</file>
+
+<file path=ppt/slides/slide4.xml><?xml version="1.0" encoding="utf-8"?>
+<p:sld xmlns:a="http://schemas.openxmlformats.org/drawingml/2006/main" xmlns:r="http://schemas.openxmlformats.org/officeDocument/2006/relationships" xmlns:p="http://schemas.openxmlformats.org/presentationml/2006/main">
+  <p:cSld>
+    <p:spTree>
+      <p:nvGrpSpPr>
+        <p:cNvPr id="1" name=""/>
+        <p:cNvGrpSpPr/>
+        <p:nvPr/>
+      </p:nvGrpSpPr>
+      <p:grpSpPr>
+        <a:xfrm>
+          <a:off x="0" y="0"/>
+          <a:ext cx="0" cy="0"/>
+          <a:chOff x="0" y="0"/>
+          <a:chExt cx="0" cy="0"/>
+        </a:xfrm>
+      </p:grpSpPr>
+      <p:sp>
+        <p:nvSpPr>
+          <p:cNvPr id="2" name="Titel 1"/>
+          <p:cNvSpPr>
+            <a:spLocks noGrp="1"/>
+          </p:cNvSpPr>
+          <p:nvPr>
+            <p:ph type="title"/>
+          </p:nvPr>
+        </p:nvSpPr>
+        <p:spPr/>
+        <p:txBody>
+          <a:bodyPr/>
+          <a:lstStyle/>
+          <a:p>
+            <a:r>
+              <a:rPr lang="de-DE" dirty="0" smtClean="0"/>
+              <a:t>Einleitung</a:t>
+            </a:r>
+            <a:endParaRPr lang="de-DE" dirty="0"/>
+          </a:p>
+        </p:txBody>
+      </p:sp>
+      <p:sp>
+        <p:nvSpPr>
+          <p:cNvPr id="3" name="Inhaltsplatzhalter 2"/>
+          <p:cNvSpPr>
+            <a:spLocks noGrp="1"/>
+          </p:cNvSpPr>
+          <p:nvPr>
+            <p:ph idx="1"/>
+          </p:nvPr>
+        </p:nvSpPr>
+        <p:spPr/>
+        <p:txBody>
+          <a:bodyPr/>
+          <a:lstStyle/>
+          <a:p>
+            <a:pPr marL="0" indent="0">
+              <a:buNone/>
+            </a:pPr>
+            <a:r>
+              <a:rPr lang="de-DE" dirty="0" smtClean="0"/>
+              <a:t>Was war benötigt:</a:t>
+            </a:r>
+          </a:p>
+          <a:p>
+            <a:pPr marL="0" indent="0">
+              <a:buNone/>
+            </a:pPr>
+            <a:r>
+              <a:rPr lang="de-DE" dirty="0"/>
+              <a:t>	</a:t>
+            </a:r>
+            <a:endParaRPr lang="de-DE" dirty="0" smtClean="0"/>
+          </a:p>
+          <a:p>
+            <a:pPr marL="0" indent="0">
+              <a:buNone/>
+            </a:pPr>
+            <a:r>
+              <a:rPr lang="de-DE" dirty="0"/>
+              <a:t>	</a:t>
+            </a:r>
+            <a:r>
+              <a:rPr lang="de-DE" dirty="0" smtClean="0"/>
+              <a:t>- Win32 Anwendung</a:t>
+            </a:r>
+          </a:p>
+          <a:p>
+            <a:pPr marL="0" indent="0">
+              <a:buNone/>
+            </a:pPr>
+            <a:r>
+              <a:rPr lang="de-DE" dirty="0"/>
+              <a:t>	</a:t>
+            </a:r>
+            <a:r>
+              <a:rPr lang="de-DE" dirty="0" smtClean="0"/>
+              <a:t>- </a:t>
+            </a:r>
+            <a:r>
+              <a:rPr lang="de-DE" dirty="0" err="1" smtClean="0"/>
+              <a:t>Scintilla</a:t>
+            </a:r>
+            <a:r>
+              <a:rPr lang="de-DE" dirty="0" smtClean="0"/>
+              <a:t> als Editorkomponente</a:t>
+            </a:r>
+          </a:p>
+          <a:p>
+            <a:pPr marL="0" indent="0">
+              <a:buNone/>
+            </a:pPr>
+            <a:r>
+              <a:rPr lang="de-DE" dirty="0"/>
+              <a:t>	</a:t>
+            </a:r>
+            <a:r>
+              <a:rPr lang="de-DE" dirty="0" smtClean="0"/>
+              <a:t>- MMIX im Hintergrund</a:t>
+            </a:r>
+            <a:endParaRPr lang="de-DE" dirty="0"/>
+          </a:p>
+        </p:txBody>
+      </p:sp>
+    </p:spTree>
+    <p:extLst>
+      <p:ext uri="{BB962C8B-B14F-4D97-AF65-F5344CB8AC3E}">
+        <p14:creationId xmlns:p14="http://schemas.microsoft.com/office/powerpoint/2010/main" val="2487880112"/>
+      </p:ext>
+    </p:extLst>
+  </p:cSld>
+  <p:clrMapOvr>
+    <a:masterClrMapping/>
+  </p:clrMapOvr>
+  <p:timing>
+    <p:tnLst>
+      <p:par>
+        <p:cTn id="1" dur="indefinite" restart="never" nodeType="tmRoot"/>
+      </p:par>
+    </p:tnLst>
+  </p:timing>
+</p:sld>
+</file>
+
+<file path=ppt/slides/slide5.xml><?xml version="1.0" encoding="utf-8"?>
+<p:sld xmlns:a="http://schemas.openxmlformats.org/drawingml/2006/main" xmlns:r="http://schemas.openxmlformats.org/officeDocument/2006/relationships" xmlns:p="http://schemas.openxmlformats.org/presentationml/2006/main">
+  <p:cSld>
+    <p:spTree>
+      <p:nvGrpSpPr>
+        <p:cNvPr id="1" name=""/>
+        <p:cNvGrpSpPr/>
+        <p:nvPr/>
+      </p:nvGrpSpPr>
+      <p:grpSpPr>
+        <a:xfrm>
+          <a:off x="0" y="0"/>
+          <a:ext cx="0" cy="0"/>
+          <a:chOff x="0" y="0"/>
+          <a:chExt cx="0" cy="0"/>
+        </a:xfrm>
+      </p:grpSpPr>
+      <p:sp>
+        <p:nvSpPr>
+          <p:cNvPr id="2" name="Titel 1"/>
+          <p:cNvSpPr>
+            <a:spLocks noGrp="1"/>
+          </p:cNvSpPr>
+          <p:nvPr>
+            <p:ph type="title"/>
+          </p:nvPr>
+        </p:nvSpPr>
+        <p:spPr/>
+        <p:txBody>
+          <a:bodyPr/>
+          <a:lstStyle/>
+          <a:p>
+            <a:r>
+              <a:rPr lang="de-DE" dirty="0" err="1" smtClean="0"/>
+              <a:t>Scintilla</a:t>
+            </a:r>
+            <a:endParaRPr lang="de-DE" dirty="0"/>
+          </a:p>
+        </p:txBody>
+      </p:sp>
+      <p:sp>
+        <p:nvSpPr>
+          <p:cNvPr id="3" name="Inhaltsplatzhalter 2"/>
+          <p:cNvSpPr>
+            <a:spLocks noGrp="1"/>
+          </p:cNvSpPr>
+          <p:nvPr>
+            <p:ph idx="1"/>
+          </p:nvPr>
+        </p:nvSpPr>
+        <p:spPr/>
+        <p:txBody>
+          <a:bodyPr/>
+          <a:lstStyle/>
+          <a:p>
+            <a:endParaRPr lang="de-DE" dirty="0" smtClean="0"/>
+          </a:p>
+          <a:p>
+            <a:r>
+              <a:rPr lang="de-DE" dirty="0" smtClean="0"/>
+              <a:t>Texteditorkomponente</a:t>
+            </a:r>
+          </a:p>
+          <a:p>
+            <a:endParaRPr lang="de-DE" dirty="0"/>
+          </a:p>
+          <a:p>
+            <a:r>
+              <a:rPr lang="de-DE" dirty="0" smtClean="0"/>
+              <a:t>Open-Source</a:t>
+            </a:r>
+          </a:p>
+          <a:p>
+            <a:endParaRPr lang="de-DE" dirty="0"/>
+          </a:p>
+          <a:p>
+            <a:endParaRPr lang="de-DE" dirty="0"/>
+          </a:p>
+        </p:txBody>
+      </p:sp>
+    </p:spTree>
+    <p:extLst>
+      <p:ext uri="{BB962C8B-B14F-4D97-AF65-F5344CB8AC3E}">
+        <p14:creationId xmlns:p14="http://schemas.microsoft.com/office/powerpoint/2010/main" val="1273985390"/>
+      </p:ext>
+    </p:extLst>
+  </p:cSld>
+  <p:clrMapOvr>
+    <a:masterClrMapping/>
+  </p:clrMapOvr>
+  <p:timing>
+    <p:tnLst>
+      <p:par>
+        <p:cTn id="1" dur="indefinite" restart="never" nodeType="tmRoot"/>
+      </p:par>
+    </p:tnLst>
+  </p:timing>
+</p:sld>
+</file>
+
+<file path=ppt/slides/slide6.xml><?xml version="1.0" encoding="utf-8"?>
+<p:sld xmlns:a="http://schemas.openxmlformats.org/drawingml/2006/main" xmlns:r="http://schemas.openxmlformats.org/officeDocument/2006/relationships" xmlns:p="http://schemas.openxmlformats.org/presentationml/2006/main">
+  <p:cSld>
+    <p:spTree>
+      <p:nvGrpSpPr>
+        <p:cNvPr id="1" name=""/>
+        <p:cNvGrpSpPr/>
+        <p:nvPr/>
+      </p:nvGrpSpPr>
+      <p:grpSpPr>
+        <a:xfrm>
+          <a:off x="0" y="0"/>
+          <a:ext cx="0" cy="0"/>
+          <a:chOff x="0" y="0"/>
+          <a:chExt cx="0" cy="0"/>
+        </a:xfrm>
+      </p:grpSpPr>
+      <p:sp>
+        <p:nvSpPr>
+          <p:cNvPr id="2" name="Titel 1"/>
+          <p:cNvSpPr>
+            <a:spLocks noGrp="1"/>
+          </p:cNvSpPr>
+          <p:nvPr>
+            <p:ph type="title"/>
+          </p:nvPr>
+        </p:nvSpPr>
+        <p:spPr/>
+        <p:txBody>
+          <a:bodyPr>
+            <a:normAutofit/>
+          </a:bodyPr>
+          <a:lstStyle/>
+          <a:p>
+            <a:r>
+              <a:rPr lang="de-DE" dirty="0" err="1" smtClean="0"/>
+              <a:t>Scintilla</a:t>
+            </a:r>
+            <a:endParaRPr lang="de-DE" dirty="0"/>
+          </a:p>
+        </p:txBody>
+      </p:sp>
+      <p:pic>
+        <p:nvPicPr>
+          <p:cNvPr id="2050" name="Picture 2"/>
+          <p:cNvPicPr>
+            <a:picLocks noChangeAspect="1" noChangeArrowheads="1"/>
+          </p:cNvPicPr>
+          <p:nvPr/>
+        </p:nvPicPr>
+        <p:blipFill>
+          <a:blip r:embed="rId2">
+            <a:extLst>
+              <a:ext uri="{28A0092B-C50C-407E-A947-70E740481C1C}">
+                <a14:useLocalDpi xmlns:a14="http://schemas.microsoft.com/office/drawing/2010/main" val="0"/>
+              </a:ext>
+            </a:extLst>
+          </a:blip>
+          <a:srcRect/>
+          <a:stretch>
+            <a:fillRect/>
+          </a:stretch>
+        </p:blipFill>
+        <p:spPr bwMode="auto">
+          <a:xfrm>
+            <a:off x="1403648" y="2132856"/>
+            <a:ext cx="6348975" cy="2664296"/>
+          </a:xfrm>
+          <a:prstGeom prst="rect">
+            <a:avLst/>
+          </a:prstGeom>
+          <a:noFill/>
+          <a:ln>
+            <a:noFill/>
+          </a:ln>
+          <a:effectLst/>
+          <a:extLst>
+            <a:ext uri="{909E8E84-426E-40DD-AFC4-6F175D3DCCD1}">
+              <a14:hiddenFill xmlns:a14="http://schemas.microsoft.com/office/drawing/2010/main">
+                <a:solidFill>
+                  <a:schemeClr val="accent1"/>
+                </a:solidFill>
+              </a14:hiddenFill>
+            </a:ext>
+            <a:ext uri="{91240B29-F687-4F45-9708-019B960494DF}">
+              <a14:hiddenLine xmlns:a14="http://schemas.microsoft.com/office/drawing/2010/main" w="9525">
+                <a:solidFill>
+                  <a:schemeClr val="tx1"/>
+                </a:solidFill>
+                <a:miter lim="800000"/>
+                <a:headEnd/>
+                <a:tailEnd/>
+              </a14:hiddenLine>
+            </a:ext>
+            <a:ext uri="{AF507438-7753-43E0-B8FC-AC1667EBCBE1}">
+              <a14:hiddenEffects xmlns:a14="http://schemas.microsoft.com/office/drawing/2010/main">
+                <a:effectLst>
+                  <a:outerShdw dist="35921" dir="2700000" algn="ctr" rotWithShape="0">
+                    <a:schemeClr val="bg2"/>
+                  </a:outerShdw>
+                </a:effectLst>
+              </a14:hiddenEffects>
+            </a:ext>
+          </a:extLst>
+        </p:spPr>
+      </p:pic>
+    </p:spTree>
+    <p:extLst>
+      <p:ext uri="{BB962C8B-B14F-4D97-AF65-F5344CB8AC3E}">
+        <p14:creationId xmlns:p14="http://schemas.microsoft.com/office/powerpoint/2010/main" val="2258592828"/>
+      </p:ext>
+    </p:extLst>
+  </p:cSld>
+  <p:clrMapOvr>
+    <a:masterClrMapping/>
+  </p:clrMapOvr>
+  <p:timing>
+    <p:tnLst>
+      <p:par>
+        <p:cTn id="1" dur="indefinite" restart="never" nodeType="tmRoot"/>
+      </p:par>
+    </p:tnLst>
+  </p:timing>
+</p:sld>
+</file>
+
+<file path=ppt/slides/slide7.xml><?xml version="1.0" encoding="utf-8"?>
+<p:sld xmlns:a="http://schemas.openxmlformats.org/drawingml/2006/main" xmlns:r="http://schemas.openxmlformats.org/officeDocument/2006/relationships" xmlns:p="http://schemas.openxmlformats.org/presentationml/2006/main">
+  <p:cSld>
+    <p:spTree>
+      <p:nvGrpSpPr>
+        <p:cNvPr id="1" name=""/>
+        <p:cNvGrpSpPr/>
+        <p:nvPr/>
+      </p:nvGrpSpPr>
+      <p:grpSpPr>
+        <a:xfrm>
+          <a:off x="0" y="0"/>
+          <a:ext cx="0" cy="0"/>
+          <a:chOff x="0" y="0"/>
+          <a:chExt cx="0" cy="0"/>
+        </a:xfrm>
+      </p:grpSpPr>
+      <p:sp>
+        <p:nvSpPr>
+          <p:cNvPr id="2" name="Titel 1"/>
+          <p:cNvSpPr>
+            <a:spLocks noGrp="1"/>
+          </p:cNvSpPr>
+          <p:nvPr>
+            <p:ph type="title"/>
+          </p:nvPr>
+        </p:nvSpPr>
+        <p:spPr/>
+        <p:txBody>
+          <a:bodyPr/>
+          <a:lstStyle/>
+          <a:p>
+            <a:r>
+              <a:rPr lang="de-DE" dirty="0" err="1" smtClean="0"/>
+              <a:t>Scintilla</a:t>
+            </a:r>
+            <a:endParaRPr lang="de-DE" dirty="0"/>
+          </a:p>
+        </p:txBody>
+      </p:sp>
+      <p:sp>
+        <p:nvSpPr>
+          <p:cNvPr id="3" name="Inhaltsplatzhalter 2"/>
+          <p:cNvSpPr>
+            <a:spLocks noGrp="1"/>
+          </p:cNvSpPr>
+          <p:nvPr>
+            <p:ph idx="1"/>
+          </p:nvPr>
+        </p:nvSpPr>
+        <p:spPr/>
+        <p:txBody>
+          <a:bodyPr/>
+          <a:lstStyle/>
+          <a:p>
+            <a:r>
+              <a:rPr lang="de-DE" dirty="0" smtClean="0"/>
+              <a:t>Enthalten in vielen Editoren wie</a:t>
+            </a:r>
+            <a:br>
+              <a:rPr lang="de-DE" dirty="0" smtClean="0"/>
+            </a:br>
+            <a:r>
+              <a:rPr lang="de-DE" dirty="0" smtClean="0"/>
+              <a:t>	Notepad++, </a:t>
+            </a:r>
+            <a:r>
+              <a:rPr lang="de-DE" dirty="0" err="1" smtClean="0"/>
+              <a:t>SciTE</a:t>
+            </a:r>
+            <a:r>
+              <a:rPr lang="de-DE" dirty="0" smtClean="0"/>
+              <a:t>, </a:t>
+            </a:r>
+            <a:r>
+              <a:rPr lang="de-DE" dirty="0" err="1" smtClean="0"/>
+              <a:t>TeXnicCenter</a:t>
+            </a:r>
+            <a:r>
+              <a:rPr lang="de-DE" dirty="0" smtClean="0"/>
+              <a:t>, usw.</a:t>
+            </a:r>
+          </a:p>
+          <a:p>
+            <a:endParaRPr lang="de-DE" dirty="0"/>
+          </a:p>
+          <a:p>
+            <a:r>
+              <a:rPr lang="de-DE" dirty="0" smtClean="0"/>
+              <a:t>Mehrere Ports:</a:t>
+            </a:r>
+            <a:br>
+              <a:rPr lang="de-DE" dirty="0" smtClean="0"/>
+            </a:br>
+            <a:r>
+              <a:rPr lang="de-DE" dirty="0" smtClean="0"/>
+              <a:t>	Win32, MUI (</a:t>
+            </a:r>
+            <a:r>
+              <a:rPr lang="de-DE" dirty="0" err="1" smtClean="0"/>
+              <a:t>AmigaOS</a:t>
+            </a:r>
+            <a:r>
+              <a:rPr lang="de-DE" dirty="0" smtClean="0"/>
+              <a:t>),</a:t>
+            </a:r>
+            <a:br>
+              <a:rPr lang="de-DE" dirty="0" smtClean="0"/>
+            </a:br>
+            <a:r>
+              <a:rPr lang="de-DE" dirty="0" smtClean="0"/>
+              <a:t>	</a:t>
+            </a:r>
+            <a:r>
+              <a:rPr lang="de-DE" dirty="0" err="1" smtClean="0"/>
+              <a:t>Gtk</a:t>
+            </a:r>
+            <a:r>
+              <a:rPr lang="de-DE" dirty="0" smtClean="0"/>
+              <a:t> (GIMP-Toolkit), </a:t>
+            </a:r>
+            <a:r>
+              <a:rPr lang="de-DE" dirty="0" err="1" smtClean="0"/>
+              <a:t>Qt</a:t>
+            </a:r>
+            <a:r>
+              <a:rPr lang="de-DE" dirty="0" smtClean="0"/>
+              <a:t> (mit </a:t>
+            </a:r>
+            <a:r>
+              <a:rPr lang="de-DE" dirty="0" err="1" smtClean="0"/>
+              <a:t>Gtk</a:t>
+            </a:r>
+            <a:r>
+              <a:rPr lang="de-DE" dirty="0" smtClean="0"/>
+              <a:t> in X11),	usw.</a:t>
+            </a:r>
+            <a:endParaRPr lang="de-DE" dirty="0"/>
+          </a:p>
+        </p:txBody>
+      </p:sp>
+    </p:spTree>
+    <p:extLst>
+      <p:ext uri="{BB962C8B-B14F-4D97-AF65-F5344CB8AC3E}">
+        <p14:creationId xmlns:p14="http://schemas.microsoft.com/office/powerpoint/2010/main" val="3435678944"/>
+      </p:ext>
+    </p:extLst>
+  </p:cSld>
+  <p:clrMapOvr>
+    <a:masterClrMapping/>
+  </p:clrMapOvr>
+  <p:timing>
+    <p:tnLst>
+      <p:par>
+        <p:cTn id="1" dur="indefinite" restart="never" nodeType="tmRoot"/>
+      </p:par>
+    </p:tnLst>
+  </p:timing>
+</p:sld>
+</file>
+
+<file path=ppt/slides/slide8.xml><?xml version="1.0" encoding="utf-8"?>
+<p:sld xmlns:a="http://schemas.openxmlformats.org/drawingml/2006/main" xmlns:r="http://schemas.openxmlformats.org/officeDocument/2006/relationships" xmlns:p="http://schemas.openxmlformats.org/presentationml/2006/main">
+  <p:cSld>
+    <p:spTree>
+      <p:nvGrpSpPr>
+        <p:cNvPr id="1" name=""/>
+        <p:cNvGrpSpPr/>
+        <p:nvPr/>
+      </p:nvGrpSpPr>
+      <p:grpSpPr>
+        <a:xfrm>
+          <a:off x="0" y="0"/>
+          <a:ext cx="0" cy="0"/>
+          <a:chOff x="0" y="0"/>
+          <a:chExt cx="0" cy="0"/>
+        </a:xfrm>
+      </p:grpSpPr>
+      <p:sp>
+        <p:nvSpPr>
+          <p:cNvPr id="2" name="Titel 1"/>
+          <p:cNvSpPr>
+            <a:spLocks noGrp="1"/>
+          </p:cNvSpPr>
+          <p:nvPr>
+            <p:ph type="title"/>
+          </p:nvPr>
+        </p:nvSpPr>
+        <p:spPr/>
+        <p:txBody>
+          <a:bodyPr/>
+          <a:lstStyle/>
+          <a:p>
+            <a:r>
+              <a:rPr lang="de-DE" dirty="0" err="1" smtClean="0"/>
+              <a:t>Scintilla</a:t>
+            </a:r>
+            <a:endParaRPr lang="de-DE" dirty="0"/>
+          </a:p>
+        </p:txBody>
+      </p:sp>
+      <p:sp>
+        <p:nvSpPr>
+          <p:cNvPr id="3" name="Inhaltsplatzhalter 2"/>
+          <p:cNvSpPr>
+            <a:spLocks noGrp="1"/>
+          </p:cNvSpPr>
+          <p:nvPr>
+            <p:ph idx="1"/>
+          </p:nvPr>
+        </p:nvSpPr>
+        <p:spPr/>
+        <p:txBody>
+          <a:bodyPr/>
+          <a:lstStyle/>
+          <a:p>
+            <a:endParaRPr lang="de-DE" dirty="0" smtClean="0"/>
+          </a:p>
+          <a:p>
+            <a:r>
+              <a:rPr lang="de-DE" dirty="0" smtClean="0"/>
+              <a:t>Wichtige Funktionen von </a:t>
+            </a:r>
+            <a:r>
+              <a:rPr lang="de-DE" dirty="0" err="1" smtClean="0"/>
+              <a:t>Scintilla</a:t>
+            </a:r>
+            <a:r>
+              <a:rPr lang="de-DE" dirty="0" smtClean="0"/>
+              <a:t>:</a:t>
+            </a:r>
+            <a:br>
+              <a:rPr lang="de-DE" dirty="0" smtClean="0"/>
+            </a:br>
+            <a:r>
+              <a:rPr lang="de-DE" dirty="0" smtClean="0"/>
+              <a:t>	- Code-</a:t>
+            </a:r>
+            <a:r>
+              <a:rPr lang="de-DE" dirty="0" err="1" smtClean="0"/>
+              <a:t>Highlighting</a:t>
+            </a:r>
+            <a:r>
+              <a:rPr lang="de-DE" dirty="0"/>
+              <a:t/>
+            </a:r>
+            <a:br>
+              <a:rPr lang="de-DE" dirty="0"/>
+            </a:br>
+            <a:r>
+              <a:rPr lang="de-DE" dirty="0" smtClean="0"/>
+              <a:t>	- Marker-Setzung</a:t>
+            </a:r>
+            <a:br>
+              <a:rPr lang="de-DE" dirty="0" smtClean="0"/>
+            </a:br>
+            <a:r>
+              <a:rPr lang="de-DE" dirty="0" smtClean="0"/>
+              <a:t>	- Zeilennummern</a:t>
+            </a:r>
+          </a:p>
+          <a:p>
+            <a:endParaRPr lang="de-DE" dirty="0"/>
+          </a:p>
+          <a:p>
+            <a:endParaRPr lang="de-DE" dirty="0"/>
+          </a:p>
+        </p:txBody>
+      </p:sp>
+    </p:spTree>
+    <p:extLst>
+      <p:ext uri="{BB962C8B-B14F-4D97-AF65-F5344CB8AC3E}">
+        <p14:creationId xmlns:p14="http://schemas.microsoft.com/office/powerpoint/2010/main" val="4267746251"/>
+      </p:ext>
+    </p:extLst>
+  </p:cSld>
+  <p:clrMapOvr>
+    <a:masterClrMapping/>
+  </p:clrMapOvr>
+  <p:timing>
+    <p:tnLst>
+      <p:par>
+        <p:cTn id="1" dur="indefinite" restart="never" nodeType="tmRoot"/>
+      </p:par>
+    </p:tnLst>
+  </p:timing>
+</p:sld>
+</file>
+
+<file path=ppt/slides/slide9.xml><?xml version="1.0" encoding="utf-8"?>
+<p:sld xmlns:a="http://schemas.openxmlformats.org/drawingml/2006/main" xmlns:r="http://schemas.openxmlformats.org/officeDocument/2006/relationships" xmlns:p="http://schemas.openxmlformats.org/presentationml/2006/main">
+  <p:cSld>
+    <p:spTree>
+      <p:nvGrpSpPr>
+        <p:cNvPr id="1" name=""/>
+        <p:cNvGrpSpPr/>
+        <p:nvPr/>
+      </p:nvGrpSpPr>
+      <p:grpSpPr>
+        <a:xfrm>
+          <a:off x="0" y="0"/>
+          <a:ext cx="0" cy="0"/>
+          <a:chOff x="0" y="0"/>
+          <a:chExt cx="0" cy="0"/>
+        </a:xfrm>
+      </p:grpSpPr>
+      <p:sp>
+        <p:nvSpPr>
+          <p:cNvPr id="2" name="Titel 1"/>
+          <p:cNvSpPr>
+            <a:spLocks noGrp="1"/>
+          </p:cNvSpPr>
+          <p:nvPr>
+            <p:ph type="title"/>
+          </p:nvPr>
+        </p:nvSpPr>
+        <p:spPr/>
+        <p:txBody>
+          <a:bodyPr/>
+          <a:lstStyle/>
+          <a:p>
+            <a:r>
+              <a:rPr lang="de-DE" dirty="0" smtClean="0"/>
+              <a:t>Win32</a:t>
+            </a:r>
+            <a:endParaRPr lang="de-DE" dirty="0"/>
+          </a:p>
+        </p:txBody>
+      </p:sp>
+      <p:sp>
+        <p:nvSpPr>
+          <p:cNvPr id="3" name="Inhaltsplatzhalter 2"/>
+          <p:cNvSpPr>
+            <a:spLocks noGrp="1"/>
+          </p:cNvSpPr>
+          <p:nvPr>
+            <p:ph idx="1"/>
+          </p:nvPr>
+        </p:nvSpPr>
+        <p:spPr/>
+        <p:txBody>
+          <a:bodyPr/>
+          <a:lstStyle/>
+          <a:p>
+            <a:endParaRPr lang="de-DE" dirty="0"/>
+          </a:p>
+          <a:p>
+            <a:pPr marL="0" indent="0">
+              <a:buNone/>
+            </a:pPr>
+            <a:r>
+              <a:rPr lang="de-DE" dirty="0" err="1"/>
+              <a:t>i</a:t>
+            </a:r>
+            <a:r>
+              <a:rPr lang="de-DE" dirty="0" err="1" smtClean="0"/>
+              <a:t>nt</a:t>
+            </a:r>
+            <a:r>
+              <a:rPr lang="de-DE" dirty="0" smtClean="0"/>
+              <a:t> WINAPI </a:t>
+            </a:r>
+            <a:r>
+              <a:rPr lang="de-DE" dirty="0" err="1" smtClean="0"/>
+              <a:t>WinMain</a:t>
+            </a:r>
+            <a:r>
+              <a:rPr lang="de-DE" dirty="0" smtClean="0"/>
+              <a:t>([…])</a:t>
+            </a:r>
+          </a:p>
+          <a:p>
+            <a:pPr marL="0" indent="0">
+              <a:buNone/>
+            </a:pPr>
+            <a:endParaRPr lang="de-DE" dirty="0"/>
+          </a:p>
+          <a:p>
+            <a:pPr marL="0" indent="0">
+              <a:buNone/>
+            </a:pPr>
+            <a:r>
+              <a:rPr lang="de-DE" dirty="0"/>
+              <a:t> </a:t>
+            </a:r>
+            <a:r>
+              <a:rPr lang="de-DE" dirty="0" smtClean="0"/>
+              <a:t>- Einstiegspunkt in die Anwendung</a:t>
+            </a:r>
+          </a:p>
+          <a:p>
+            <a:pPr marL="0" indent="0">
+              <a:buNone/>
+            </a:pPr>
+            <a:endParaRPr lang="de-DE" dirty="0"/>
+          </a:p>
+          <a:p>
+            <a:pPr marL="0" indent="0">
+              <a:buNone/>
+            </a:pPr>
+            <a:r>
+              <a:rPr lang="de-DE" dirty="0" smtClean="0"/>
+              <a:t> - Enthält die Nachrichtenschleife</a:t>
+            </a:r>
+            <a:endParaRPr lang="de-DE" dirty="0"/>
+          </a:p>
+        </p:txBody>
+      </p:sp>
+    </p:spTree>
+    <p:extLst>
+      <p:ext uri="{BB962C8B-B14F-4D97-AF65-F5344CB8AC3E}">
+        <p14:creationId xmlns:p14="http://schemas.microsoft.com/office/powerpoint/2010/main" val="4011005880"/>
       </p:ext>
     </p:extLst>
   </p:cSld>

</xml_diff>

<commit_message>
Added pdf and Office 97-2003 versions
git-svn-id: svn://mmix.cs.hm.edu@41 bd757dd8-b88b-4aad-9aa6-ce29af76ea0b
</commit_message>
<xml_diff>
--- a/util/trunk/mmixedit/doc/MMIXEdit.pptx
+++ b/util/trunk/mmixedit/doc/MMIXEdit.pptx
@@ -13,25 +13,26 @@
     <p:sldId id="261" r:id="rId7"/>
     <p:sldId id="262" r:id="rId8"/>
     <p:sldId id="263" r:id="rId9"/>
-    <p:sldId id="264" r:id="rId10"/>
-    <p:sldId id="265" r:id="rId11"/>
-    <p:sldId id="266" r:id="rId12"/>
-    <p:sldId id="267" r:id="rId13"/>
-    <p:sldId id="268" r:id="rId14"/>
-    <p:sldId id="269" r:id="rId15"/>
-    <p:sldId id="270" r:id="rId16"/>
-    <p:sldId id="271" r:id="rId17"/>
-    <p:sldId id="272" r:id="rId18"/>
-    <p:sldId id="273" r:id="rId19"/>
-    <p:sldId id="274" r:id="rId20"/>
-    <p:sldId id="275" r:id="rId21"/>
-    <p:sldId id="276" r:id="rId22"/>
-    <p:sldId id="277" r:id="rId23"/>
-    <p:sldId id="278" r:id="rId24"/>
-    <p:sldId id="279" r:id="rId25"/>
-    <p:sldId id="280" r:id="rId26"/>
-    <p:sldId id="281" r:id="rId27"/>
-    <p:sldId id="282" r:id="rId28"/>
+    <p:sldId id="283" r:id="rId10"/>
+    <p:sldId id="264" r:id="rId11"/>
+    <p:sldId id="265" r:id="rId12"/>
+    <p:sldId id="266" r:id="rId13"/>
+    <p:sldId id="267" r:id="rId14"/>
+    <p:sldId id="268" r:id="rId15"/>
+    <p:sldId id="269" r:id="rId16"/>
+    <p:sldId id="270" r:id="rId17"/>
+    <p:sldId id="271" r:id="rId18"/>
+    <p:sldId id="272" r:id="rId19"/>
+    <p:sldId id="273" r:id="rId20"/>
+    <p:sldId id="274" r:id="rId21"/>
+    <p:sldId id="275" r:id="rId22"/>
+    <p:sldId id="276" r:id="rId23"/>
+    <p:sldId id="277" r:id="rId24"/>
+    <p:sldId id="278" r:id="rId25"/>
+    <p:sldId id="279" r:id="rId26"/>
+    <p:sldId id="280" r:id="rId27"/>
+    <p:sldId id="281" r:id="rId28"/>
+    <p:sldId id="282" r:id="rId29"/>
   </p:sldIdLst>
   <p:sldSz cx="9144000" cy="6858000" type="screen4x3"/>
   <p:notesSz cx="6858000" cy="9144000"/>
@@ -314,7 +315,7 @@
           <a:p>
             <a:fld id="{1BA50D42-C9CD-4801-B293-61D1F53EC57E}" type="datetimeFigureOut">
               <a:rPr lang="de-DE" smtClean="0"/>
-              <a:t>02.07.2013</a:t>
+              <a:t>03.07.2013</a:t>
             </a:fld>
             <a:endParaRPr lang="de-DE"/>
           </a:p>
@@ -479,7 +480,7 @@
           <a:p>
             <a:fld id="{1BA50D42-C9CD-4801-B293-61D1F53EC57E}" type="datetimeFigureOut">
               <a:rPr lang="de-DE" smtClean="0"/>
-              <a:t>02.07.2013</a:t>
+              <a:t>03.07.2013</a:t>
             </a:fld>
             <a:endParaRPr lang="de-DE"/>
           </a:p>
@@ -654,7 +655,7 @@
           <a:p>
             <a:fld id="{1BA50D42-C9CD-4801-B293-61D1F53EC57E}" type="datetimeFigureOut">
               <a:rPr lang="de-DE" smtClean="0"/>
-              <a:t>02.07.2013</a:t>
+              <a:t>03.07.2013</a:t>
             </a:fld>
             <a:endParaRPr lang="de-DE"/>
           </a:p>
@@ -819,7 +820,7 @@
           <a:p>
             <a:fld id="{1BA50D42-C9CD-4801-B293-61D1F53EC57E}" type="datetimeFigureOut">
               <a:rPr lang="de-DE" smtClean="0"/>
-              <a:t>02.07.2013</a:t>
+              <a:t>03.07.2013</a:t>
             </a:fld>
             <a:endParaRPr lang="de-DE"/>
           </a:p>
@@ -1060,7 +1061,7 @@
           <a:p>
             <a:fld id="{1BA50D42-C9CD-4801-B293-61D1F53EC57E}" type="datetimeFigureOut">
               <a:rPr lang="de-DE" smtClean="0"/>
-              <a:t>02.07.2013</a:t>
+              <a:t>03.07.2013</a:t>
             </a:fld>
             <a:endParaRPr lang="de-DE"/>
           </a:p>
@@ -1343,7 +1344,7 @@
           <a:p>
             <a:fld id="{1BA50D42-C9CD-4801-B293-61D1F53EC57E}" type="datetimeFigureOut">
               <a:rPr lang="de-DE" smtClean="0"/>
-              <a:t>02.07.2013</a:t>
+              <a:t>03.07.2013</a:t>
             </a:fld>
             <a:endParaRPr lang="de-DE"/>
           </a:p>
@@ -1760,7 +1761,7 @@
           <a:p>
             <a:fld id="{1BA50D42-C9CD-4801-B293-61D1F53EC57E}" type="datetimeFigureOut">
               <a:rPr lang="de-DE" smtClean="0"/>
-              <a:t>02.07.2013</a:t>
+              <a:t>03.07.2013</a:t>
             </a:fld>
             <a:endParaRPr lang="de-DE"/>
           </a:p>
@@ -1873,7 +1874,7 @@
           <a:p>
             <a:fld id="{1BA50D42-C9CD-4801-B293-61D1F53EC57E}" type="datetimeFigureOut">
               <a:rPr lang="de-DE" smtClean="0"/>
-              <a:t>02.07.2013</a:t>
+              <a:t>03.07.2013</a:t>
             </a:fld>
             <a:endParaRPr lang="de-DE"/>
           </a:p>
@@ -1963,7 +1964,7 @@
           <a:p>
             <a:fld id="{1BA50D42-C9CD-4801-B293-61D1F53EC57E}" type="datetimeFigureOut">
               <a:rPr lang="de-DE" smtClean="0"/>
-              <a:t>02.07.2013</a:t>
+              <a:t>03.07.2013</a:t>
             </a:fld>
             <a:endParaRPr lang="de-DE"/>
           </a:p>
@@ -2235,7 +2236,7 @@
           <a:p>
             <a:fld id="{1BA50D42-C9CD-4801-B293-61D1F53EC57E}" type="datetimeFigureOut">
               <a:rPr lang="de-DE" smtClean="0"/>
-              <a:t>02.07.2013</a:t>
+              <a:t>03.07.2013</a:t>
             </a:fld>
             <a:endParaRPr lang="de-DE"/>
           </a:p>
@@ -2483,7 +2484,7 @@
           <a:p>
             <a:fld id="{1BA50D42-C9CD-4801-B293-61D1F53EC57E}" type="datetimeFigureOut">
               <a:rPr lang="de-DE" smtClean="0"/>
-              <a:t>02.07.2013</a:t>
+              <a:t>03.07.2013</a:t>
             </a:fld>
             <a:endParaRPr lang="de-DE"/>
           </a:p>
@@ -2691,7 +2692,7 @@
           <a:p>
             <a:fld id="{1BA50D42-C9CD-4801-B293-61D1F53EC57E}" type="datetimeFigureOut">
               <a:rPr lang="de-DE" smtClean="0"/>
-              <a:t>02.07.2013</a:t>
+              <a:t>03.07.2013</a:t>
             </a:fld>
             <a:endParaRPr lang="de-DE"/>
           </a:p>
@@ -3197,53 +3198,65 @@
           <a:bodyPr/>
           <a:lstStyle/>
           <a:p>
+            <a:endParaRPr lang="de-DE" dirty="0"/>
+          </a:p>
+          <a:p>
             <a:pPr marL="0" indent="0">
               <a:buNone/>
             </a:pPr>
-            <a:endParaRPr lang="de-DE" dirty="0" smtClean="0"/>
+            <a:r>
+              <a:rPr lang="de-DE" dirty="0" err="1"/>
+              <a:t>i</a:t>
+            </a:r>
+            <a:r>
+              <a:rPr lang="de-DE" dirty="0" err="1" smtClean="0"/>
+              <a:t>nt</a:t>
+            </a:r>
+            <a:r>
+              <a:rPr lang="de-DE" dirty="0" smtClean="0"/>
+              <a:t> WINAPI </a:t>
+            </a:r>
+            <a:r>
+              <a:rPr lang="de-DE" dirty="0" err="1" smtClean="0"/>
+              <a:t>WinMain</a:t>
+            </a:r>
+            <a:r>
+              <a:rPr lang="de-DE" dirty="0" smtClean="0"/>
+              <a:t>([…])</a:t>
+            </a:r>
           </a:p>
           <a:p>
             <a:pPr marL="0" indent="0">
               <a:buNone/>
             </a:pPr>
-            <a:r>
-              <a:rPr lang="de-DE" dirty="0" smtClean="0"/>
-              <a:t>WNDCLASSEX </a:t>
-            </a:r>
-            <a:r>
-              <a:rPr lang="de-DE" dirty="0" err="1" smtClean="0"/>
-              <a:t>windowClass</a:t>
-            </a:r>
-            <a:endParaRPr lang="de-DE" dirty="0" smtClean="0"/>
+            <a:endParaRPr lang="de-DE" dirty="0"/>
           </a:p>
           <a:p>
             <a:pPr marL="0" indent="0">
               <a:buNone/>
             </a:pPr>
-            <a:endParaRPr lang="de-DE" dirty="0"/>
+            <a:r>
+              <a:rPr lang="de-DE" dirty="0"/>
+              <a:t> </a:t>
+            </a:r>
+            <a:r>
+              <a:rPr lang="de-DE" dirty="0" smtClean="0"/>
+              <a:t>- Einstiegspunkt in die Anwendung</a:t>
+            </a:r>
           </a:p>
           <a:p>
             <a:pPr marL="0" indent="0">
               <a:buNone/>
             </a:pPr>
-            <a:r>
-              <a:rPr lang="de-DE" dirty="0" smtClean="0"/>
-              <a:t> - speichert Informationen der Anwendung</a:t>
-            </a:r>
+            <a:endParaRPr lang="de-DE" dirty="0"/>
           </a:p>
           <a:p>
             <a:pPr marL="0" indent="0">
               <a:buNone/>
             </a:pPr>
-            <a:endParaRPr lang="de-DE" dirty="0"/>
-          </a:p>
-          <a:p>
-            <a:pPr marL="0" indent="0">
-              <a:buNone/>
-            </a:pPr>
-            <a:r>
-              <a:rPr lang="de-DE" dirty="0" smtClean="0"/>
-              <a:t> - benötigt zum Erstellen des Hauptfensters</a:t>
+            <a:r>
+              <a:rPr lang="de-DE" dirty="0" smtClean="0"/>
+              <a:t> - Enthält die Nachrichtenschleife</a:t>
             </a:r>
             <a:endParaRPr lang="de-DE" dirty="0"/>
           </a:p>
@@ -3252,7 +3265,7 @@
     </p:spTree>
     <p:extLst>
       <p:ext uri="{BB962C8B-B14F-4D97-AF65-F5344CB8AC3E}">
-        <p14:creationId xmlns:p14="http://schemas.microsoft.com/office/powerpoint/2010/main" val="1021439753"/>
+        <p14:creationId xmlns:p14="http://schemas.microsoft.com/office/powerpoint/2010/main" val="4011005880"/>
       </p:ext>
     </p:extLst>
   </p:cSld>
@@ -3335,16 +3348,13 @@
             </a:pPr>
             <a:r>
               <a:rPr lang="de-DE" dirty="0" smtClean="0"/>
-              <a:t>Atom WINAPI </a:t>
+              <a:t>WNDCLASSEX </a:t>
             </a:r>
             <a:r>
               <a:rPr lang="de-DE" dirty="0" err="1" smtClean="0"/>
-              <a:t>RegisterClassEx</a:t>
-            </a:r>
-            <a:r>
-              <a:rPr lang="de-DE" dirty="0" smtClean="0"/>
-              <a:t>([…])</a:t>
-            </a:r>
+              <a:t>windowClass</a:t>
+            </a:r>
+            <a:endParaRPr lang="de-DE" dirty="0" smtClean="0"/>
           </a:p>
           <a:p>
             <a:pPr marL="0" indent="0">
@@ -3358,7 +3368,7 @@
             </a:pPr>
             <a:r>
               <a:rPr lang="de-DE" dirty="0" smtClean="0"/>
-              <a:t> - Registrieren des Hauptfensters</a:t>
+              <a:t> - speichert Informationen der Anwendung</a:t>
             </a:r>
           </a:p>
           <a:p>
@@ -3372,12 +3382,8 @@
               <a:buNone/>
             </a:pPr>
             <a:r>
-              <a:rPr lang="de-DE" dirty="0"/>
-              <a:t> </a:t>
-            </a:r>
-            <a:r>
-              <a:rPr lang="de-DE" dirty="0" smtClean="0"/>
-              <a:t>- benötigt die WNDCLASSEX</a:t>
+              <a:rPr lang="de-DE" dirty="0" smtClean="0"/>
+              <a:t> - benötigt zum Erstellen des Hauptfensters</a:t>
             </a:r>
             <a:endParaRPr lang="de-DE" dirty="0"/>
           </a:p>
@@ -3386,7 +3392,7 @@
     </p:spTree>
     <p:extLst>
       <p:ext uri="{BB962C8B-B14F-4D97-AF65-F5344CB8AC3E}">
-        <p14:creationId xmlns:p14="http://schemas.microsoft.com/office/powerpoint/2010/main" val="3333458768"/>
+        <p14:creationId xmlns:p14="http://schemas.microsoft.com/office/powerpoint/2010/main" val="1021439753"/>
       </p:ext>
     </p:extLst>
   </p:cSld>
@@ -3469,11 +3475,11 @@
             </a:pPr>
             <a:r>
               <a:rPr lang="de-DE" dirty="0" smtClean="0"/>
-              <a:t>HWND WINAPI </a:t>
+              <a:t>Atom WINAPI </a:t>
             </a:r>
             <a:r>
               <a:rPr lang="de-DE" dirty="0" err="1" smtClean="0"/>
-              <a:t>CreateWindow</a:t>
+              <a:t>RegisterClassEx</a:t>
             </a:r>
             <a:r>
               <a:rPr lang="de-DE" dirty="0" smtClean="0"/>
@@ -3492,7 +3498,7 @@
             </a:pPr>
             <a:r>
               <a:rPr lang="de-DE" dirty="0" smtClean="0"/>
-              <a:t> - erstellt registriertes Hauptfenster</a:t>
+              <a:t> - Registrieren des Hauptfensters</a:t>
             </a:r>
           </a:p>
           <a:p>
@@ -3506,8 +3512,12 @@
               <a:buNone/>
             </a:pPr>
             <a:r>
-              <a:rPr lang="de-DE" dirty="0" smtClean="0"/>
-              <a:t> - gibt Handle des Fensters zurück</a:t>
+              <a:rPr lang="de-DE" dirty="0"/>
+              <a:t> </a:t>
+            </a:r>
+            <a:r>
+              <a:rPr lang="de-DE" dirty="0" smtClean="0"/>
+              <a:t>- benötigt die WNDCLASSEX</a:t>
             </a:r>
             <a:endParaRPr lang="de-DE" dirty="0"/>
           </a:p>
@@ -3516,7 +3526,7 @@
     </p:spTree>
     <p:extLst>
       <p:ext uri="{BB962C8B-B14F-4D97-AF65-F5344CB8AC3E}">
-        <p14:creationId xmlns:p14="http://schemas.microsoft.com/office/powerpoint/2010/main" val="1168424612"/>
+        <p14:creationId xmlns:p14="http://schemas.microsoft.com/office/powerpoint/2010/main" val="3333458768"/>
       </p:ext>
     </p:extLst>
   </p:cSld>
@@ -3599,11 +3609,11 @@
             </a:pPr>
             <a:r>
               <a:rPr lang="de-DE" dirty="0" smtClean="0"/>
-              <a:t>BOOL WINAPI </a:t>
+              <a:t>HWND WINAPI </a:t>
             </a:r>
             <a:r>
               <a:rPr lang="de-DE" dirty="0" err="1" smtClean="0"/>
-              <a:t>ShowWindow</a:t>
+              <a:t>CreateWindow</a:t>
             </a:r>
             <a:r>
               <a:rPr lang="de-DE" dirty="0" smtClean="0"/>
@@ -3622,7 +3632,7 @@
             </a:pPr>
             <a:r>
               <a:rPr lang="de-DE" dirty="0" smtClean="0"/>
-              <a:t> - ändert Sichtbarkeit des angegebenen Fensters</a:t>
+              <a:t> - erstellt registriertes Hauptfenster</a:t>
             </a:r>
           </a:p>
           <a:p>
@@ -3637,7 +3647,7 @@
             </a:pPr>
             <a:r>
               <a:rPr lang="de-DE" dirty="0" smtClean="0"/>
-              <a:t> - Minimierung oder Maximierung möglich</a:t>
+              <a:t> - gibt Handle des Fensters zurück</a:t>
             </a:r>
             <a:endParaRPr lang="de-DE" dirty="0"/>
           </a:p>
@@ -3646,7 +3656,7 @@
     </p:spTree>
     <p:extLst>
       <p:ext uri="{BB962C8B-B14F-4D97-AF65-F5344CB8AC3E}">
-        <p14:creationId xmlns:p14="http://schemas.microsoft.com/office/powerpoint/2010/main" val="141720191"/>
+        <p14:creationId xmlns:p14="http://schemas.microsoft.com/office/powerpoint/2010/main" val="1168424612"/>
       </p:ext>
     </p:extLst>
   </p:cSld>
@@ -3729,7 +3739,15 @@
             </a:pPr>
             <a:r>
               <a:rPr lang="de-DE" dirty="0" smtClean="0"/>
-              <a:t>Nachrichtenschleife</a:t>
+              <a:t>BOOL WINAPI </a:t>
+            </a:r>
+            <a:r>
+              <a:rPr lang="de-DE" dirty="0" err="1" smtClean="0"/>
+              <a:t>ShowWindow</a:t>
+            </a:r>
+            <a:r>
+              <a:rPr lang="de-DE" dirty="0" smtClean="0"/>
+              <a:t>([…])</a:t>
             </a:r>
           </a:p>
           <a:p>
@@ -3744,21 +3762,8 @@
             </a:pPr>
             <a:r>
               <a:rPr lang="de-DE" dirty="0" smtClean="0"/>
-              <a:t> - </a:t>
-            </a:r>
-            <a:r>
-              <a:rPr lang="de-DE" dirty="0" err="1" smtClean="0"/>
-              <a:t>while</a:t>
-            </a:r>
-            <a:r>
-              <a:rPr lang="de-DE" dirty="0" smtClean="0"/>
-              <a:t> mit </a:t>
-            </a:r>
-            <a:r>
-              <a:rPr lang="de-DE" dirty="0" err="1" smtClean="0"/>
-              <a:t>GetMessage</a:t>
-            </a:r>
-            <a:endParaRPr lang="de-DE" dirty="0" smtClean="0"/>
+              <a:t> - ändert Sichtbarkeit des angegebenen Fensters</a:t>
+            </a:r>
           </a:p>
           <a:p>
             <a:pPr marL="0" indent="0">
@@ -3772,7 +3777,7 @@
             </a:pPr>
             <a:r>
               <a:rPr lang="de-DE" dirty="0" smtClean="0"/>
-              <a:t> - leitet Nachrichten weiter</a:t>
+              <a:t> - Minimierung oder Maximierung möglich</a:t>
             </a:r>
             <a:endParaRPr lang="de-DE" dirty="0"/>
           </a:p>
@@ -3781,7 +3786,7 @@
     </p:spTree>
     <p:extLst>
       <p:ext uri="{BB962C8B-B14F-4D97-AF65-F5344CB8AC3E}">
-        <p14:creationId xmlns:p14="http://schemas.microsoft.com/office/powerpoint/2010/main" val="1405832138"/>
+        <p14:creationId xmlns:p14="http://schemas.microsoft.com/office/powerpoint/2010/main" val="141720191"/>
       </p:ext>
     </p:extLst>
   </p:cSld>
@@ -3864,16 +3869,36 @@
             </a:pPr>
             <a:r>
               <a:rPr lang="de-DE" dirty="0" smtClean="0"/>
-              <a:t>BOOL WINAPI </a:t>
+              <a:t>Nachrichtenschleife</a:t>
+            </a:r>
+          </a:p>
+          <a:p>
+            <a:pPr marL="0" indent="0">
+              <a:buNone/>
+            </a:pPr>
+            <a:endParaRPr lang="de-DE" dirty="0"/>
+          </a:p>
+          <a:p>
+            <a:pPr marL="0" indent="0">
+              <a:buNone/>
+            </a:pPr>
+            <a:r>
+              <a:rPr lang="de-DE" dirty="0" smtClean="0"/>
+              <a:t> - </a:t>
+            </a:r>
+            <a:r>
+              <a:rPr lang="de-DE" dirty="0" err="1" smtClean="0"/>
+              <a:t>while</a:t>
+            </a:r>
+            <a:r>
+              <a:rPr lang="de-DE" dirty="0" smtClean="0"/>
+              <a:t> mit </a:t>
             </a:r>
             <a:r>
               <a:rPr lang="de-DE" dirty="0" err="1" smtClean="0"/>
               <a:t>GetMessage</a:t>
             </a:r>
-            <a:r>
-              <a:rPr lang="de-DE" dirty="0" smtClean="0"/>
-              <a:t>([…])</a:t>
-            </a:r>
+            <a:endParaRPr lang="de-DE" dirty="0" smtClean="0"/>
           </a:p>
           <a:p>
             <a:pPr marL="0" indent="0">
@@ -3887,27 +3912,7 @@
             </a:pPr>
             <a:r>
               <a:rPr lang="de-DE" dirty="0" smtClean="0"/>
-              <a:t> - holt oberste Nachricht von </a:t>
-            </a:r>
-            <a:r>
-              <a:rPr lang="de-DE" dirty="0" err="1" smtClean="0"/>
-              <a:t>Messagequeue</a:t>
-            </a:r>
-            <a:endParaRPr lang="de-DE" dirty="0" smtClean="0"/>
-          </a:p>
-          <a:p>
-            <a:pPr marL="0" indent="0">
-              <a:buNone/>
-            </a:pPr>
-            <a:endParaRPr lang="de-DE" dirty="0"/>
-          </a:p>
-          <a:p>
-            <a:pPr marL="0" indent="0">
-              <a:buNone/>
-            </a:pPr>
-            <a:r>
-              <a:rPr lang="de-DE" dirty="0" smtClean="0"/>
-              <a:t> - filtert Nachrichten nach Kriterien</a:t>
+              <a:t> - leitet Nachrichten weiter</a:t>
             </a:r>
             <a:endParaRPr lang="de-DE" dirty="0"/>
           </a:p>
@@ -3916,7 +3921,7 @@
     </p:spTree>
     <p:extLst>
       <p:ext uri="{BB962C8B-B14F-4D97-AF65-F5344CB8AC3E}">
-        <p14:creationId xmlns:p14="http://schemas.microsoft.com/office/powerpoint/2010/main" val="3103746599"/>
+        <p14:creationId xmlns:p14="http://schemas.microsoft.com/office/powerpoint/2010/main" val="1405832138"/>
       </p:ext>
     </p:extLst>
   </p:cSld>
@@ -3999,11 +4004,11 @@
             </a:pPr>
             <a:r>
               <a:rPr lang="de-DE" dirty="0" smtClean="0"/>
-              <a:t>LRESULT WINAPI </a:t>
+              <a:t>BOOL WINAPI </a:t>
             </a:r>
             <a:r>
               <a:rPr lang="de-DE" dirty="0" err="1" smtClean="0"/>
-              <a:t>DispatchMessage</a:t>
+              <a:t>GetMessage</a:t>
             </a:r>
             <a:r>
               <a:rPr lang="de-DE" dirty="0" smtClean="0"/>
@@ -4022,8 +4027,13 @@
             </a:pPr>
             <a:r>
               <a:rPr lang="de-DE" dirty="0" smtClean="0"/>
-              <a:t> - leitet Nachricht an richtiges Fenster weiter</a:t>
-            </a:r>
+              <a:t> - holt oberste Nachricht von </a:t>
+            </a:r>
+            <a:r>
+              <a:rPr lang="de-DE" dirty="0" err="1" smtClean="0"/>
+              <a:t>Messagequeue</a:t>
+            </a:r>
+            <a:endParaRPr lang="de-DE" dirty="0" smtClean="0"/>
           </a:p>
           <a:p>
             <a:pPr marL="0" indent="0">
@@ -4037,11 +4047,7 @@
             </a:pPr>
             <a:r>
               <a:rPr lang="de-DE" dirty="0" smtClean="0"/>
-              <a:t> - bei Hauptfenster an </a:t>
-            </a:r>
-            <a:r>
-              <a:rPr lang="de-DE" dirty="0" err="1" smtClean="0"/>
-              <a:t>WndProc</a:t>
+              <a:t> - filtert Nachrichten nach Kriterien</a:t>
             </a:r>
             <a:endParaRPr lang="de-DE" dirty="0"/>
           </a:p>
@@ -4050,7 +4056,7 @@
     </p:spTree>
     <p:extLst>
       <p:ext uri="{BB962C8B-B14F-4D97-AF65-F5344CB8AC3E}">
-        <p14:creationId xmlns:p14="http://schemas.microsoft.com/office/powerpoint/2010/main" val="3000571530"/>
+        <p14:creationId xmlns:p14="http://schemas.microsoft.com/office/powerpoint/2010/main" val="3103746599"/>
       </p:ext>
     </p:extLst>
   </p:cSld>
@@ -4133,45 +4139,49 @@
             </a:pPr>
             <a:r>
               <a:rPr lang="de-DE" dirty="0" smtClean="0"/>
-              <a:t>LRESULT CALLBACK </a:t>
+              <a:t>LRESULT WINAPI </a:t>
+            </a:r>
+            <a:r>
+              <a:rPr lang="de-DE" dirty="0" err="1" smtClean="0"/>
+              <a:t>DispatchMessage</a:t>
+            </a:r>
+            <a:r>
+              <a:rPr lang="de-DE" dirty="0" smtClean="0"/>
+              <a:t>([…])</a:t>
+            </a:r>
+          </a:p>
+          <a:p>
+            <a:pPr marL="0" indent="0">
+              <a:buNone/>
+            </a:pPr>
+            <a:endParaRPr lang="de-DE" dirty="0"/>
+          </a:p>
+          <a:p>
+            <a:pPr marL="0" indent="0">
+              <a:buNone/>
+            </a:pPr>
+            <a:r>
+              <a:rPr lang="de-DE" dirty="0" smtClean="0"/>
+              <a:t> - leitet Nachricht an richtiges Fenster weiter</a:t>
+            </a:r>
+          </a:p>
+          <a:p>
+            <a:pPr marL="0" indent="0">
+              <a:buNone/>
+            </a:pPr>
+            <a:endParaRPr lang="de-DE" dirty="0"/>
+          </a:p>
+          <a:p>
+            <a:pPr marL="0" indent="0">
+              <a:buNone/>
+            </a:pPr>
+            <a:r>
+              <a:rPr lang="de-DE" dirty="0" smtClean="0"/>
+              <a:t> - bei Hauptfenster an </a:t>
             </a:r>
             <a:r>
               <a:rPr lang="de-DE" dirty="0" err="1" smtClean="0"/>
               <a:t>WndProc</a:t>
-            </a:r>
-            <a:r>
-              <a:rPr lang="de-DE" dirty="0" smtClean="0"/>
-              <a:t>([…])</a:t>
-            </a:r>
-          </a:p>
-          <a:p>
-            <a:pPr marL="0" indent="0">
-              <a:buNone/>
-            </a:pPr>
-            <a:endParaRPr lang="de-DE" dirty="0"/>
-          </a:p>
-          <a:p>
-            <a:pPr marL="0" indent="0">
-              <a:buNone/>
-            </a:pPr>
-            <a:r>
-              <a:rPr lang="de-DE" dirty="0" smtClean="0"/>
-              <a:t> - verarbeitet Nachrichten an Fenster</a:t>
-            </a:r>
-          </a:p>
-          <a:p>
-            <a:pPr marL="0" indent="0">
-              <a:buNone/>
-            </a:pPr>
-            <a:endParaRPr lang="de-DE" dirty="0"/>
-          </a:p>
-          <a:p>
-            <a:pPr marL="0" indent="0">
-              <a:buNone/>
-            </a:pPr>
-            <a:r>
-              <a:rPr lang="de-DE" dirty="0" smtClean="0"/>
-              <a:t> - muss WNDCLASSEX zugeordnet werden</a:t>
             </a:r>
             <a:endParaRPr lang="de-DE" dirty="0"/>
           </a:p>
@@ -4180,7 +4190,7 @@
     </p:spTree>
     <p:extLst>
       <p:ext uri="{BB962C8B-B14F-4D97-AF65-F5344CB8AC3E}">
-        <p14:creationId xmlns:p14="http://schemas.microsoft.com/office/powerpoint/2010/main" val="3248034319"/>
+        <p14:creationId xmlns:p14="http://schemas.microsoft.com/office/powerpoint/2010/main" val="3000571530"/>
       </p:ext>
     </p:extLst>
   </p:cSld>
@@ -4230,12 +4240,8 @@
           <a:lstStyle/>
           <a:p>
             <a:r>
-              <a:rPr lang="de-DE" dirty="0" err="1" smtClean="0"/>
-              <a:t>Scintilla</a:t>
-            </a:r>
-            <a:r>
-              <a:rPr lang="de-DE" dirty="0" smtClean="0"/>
-              <a:t> Integration</a:t>
+              <a:rPr lang="de-DE" dirty="0" smtClean="0"/>
+              <a:t>Win32</a:t>
             </a:r>
             <a:endParaRPr lang="de-DE" dirty="0"/>
           </a:p>
@@ -4262,51 +4268,50 @@
             <a:endParaRPr lang="de-DE" dirty="0" smtClean="0"/>
           </a:p>
           <a:p>
+            <a:pPr marL="0" indent="0">
+              <a:buNone/>
+            </a:pPr>
+            <a:r>
+              <a:rPr lang="de-DE" dirty="0" smtClean="0"/>
+              <a:t>LRESULT CALLBACK </a:t>
+            </a:r>
             <a:r>
               <a:rPr lang="de-DE" dirty="0" err="1" smtClean="0"/>
-              <a:t>Scintilla.h</a:t>
-            </a:r>
-            <a:r>
-              <a:rPr lang="de-DE" dirty="0"/>
-              <a:t/>
-            </a:r>
-            <a:br>
-              <a:rPr lang="de-DE" dirty="0"/>
-            </a:br>
-            <a:r>
-              <a:rPr lang="de-DE" dirty="0" smtClean="0"/>
-              <a:t>	muss </a:t>
-            </a:r>
-            <a:r>
-              <a:rPr lang="de-DE" dirty="0" err="1" smtClean="0"/>
-              <a:t>includiert</a:t>
-            </a:r>
-            <a:r>
-              <a:rPr lang="de-DE" dirty="0" smtClean="0"/>
-              <a:t> werden</a:t>
-            </a:r>
-          </a:p>
-          <a:p>
-            <a:endParaRPr lang="de-DE" dirty="0"/>
-          </a:p>
-          <a:p>
-            <a:r>
-              <a:rPr lang="de-DE" dirty="0" smtClean="0"/>
-              <a:t>Scintilla.dll</a:t>
-            </a:r>
-            <a:br>
-              <a:rPr lang="de-DE" dirty="0" smtClean="0"/>
-            </a:br>
-            <a:r>
-              <a:rPr lang="de-DE" dirty="0" smtClean="0"/>
-              <a:t>	brauch nicht eingebunden werden</a:t>
-            </a:r>
-            <a:br>
-              <a:rPr lang="de-DE" dirty="0" smtClean="0"/>
-            </a:br>
-            <a:r>
-              <a:rPr lang="de-DE" dirty="0" smtClean="0"/>
-              <a:t>	muss nur in Ordner sein</a:t>
+              <a:t>WndProc</a:t>
+            </a:r>
+            <a:r>
+              <a:rPr lang="de-DE" dirty="0" smtClean="0"/>
+              <a:t>([…])</a:t>
+            </a:r>
+          </a:p>
+          <a:p>
+            <a:pPr marL="0" indent="0">
+              <a:buNone/>
+            </a:pPr>
+            <a:endParaRPr lang="de-DE" dirty="0"/>
+          </a:p>
+          <a:p>
+            <a:pPr marL="0" indent="0">
+              <a:buNone/>
+            </a:pPr>
+            <a:r>
+              <a:rPr lang="de-DE" dirty="0" smtClean="0"/>
+              <a:t> - verarbeitet Nachrichten an Fenster</a:t>
+            </a:r>
+          </a:p>
+          <a:p>
+            <a:pPr marL="0" indent="0">
+              <a:buNone/>
+            </a:pPr>
+            <a:endParaRPr lang="de-DE" dirty="0"/>
+          </a:p>
+          <a:p>
+            <a:pPr marL="0" indent="0">
+              <a:buNone/>
+            </a:pPr>
+            <a:r>
+              <a:rPr lang="de-DE" dirty="0" smtClean="0"/>
+              <a:t> - muss WNDCLASSEX zugeordnet werden</a:t>
             </a:r>
             <a:endParaRPr lang="de-DE" dirty="0"/>
           </a:p>
@@ -4315,7 +4320,7 @@
     </p:spTree>
     <p:extLst>
       <p:ext uri="{BB962C8B-B14F-4D97-AF65-F5344CB8AC3E}">
-        <p14:creationId xmlns:p14="http://schemas.microsoft.com/office/powerpoint/2010/main" val="2755479760"/>
+        <p14:creationId xmlns:p14="http://schemas.microsoft.com/office/powerpoint/2010/main" val="3248034319"/>
       </p:ext>
     </p:extLst>
   </p:cSld>
@@ -4391,57 +4396,57 @@
           <a:bodyPr/>
           <a:lstStyle/>
           <a:p>
+            <a:pPr marL="0" indent="0">
+              <a:buNone/>
+            </a:pPr>
             <a:endParaRPr lang="de-DE" dirty="0" smtClean="0"/>
           </a:p>
           <a:p>
             <a:r>
-              <a:rPr lang="de-DE" dirty="0" smtClean="0"/>
-              <a:t>Neuer Editor mit </a:t>
-            </a:r>
-            <a:r>
               <a:rPr lang="de-DE" dirty="0" err="1" smtClean="0"/>
-              <a:t>CreateWindow</a:t>
-            </a:r>
-            <a:endParaRPr lang="de-DE" dirty="0" smtClean="0"/>
-          </a:p>
-          <a:p>
-            <a:endParaRPr lang="de-DE" dirty="0"/>
-          </a:p>
-          <a:p>
+              <a:t>Scintilla.h</a:t>
+            </a:r>
+            <a:r>
+              <a:rPr lang="de-DE" dirty="0"/>
+              <a:t/>
+            </a:r>
+            <a:br>
+              <a:rPr lang="de-DE" dirty="0"/>
+            </a:br>
+            <a:r>
+              <a:rPr lang="de-DE" dirty="0" smtClean="0"/>
+              <a:t>	muss </a:t>
+            </a:r>
             <a:r>
               <a:rPr lang="de-DE" dirty="0" err="1" smtClean="0"/>
-              <a:t>lpClassName</a:t>
-            </a:r>
-            <a:r>
-              <a:rPr lang="de-DE" dirty="0" smtClean="0"/>
-              <a:t> = </a:t>
-            </a:r>
-            <a:r>
-              <a:rPr lang="de-DE" dirty="0" err="1" smtClean="0"/>
-              <a:t>L“Scintilla</a:t>
-            </a:r>
-            <a:r>
-              <a:rPr lang="de-DE" dirty="0" smtClean="0"/>
-              <a:t>“</a:t>
+              <a:t>includiert</a:t>
+            </a:r>
+            <a:r>
+              <a:rPr lang="de-DE" dirty="0" smtClean="0"/>
+              <a:t> werden</a:t>
+            </a:r>
+          </a:p>
+          <a:p>
+            <a:endParaRPr lang="de-DE" dirty="0"/>
+          </a:p>
+          <a:p>
+            <a:r>
+              <a:rPr lang="de-DE" dirty="0" smtClean="0"/>
+              <a:t>Scintilla.dll</a:t>
             </a:r>
             <a:br>
               <a:rPr lang="de-DE" dirty="0" smtClean="0"/>
             </a:br>
             <a:r>
-              <a:rPr lang="de-DE" dirty="0" err="1" smtClean="0"/>
-              <a:t>lpWindowName</a:t>
-            </a:r>
-            <a:r>
-              <a:rPr lang="de-DE" dirty="0" smtClean="0"/>
-              <a:t> = </a:t>
-            </a:r>
-            <a:r>
-              <a:rPr lang="de-DE" dirty="0" err="1" smtClean="0"/>
-              <a:t>L“Source</a:t>
-            </a:r>
-            <a:r>
-              <a:rPr lang="de-DE" dirty="0" smtClean="0"/>
-              <a:t>“</a:t>
+              <a:rPr lang="de-DE" dirty="0" smtClean="0"/>
+              <a:t>	brauch nicht eingebunden werden</a:t>
+            </a:r>
+            <a:br>
+              <a:rPr lang="de-DE" dirty="0" smtClean="0"/>
+            </a:br>
+            <a:r>
+              <a:rPr lang="de-DE" dirty="0" smtClean="0"/>
+              <a:t>	muss nur in Ordner sein</a:t>
             </a:r>
             <a:endParaRPr lang="de-DE" dirty="0"/>
           </a:p>
@@ -4450,7 +4455,7 @@
     </p:spTree>
     <p:extLst>
       <p:ext uri="{BB962C8B-B14F-4D97-AF65-F5344CB8AC3E}">
-        <p14:creationId xmlns:p14="http://schemas.microsoft.com/office/powerpoint/2010/main" val="2892151715"/>
+        <p14:creationId xmlns:p14="http://schemas.microsoft.com/office/powerpoint/2010/main" val="2755479760"/>
       </p:ext>
     </p:extLst>
   </p:cSld>
@@ -4543,7 +4548,6 @@
               <a:rPr lang="de-DE" dirty="0" smtClean="0"/>
               <a:t>Wie baut man eine Win32 Anwendung</a:t>
             </a:r>
-            <a:endParaRPr lang="de-DE" dirty="0" smtClean="0"/>
           </a:p>
           <a:p>
             <a:r>
@@ -4648,37 +4652,62 @@
           </a:p>
           <a:p>
             <a:r>
+              <a:rPr lang="de-DE" dirty="0" smtClean="0"/>
+              <a:t>Neuer Editor mit </a:t>
+            </a:r>
+            <a:r>
               <a:rPr lang="de-DE" dirty="0" err="1" smtClean="0"/>
-              <a:t>SciLexer.h</a:t>
-            </a:r>
-            <a:r>
-              <a:rPr lang="de-DE" dirty="0" smtClean="0"/>
-              <a:t> muss eingebunden sein</a:t>
-            </a:r>
-          </a:p>
-          <a:p>
-            <a:endParaRPr lang="de-DE" dirty="0"/>
-          </a:p>
-          <a:p>
-            <a:r>
-              <a:rPr lang="de-DE" dirty="0" smtClean="0"/>
-              <a:t>SciLexer.DLL muss mit </a:t>
-            </a:r>
+              <a:t>CreateWindow</a:t>
+            </a:r>
+            <a:endParaRPr lang="de-DE" dirty="0" smtClean="0"/>
+          </a:p>
+          <a:p>
+            <a:endParaRPr lang="de-DE" dirty="0"/>
+          </a:p>
+          <a:p>
             <a:r>
               <a:rPr lang="de-DE" dirty="0" err="1" smtClean="0"/>
-              <a:t>LoadLibrary</a:t>
-            </a:r>
-            <a:r>
-              <a:rPr lang="de-DE" dirty="0" smtClean="0"/>
-              <a:t> geladen werden</a:t>
-            </a:r>
+              <a:t>lpClassName</a:t>
+            </a:r>
+            <a:r>
+              <a:rPr lang="de-DE" dirty="0" smtClean="0"/>
+              <a:t> = </a:t>
+            </a:r>
+            <a:r>
+              <a:rPr lang="de-DE" dirty="0" err="1" smtClean="0"/>
+              <a:t>L“Scintilla</a:t>
+            </a:r>
+            <a:r>
+              <a:rPr lang="de-DE" dirty="0" smtClean="0"/>
+              <a:t>“</a:t>
+            </a:r>
+            <a:br>
+              <a:rPr lang="de-DE" dirty="0" smtClean="0"/>
+            </a:br>
+            <a:r>
+              <a:rPr lang="de-DE" dirty="0" err="1" smtClean="0"/>
+              <a:t>lpWindowName</a:t>
+            </a:r>
+            <a:r>
+              <a:rPr lang="de-DE" dirty="0" smtClean="0"/>
+              <a:t> = </a:t>
+            </a:r>
+            <a:r>
+              <a:rPr lang="de-DE" dirty="0" err="1" smtClean="0"/>
+              <a:t>L“Source</a:t>
+            </a:r>
+            <a:r>
+              <a:rPr lang="de-DE" dirty="0" smtClean="0"/>
+              <a:t>“</a:t>
+            </a:r>
+            <a:endParaRPr lang="de-DE" dirty="0"/>
           </a:p>
         </p:txBody>
       </p:sp>
     </p:spTree>
     <p:extLst>
       <p:ext uri="{BB962C8B-B14F-4D97-AF65-F5344CB8AC3E}">
-        <p14:creationId xmlns:p14="http://schemas.microsoft.com/office/powerpoint/2010/main" val="2018442675"/>
+        <p14:creationId xmlns:p14="http://schemas.microsoft.com/office/powerpoint/2010/main" val="2892151715"/>
       </p:ext>
     </p:extLst>
   </p:cSld>
@@ -4758,52 +4787,37 @@
           </a:p>
           <a:p>
             <a:r>
-              <a:rPr lang="de-DE" dirty="0" smtClean="0"/>
-              <a:t>MMIX </a:t>
-            </a:r>
-            <a:r>
               <a:rPr lang="de-DE" dirty="0" err="1" smtClean="0"/>
-              <a:t>Lexer</a:t>
-            </a:r>
-            <a:r>
-              <a:rPr lang="de-DE" dirty="0" smtClean="0"/>
-              <a:t> existiert bereits</a:t>
-            </a:r>
-          </a:p>
-          <a:p>
-            <a:endParaRPr lang="de-DE" dirty="0"/>
-          </a:p>
-          <a:p>
+              <a:t>SciLexer.h</a:t>
+            </a:r>
+            <a:r>
+              <a:rPr lang="de-DE" dirty="0" smtClean="0"/>
+              <a:t> muss eingebunden sein</a:t>
+            </a:r>
+          </a:p>
+          <a:p>
+            <a:endParaRPr lang="de-DE" dirty="0"/>
+          </a:p>
+          <a:p>
+            <a:r>
+              <a:rPr lang="de-DE" dirty="0" smtClean="0"/>
+              <a:t>SciLexer.DLL muss mit </a:t>
+            </a:r>
             <a:r>
               <a:rPr lang="de-DE" dirty="0" err="1" smtClean="0"/>
-              <a:t>SendMessage</a:t>
-            </a:r>
-            <a:r>
-              <a:rPr lang="de-DE" dirty="0" smtClean="0"/>
-              <a:t> zum Ändern des </a:t>
-            </a:r>
-            <a:r>
-              <a:rPr lang="de-DE" dirty="0" err="1" smtClean="0"/>
-              <a:t>Lexers</a:t>
-            </a:r>
-            <a:endParaRPr lang="de-DE" dirty="0" smtClean="0"/>
-          </a:p>
-          <a:p>
-            <a:endParaRPr lang="de-DE" dirty="0"/>
-          </a:p>
-          <a:p>
-            <a:r>
-              <a:rPr lang="de-DE" dirty="0" smtClean="0"/>
-              <a:t>SCI_SETLEXER und SCLEX_MMIXAL</a:t>
-            </a:r>
-            <a:endParaRPr lang="de-DE" dirty="0"/>
+              <a:t>LoadLibrary</a:t>
+            </a:r>
+            <a:r>
+              <a:rPr lang="de-DE" dirty="0" smtClean="0"/>
+              <a:t> geladen werden</a:t>
+            </a:r>
           </a:p>
         </p:txBody>
       </p:sp>
     </p:spTree>
     <p:extLst>
       <p:ext uri="{BB962C8B-B14F-4D97-AF65-F5344CB8AC3E}">
-        <p14:creationId xmlns:p14="http://schemas.microsoft.com/office/powerpoint/2010/main" val="2147253744"/>
+        <p14:creationId xmlns:p14="http://schemas.microsoft.com/office/powerpoint/2010/main" val="2018442675"/>
       </p:ext>
     </p:extLst>
   </p:cSld>
@@ -4853,8 +4867,12 @@
           <a:lstStyle/>
           <a:p>
             <a:r>
-              <a:rPr lang="de-DE" dirty="0" smtClean="0"/>
-              <a:t>MMIX Integration</a:t>
+              <a:rPr lang="de-DE" dirty="0" err="1" smtClean="0"/>
+              <a:t>Scintilla</a:t>
+            </a:r>
+            <a:r>
+              <a:rPr lang="de-DE" dirty="0" smtClean="0"/>
+              <a:t> Integration</a:t>
             </a:r>
             <a:endParaRPr lang="de-DE" dirty="0"/>
           </a:p>
@@ -4880,49 +4898,42 @@
           <a:p>
             <a:r>
               <a:rPr lang="de-DE" dirty="0" smtClean="0"/>
-              <a:t>MMIX Quellcode in .w Dateien</a:t>
-            </a:r>
-          </a:p>
-          <a:p>
-            <a:endParaRPr lang="de-DE" dirty="0"/>
-          </a:p>
-          <a:p>
-            <a:r>
-              <a:rPr lang="de-DE" dirty="0" smtClean="0"/>
-              <a:t>Change </a:t>
+              <a:t>MMIX </a:t>
             </a:r>
             <a:r>
               <a:rPr lang="de-DE" dirty="0" err="1" smtClean="0"/>
-              <a:t>files</a:t>
-            </a:r>
-            <a:r>
-              <a:rPr lang="de-DE" dirty="0" smtClean="0"/>
-              <a:t> in .</a:t>
-            </a:r>
+              <a:t>Lexer</a:t>
+            </a:r>
+            <a:r>
+              <a:rPr lang="de-DE" dirty="0" smtClean="0"/>
+              <a:t> existiert bereits</a:t>
+            </a:r>
+          </a:p>
+          <a:p>
+            <a:endParaRPr lang="de-DE" dirty="0"/>
+          </a:p>
+          <a:p>
             <a:r>
               <a:rPr lang="de-DE" dirty="0" err="1" smtClean="0"/>
-              <a:t>ch</a:t>
-            </a:r>
-            <a:r>
-              <a:rPr lang="de-DE" dirty="0" smtClean="0"/>
-              <a:t> Dateien</a:t>
-            </a:r>
-          </a:p>
-          <a:p>
-            <a:endParaRPr lang="de-DE" dirty="0"/>
-          </a:p>
-          <a:p>
-            <a:r>
-              <a:rPr lang="de-DE" dirty="0" smtClean="0"/>
-              <a:t>Mit </a:t>
+              <a:t>SendMessage</a:t>
+            </a:r>
+            <a:r>
+              <a:rPr lang="de-DE" dirty="0" smtClean="0"/>
+              <a:t> zum Ändern des </a:t>
             </a:r>
             <a:r>
               <a:rPr lang="de-DE" dirty="0" err="1" smtClean="0"/>
-              <a:t>Ctangle</a:t>
-            </a:r>
-            <a:r>
-              <a:rPr lang="de-DE" dirty="0" smtClean="0"/>
-              <a:t> zu .c Dateien kompilieren</a:t>
+              <a:t>Lexers</a:t>
+            </a:r>
+            <a:endParaRPr lang="de-DE" dirty="0" smtClean="0"/>
+          </a:p>
+          <a:p>
+            <a:endParaRPr lang="de-DE" dirty="0"/>
+          </a:p>
+          <a:p>
+            <a:r>
+              <a:rPr lang="de-DE" dirty="0" smtClean="0"/>
+              <a:t>SCI_SETLEXER und SCLEX_MMIXAL</a:t>
             </a:r>
             <a:endParaRPr lang="de-DE" dirty="0"/>
           </a:p>
@@ -4931,7 +4942,7 @@
     </p:spTree>
     <p:extLst>
       <p:ext uri="{BB962C8B-B14F-4D97-AF65-F5344CB8AC3E}">
-        <p14:creationId xmlns:p14="http://schemas.microsoft.com/office/powerpoint/2010/main" val="1669658461"/>
+        <p14:creationId xmlns:p14="http://schemas.microsoft.com/office/powerpoint/2010/main" val="2147253744"/>
       </p:ext>
     </p:extLst>
   </p:cSld>
@@ -5006,52 +5017,51 @@
             <a:endParaRPr lang="de-DE" dirty="0" smtClean="0"/>
           </a:p>
           <a:p>
-            <a:pPr marL="0" indent="0">
-              <a:buNone/>
-            </a:pPr>
-            <a:r>
-              <a:rPr lang="de-DE" dirty="0" smtClean="0"/>
-              <a:t>@x</a:t>
-            </a:r>
-          </a:p>
-          <a:p>
-            <a:pPr marL="0" indent="0">
-              <a:buNone/>
-            </a:pPr>
-            <a:r>
-              <a:rPr lang="de-DE" dirty="0" smtClean="0"/>
-              <a:t>original Text</a:t>
-            </a:r>
-          </a:p>
-          <a:p>
-            <a:pPr marL="0" indent="0">
-              <a:buNone/>
-            </a:pPr>
-            <a:r>
-              <a:rPr lang="de-DE" dirty="0" smtClean="0"/>
-              <a:t>@y</a:t>
-            </a:r>
-          </a:p>
-          <a:p>
-            <a:pPr marL="0" indent="0">
-              <a:buNone/>
-            </a:pPr>
-            <a:r>
-              <a:rPr lang="de-DE" dirty="0"/>
-              <a:t>n</a:t>
-            </a:r>
-            <a:r>
-              <a:rPr lang="de-DE" dirty="0" smtClean="0"/>
-              <a:t>euer Text</a:t>
-            </a:r>
-          </a:p>
-          <a:p>
-            <a:pPr marL="0" indent="0">
-              <a:buNone/>
-            </a:pPr>
-            <a:r>
-              <a:rPr lang="de-DE" dirty="0" smtClean="0"/>
-              <a:t>@z</a:t>
+            <a:r>
+              <a:rPr lang="de-DE" dirty="0" smtClean="0"/>
+              <a:t>MMIX Quellcode in .w Dateien</a:t>
+            </a:r>
+          </a:p>
+          <a:p>
+            <a:endParaRPr lang="de-DE" dirty="0"/>
+          </a:p>
+          <a:p>
+            <a:r>
+              <a:rPr lang="de-DE" dirty="0" smtClean="0"/>
+              <a:t>Change </a:t>
+            </a:r>
+            <a:r>
+              <a:rPr lang="de-DE" dirty="0" err="1" smtClean="0"/>
+              <a:t>files</a:t>
+            </a:r>
+            <a:r>
+              <a:rPr lang="de-DE" dirty="0" smtClean="0"/>
+              <a:t> in .</a:t>
+            </a:r>
+            <a:r>
+              <a:rPr lang="de-DE" dirty="0" err="1" smtClean="0"/>
+              <a:t>ch</a:t>
+            </a:r>
+            <a:r>
+              <a:rPr lang="de-DE" dirty="0" smtClean="0"/>
+              <a:t> Dateien</a:t>
+            </a:r>
+          </a:p>
+          <a:p>
+            <a:endParaRPr lang="de-DE" dirty="0"/>
+          </a:p>
+          <a:p>
+            <a:r>
+              <a:rPr lang="de-DE" dirty="0" smtClean="0"/>
+              <a:t>Mit </a:t>
+            </a:r>
+            <a:r>
+              <a:rPr lang="de-DE" dirty="0" err="1" smtClean="0"/>
+              <a:t>Ctangle</a:t>
+            </a:r>
+            <a:r>
+              <a:rPr lang="de-DE" dirty="0" smtClean="0"/>
+              <a:t> zu .c Dateien kompilieren</a:t>
             </a:r>
             <a:endParaRPr lang="de-DE" dirty="0"/>
           </a:p>
@@ -5060,7 +5070,7 @@
     </p:spTree>
     <p:extLst>
       <p:ext uri="{BB962C8B-B14F-4D97-AF65-F5344CB8AC3E}">
-        <p14:creationId xmlns:p14="http://schemas.microsoft.com/office/powerpoint/2010/main" val="3461029720"/>
+        <p14:creationId xmlns:p14="http://schemas.microsoft.com/office/powerpoint/2010/main" val="1669658461"/>
       </p:ext>
     </p:extLst>
   </p:cSld>
@@ -5135,15 +5145,53 @@
             <a:endParaRPr lang="de-DE" dirty="0" smtClean="0"/>
           </a:p>
           <a:p>
-            <a:r>
-              <a:rPr lang="de-DE" dirty="0" smtClean="0"/>
-              <a:t>Änderungen müssen in richtiger Reihenfolge sein</a:t>
-            </a:r>
-          </a:p>
-          <a:p>
-            <a:endParaRPr lang="de-DE" dirty="0"/>
-          </a:p>
-          <a:p>
+            <a:pPr marL="0" indent="0">
+              <a:buNone/>
+            </a:pPr>
+            <a:r>
+              <a:rPr lang="de-DE" dirty="0" smtClean="0"/>
+              <a:t>@x</a:t>
+            </a:r>
+          </a:p>
+          <a:p>
+            <a:pPr marL="0" indent="0">
+              <a:buNone/>
+            </a:pPr>
+            <a:r>
+              <a:rPr lang="de-DE" dirty="0" smtClean="0"/>
+              <a:t>original Text</a:t>
+            </a:r>
+          </a:p>
+          <a:p>
+            <a:pPr marL="0" indent="0">
+              <a:buNone/>
+            </a:pPr>
+            <a:r>
+              <a:rPr lang="de-DE" dirty="0" smtClean="0"/>
+              <a:t>@y</a:t>
+            </a:r>
+          </a:p>
+          <a:p>
+            <a:pPr marL="0" indent="0">
+              <a:buNone/>
+            </a:pPr>
+            <a:r>
+              <a:rPr lang="de-DE" dirty="0"/>
+              <a:t>n</a:t>
+            </a:r>
+            <a:r>
+              <a:rPr lang="de-DE" dirty="0" smtClean="0"/>
+              <a:t>euer Text</a:t>
+            </a:r>
+          </a:p>
+          <a:p>
+            <a:pPr marL="0" indent="0">
+              <a:buNone/>
+            </a:pPr>
+            <a:r>
+              <a:rPr lang="de-DE" dirty="0" smtClean="0"/>
+              <a:t>@z</a:t>
+            </a:r>
             <a:endParaRPr lang="de-DE" dirty="0"/>
           </a:p>
         </p:txBody>
@@ -5151,7 +5199,7 @@
     </p:spTree>
     <p:extLst>
       <p:ext uri="{BB962C8B-B14F-4D97-AF65-F5344CB8AC3E}">
-        <p14:creationId xmlns:p14="http://schemas.microsoft.com/office/powerpoint/2010/main" val="786868818"/>
+        <p14:creationId xmlns:p14="http://schemas.microsoft.com/office/powerpoint/2010/main" val="3461029720"/>
       </p:ext>
     </p:extLst>
   </p:cSld>
@@ -5228,21 +5276,13 @@
           <a:p>
             <a:r>
               <a:rPr lang="de-DE" dirty="0" smtClean="0"/>
-              <a:t>Exit und Return müssen geändert werden</a:t>
-            </a:r>
-          </a:p>
-          <a:p>
-            <a:endParaRPr lang="de-DE" dirty="0"/>
-          </a:p>
-          <a:p>
-            <a:r>
-              <a:rPr lang="de-DE" dirty="0" err="1" smtClean="0"/>
-              <a:t>Sourcecode</a:t>
-            </a:r>
-            <a:r>
-              <a:rPr lang="de-DE" dirty="0" smtClean="0"/>
-              <a:t> muss direkt übergeben werden können</a:t>
-            </a:r>
+              <a:t>Änderungen müssen in richtiger Reihenfolge sein</a:t>
+            </a:r>
+          </a:p>
+          <a:p>
+            <a:endParaRPr lang="de-DE" dirty="0"/>
+          </a:p>
+          <a:p>
             <a:endParaRPr lang="de-DE" dirty="0"/>
           </a:p>
         </p:txBody>
@@ -5250,7 +5290,7 @@
     </p:spTree>
     <p:extLst>
       <p:ext uri="{BB962C8B-B14F-4D97-AF65-F5344CB8AC3E}">
-        <p14:creationId xmlns:p14="http://schemas.microsoft.com/office/powerpoint/2010/main" val="890052578"/>
+        <p14:creationId xmlns:p14="http://schemas.microsoft.com/office/powerpoint/2010/main" val="786868818"/>
       </p:ext>
     </p:extLst>
   </p:cSld>
@@ -5327,6 +5367,105 @@
           <a:p>
             <a:r>
               <a:rPr lang="de-DE" dirty="0" smtClean="0"/>
+              <a:t>Exit und Return müssen geändert werden</a:t>
+            </a:r>
+          </a:p>
+          <a:p>
+            <a:endParaRPr lang="de-DE" dirty="0"/>
+          </a:p>
+          <a:p>
+            <a:r>
+              <a:rPr lang="de-DE" dirty="0" err="1" smtClean="0"/>
+              <a:t>Sourcecode</a:t>
+            </a:r>
+            <a:r>
+              <a:rPr lang="de-DE" dirty="0" smtClean="0"/>
+              <a:t> muss direkt übergeben werden können</a:t>
+            </a:r>
+            <a:endParaRPr lang="de-DE" dirty="0"/>
+          </a:p>
+        </p:txBody>
+      </p:sp>
+    </p:spTree>
+    <p:extLst>
+      <p:ext uri="{BB962C8B-B14F-4D97-AF65-F5344CB8AC3E}">
+        <p14:creationId xmlns:p14="http://schemas.microsoft.com/office/powerpoint/2010/main" val="890052578"/>
+      </p:ext>
+    </p:extLst>
+  </p:cSld>
+  <p:clrMapOvr>
+    <a:masterClrMapping/>
+  </p:clrMapOvr>
+  <p:timing>
+    <p:tnLst>
+      <p:par>
+        <p:cTn id="1" dur="indefinite" restart="never" nodeType="tmRoot"/>
+      </p:par>
+    </p:tnLst>
+  </p:timing>
+</p:sld>
+</file>
+
+<file path=ppt/slides/slide27.xml><?xml version="1.0" encoding="utf-8"?>
+<p:sld xmlns:a="http://schemas.openxmlformats.org/drawingml/2006/main" xmlns:r="http://schemas.openxmlformats.org/officeDocument/2006/relationships" xmlns:p="http://schemas.openxmlformats.org/presentationml/2006/main">
+  <p:cSld>
+    <p:spTree>
+      <p:nvGrpSpPr>
+        <p:cNvPr id="1" name=""/>
+        <p:cNvGrpSpPr/>
+        <p:nvPr/>
+      </p:nvGrpSpPr>
+      <p:grpSpPr>
+        <a:xfrm>
+          <a:off x="0" y="0"/>
+          <a:ext cx="0" cy="0"/>
+          <a:chOff x="0" y="0"/>
+          <a:chExt cx="0" cy="0"/>
+        </a:xfrm>
+      </p:grpSpPr>
+      <p:sp>
+        <p:nvSpPr>
+          <p:cNvPr id="2" name="Titel 1"/>
+          <p:cNvSpPr>
+            <a:spLocks noGrp="1"/>
+          </p:cNvSpPr>
+          <p:nvPr>
+            <p:ph type="title"/>
+          </p:nvPr>
+        </p:nvSpPr>
+        <p:spPr/>
+        <p:txBody>
+          <a:bodyPr/>
+          <a:lstStyle/>
+          <a:p>
+            <a:r>
+              <a:rPr lang="de-DE" dirty="0" smtClean="0"/>
+              <a:t>MMIX Integration</a:t>
+            </a:r>
+            <a:endParaRPr lang="de-DE" dirty="0"/>
+          </a:p>
+        </p:txBody>
+      </p:sp>
+      <p:sp>
+        <p:nvSpPr>
+          <p:cNvPr id="3" name="Inhaltsplatzhalter 2"/>
+          <p:cNvSpPr>
+            <a:spLocks noGrp="1"/>
+          </p:cNvSpPr>
+          <p:nvPr>
+            <p:ph idx="1"/>
+          </p:nvPr>
+        </p:nvSpPr>
+        <p:spPr/>
+        <p:txBody>
+          <a:bodyPr/>
+          <a:lstStyle/>
+          <a:p>
+            <a:endParaRPr lang="de-DE" dirty="0" smtClean="0"/>
+          </a:p>
+          <a:p>
+            <a:r>
+              <a:rPr lang="de-DE" dirty="0" smtClean="0"/>
               <a:t>Einstiegsfunktionen müssen Prototyp in </a:t>
             </a:r>
             <a:r>
@@ -5370,7 +5509,7 @@
 </p:sld>
 </file>
 
-<file path=ppt/slides/slide27.xml><?xml version="1.0" encoding="utf-8"?>
+<file path=ppt/slides/slide28.xml><?xml version="1.0" encoding="utf-8"?>
 <p:sld xmlns:a="http://schemas.openxmlformats.org/drawingml/2006/main" xmlns:r="http://schemas.openxmlformats.org/officeDocument/2006/relationships" xmlns:p="http://schemas.openxmlformats.org/presentationml/2006/main">
   <p:cSld>
     <p:spTree>
@@ -6056,6 +6195,18 @@
   <p:clrMapOvr>
     <a:masterClrMapping/>
   </p:clrMapOvr>
+  <mc:AlternateContent xmlns:mc="http://schemas.openxmlformats.org/markup-compatibility/2006">
+    <mc:Choice xmlns:p14="http://schemas.microsoft.com/office/powerpoint/2010/main" Requires="p14">
+      <p:transition p14:dur="100">
+        <p:cut/>
+      </p:transition>
+    </mc:Choice>
+    <mc:Fallback>
+      <p:transition>
+        <p:cut/>
+      </p:transition>
+    </mc:Fallback>
+  </mc:AlternateContent>
   <p:timing>
     <p:tnLst>
       <p:par>
@@ -6227,7 +6378,7 @@
           <a:lstStyle/>
           <a:p>
             <a:r>
-              <a:rPr lang="de-DE" dirty="0" smtClean="0"/>
+              <a:rPr lang="en-GB" dirty="0" smtClean="0"/>
               <a:t>Win32</a:t>
             </a:r>
             <a:endParaRPr lang="de-DE" dirty="0"/>
@@ -6249,65 +6400,96 @@
           <a:bodyPr/>
           <a:lstStyle/>
           <a:p>
-            <a:endParaRPr lang="de-DE" dirty="0"/>
-          </a:p>
-          <a:p>
-            <a:pPr marL="0" indent="0">
-              <a:buNone/>
-            </a:pPr>
-            <a:r>
-              <a:rPr lang="de-DE" dirty="0" err="1"/>
-              <a:t>i</a:t>
-            </a:r>
-            <a:r>
-              <a:rPr lang="de-DE" dirty="0" err="1" smtClean="0"/>
-              <a:t>nt</a:t>
-            </a:r>
-            <a:r>
-              <a:rPr lang="de-DE" dirty="0" smtClean="0"/>
-              <a:t> WINAPI </a:t>
-            </a:r>
-            <a:r>
-              <a:rPr lang="de-DE" dirty="0" err="1" smtClean="0"/>
-              <a:t>WinMain</a:t>
-            </a:r>
-            <a:r>
-              <a:rPr lang="de-DE" dirty="0" smtClean="0"/>
-              <a:t>([…])</a:t>
-            </a:r>
-          </a:p>
-          <a:p>
-            <a:pPr marL="0" indent="0">
-              <a:buNone/>
-            </a:pPr>
-            <a:endParaRPr lang="de-DE" dirty="0"/>
-          </a:p>
-          <a:p>
-            <a:pPr marL="0" indent="0">
-              <a:buNone/>
-            </a:pPr>
-            <a:r>
-              <a:rPr lang="de-DE" dirty="0"/>
+            <a:endParaRPr lang="en-GB" dirty="0" smtClean="0"/>
+          </a:p>
+          <a:p>
+            <a:r>
+              <a:rPr lang="en-GB" dirty="0" smtClean="0"/>
+              <a:t>Win32 </a:t>
+            </a:r>
+            <a:r>
+              <a:rPr lang="en-GB" dirty="0" err="1" smtClean="0"/>
+              <a:t>Funktionen</a:t>
+            </a:r>
+            <a:r>
+              <a:rPr lang="en-GB" dirty="0" smtClean="0"/>
               <a:t> </a:t>
             </a:r>
             <a:r>
-              <a:rPr lang="de-DE" dirty="0" smtClean="0"/>
-              <a:t>- Einstiegspunkt in die Anwendung</a:t>
-            </a:r>
-          </a:p>
-          <a:p>
-            <a:pPr marL="0" indent="0">
-              <a:buNone/>
-            </a:pPr>
-            <a:endParaRPr lang="de-DE" dirty="0"/>
-          </a:p>
-          <a:p>
-            <a:pPr marL="0" indent="0">
-              <a:buNone/>
-            </a:pPr>
-            <a:r>
-              <a:rPr lang="de-DE" dirty="0" smtClean="0"/>
-              <a:t> - Enthält die Nachrichtenschleife</a:t>
+              <a:rPr lang="en-GB" dirty="0" err="1" smtClean="0"/>
+              <a:t>arbeiten</a:t>
+            </a:r>
+            <a:r>
+              <a:rPr lang="en-GB" dirty="0" smtClean="0"/>
+              <a:t> </a:t>
+            </a:r>
+            <a:r>
+              <a:rPr lang="en-GB" dirty="0" err="1" smtClean="0"/>
+              <a:t>mit</a:t>
+            </a:r>
+            <a:r>
+              <a:rPr lang="en-GB" dirty="0" smtClean="0"/>
+              <a:t> </a:t>
+            </a:r>
+            <a:r>
+              <a:rPr lang="en-GB" dirty="0" err="1" smtClean="0"/>
+              <a:t>wchar_t</a:t>
+            </a:r>
+            <a:endParaRPr lang="en-GB" dirty="0" smtClean="0"/>
+          </a:p>
+          <a:p>
+            <a:endParaRPr lang="en-GB" dirty="0"/>
+          </a:p>
+          <a:p>
+            <a:r>
+              <a:rPr lang="en-GB" dirty="0" smtClean="0"/>
+              <a:t>char*/String </a:t>
+            </a:r>
+            <a:r>
+              <a:rPr lang="en-GB" dirty="0" err="1" smtClean="0"/>
+              <a:t>müssen</a:t>
+            </a:r>
+            <a:r>
+              <a:rPr lang="en-GB" dirty="0" smtClean="0"/>
+              <a:t> in </a:t>
+            </a:r>
+            <a:r>
+              <a:rPr lang="en-GB" dirty="0" err="1" smtClean="0"/>
+              <a:t>wchar_t</a:t>
+            </a:r>
+            <a:r>
+              <a:rPr lang="en-GB" dirty="0" smtClean="0"/>
+              <a:t> </a:t>
+            </a:r>
+            <a:r>
+              <a:rPr lang="en-GB" dirty="0" err="1" smtClean="0"/>
+              <a:t>umgewandelt</a:t>
+            </a:r>
+            <a:r>
+              <a:rPr lang="en-GB" dirty="0" smtClean="0"/>
+              <a:t> </a:t>
+            </a:r>
+            <a:r>
+              <a:rPr lang="en-GB" dirty="0" err="1" smtClean="0"/>
+              <a:t>werden</a:t>
+            </a:r>
+            <a:endParaRPr lang="en-GB" dirty="0" smtClean="0"/>
+          </a:p>
+          <a:p>
+            <a:endParaRPr lang="en-GB" dirty="0"/>
+          </a:p>
+          <a:p>
+            <a:r>
+              <a:rPr lang="en-GB" dirty="0" smtClean="0"/>
+              <a:t>“String” =&gt; </a:t>
+            </a:r>
+            <a:r>
+              <a:rPr lang="en-GB" dirty="0" err="1" smtClean="0"/>
+              <a:t>L”String</a:t>
+            </a:r>
+            <a:r>
+              <a:rPr lang="en-GB" smtClean="0"/>
+              <a:t>”</a:t>
             </a:r>
             <a:endParaRPr lang="de-DE" dirty="0"/>
           </a:p>
@@ -6316,7 +6498,7 @@
     </p:spTree>
     <p:extLst>
       <p:ext uri="{BB962C8B-B14F-4D97-AF65-F5344CB8AC3E}">
-        <p14:creationId xmlns:p14="http://schemas.microsoft.com/office/powerpoint/2010/main" val="4011005880"/>
+        <p14:creationId xmlns:p14="http://schemas.microsoft.com/office/powerpoint/2010/main" val="4222377948"/>
       </p:ext>
     </p:extLst>
   </p:cSld>

</xml_diff>

<commit_message>
Added new binary folder with newest version of MMIX-Edit.
git-svn-id: svn://mmix.cs.hm.edu@43 bd757dd8-b88b-4aad-9aa6-ce29af76ea0b
</commit_message>
<xml_diff>
--- a/util/trunk/mmixedit/doc/MMIXEdit.pptx
+++ b/util/trunk/mmixedit/doc/MMIXEdit.pptx
@@ -23,16 +23,18 @@
     <p:sldId id="270" r:id="rId17"/>
     <p:sldId id="271" r:id="rId18"/>
     <p:sldId id="272" r:id="rId19"/>
-    <p:sldId id="273" r:id="rId20"/>
-    <p:sldId id="274" r:id="rId21"/>
-    <p:sldId id="275" r:id="rId22"/>
-    <p:sldId id="276" r:id="rId23"/>
-    <p:sldId id="277" r:id="rId24"/>
-    <p:sldId id="278" r:id="rId25"/>
-    <p:sldId id="279" r:id="rId26"/>
-    <p:sldId id="280" r:id="rId27"/>
-    <p:sldId id="281" r:id="rId28"/>
-    <p:sldId id="282" r:id="rId29"/>
+    <p:sldId id="284" r:id="rId20"/>
+    <p:sldId id="285" r:id="rId21"/>
+    <p:sldId id="273" r:id="rId22"/>
+    <p:sldId id="274" r:id="rId23"/>
+    <p:sldId id="275" r:id="rId24"/>
+    <p:sldId id="276" r:id="rId25"/>
+    <p:sldId id="277" r:id="rId26"/>
+    <p:sldId id="278" r:id="rId27"/>
+    <p:sldId id="279" r:id="rId28"/>
+    <p:sldId id="280" r:id="rId29"/>
+    <p:sldId id="281" r:id="rId30"/>
+    <p:sldId id="282" r:id="rId31"/>
   </p:sldIdLst>
   <p:sldSz cx="9144000" cy="6858000" type="screen4x3"/>
   <p:notesSz cx="6858000" cy="9144000"/>
@@ -315,7 +317,7 @@
           <a:p>
             <a:fld id="{1BA50D42-C9CD-4801-B293-61D1F53EC57E}" type="datetimeFigureOut">
               <a:rPr lang="de-DE" smtClean="0"/>
-              <a:t>03.07.2013</a:t>
+              <a:t>04.07.2013</a:t>
             </a:fld>
             <a:endParaRPr lang="de-DE"/>
           </a:p>
@@ -480,7 +482,7 @@
           <a:p>
             <a:fld id="{1BA50D42-C9CD-4801-B293-61D1F53EC57E}" type="datetimeFigureOut">
               <a:rPr lang="de-DE" smtClean="0"/>
-              <a:t>03.07.2013</a:t>
+              <a:t>04.07.2013</a:t>
             </a:fld>
             <a:endParaRPr lang="de-DE"/>
           </a:p>
@@ -655,7 +657,7 @@
           <a:p>
             <a:fld id="{1BA50D42-C9CD-4801-B293-61D1F53EC57E}" type="datetimeFigureOut">
               <a:rPr lang="de-DE" smtClean="0"/>
-              <a:t>03.07.2013</a:t>
+              <a:t>04.07.2013</a:t>
             </a:fld>
             <a:endParaRPr lang="de-DE"/>
           </a:p>
@@ -820,7 +822,7 @@
           <a:p>
             <a:fld id="{1BA50D42-C9CD-4801-B293-61D1F53EC57E}" type="datetimeFigureOut">
               <a:rPr lang="de-DE" smtClean="0"/>
-              <a:t>03.07.2013</a:t>
+              <a:t>04.07.2013</a:t>
             </a:fld>
             <a:endParaRPr lang="de-DE"/>
           </a:p>
@@ -1061,7 +1063,7 @@
           <a:p>
             <a:fld id="{1BA50D42-C9CD-4801-B293-61D1F53EC57E}" type="datetimeFigureOut">
               <a:rPr lang="de-DE" smtClean="0"/>
-              <a:t>03.07.2013</a:t>
+              <a:t>04.07.2013</a:t>
             </a:fld>
             <a:endParaRPr lang="de-DE"/>
           </a:p>
@@ -1344,7 +1346,7 @@
           <a:p>
             <a:fld id="{1BA50D42-C9CD-4801-B293-61D1F53EC57E}" type="datetimeFigureOut">
               <a:rPr lang="de-DE" smtClean="0"/>
-              <a:t>03.07.2013</a:t>
+              <a:t>04.07.2013</a:t>
             </a:fld>
             <a:endParaRPr lang="de-DE"/>
           </a:p>
@@ -1761,7 +1763,7 @@
           <a:p>
             <a:fld id="{1BA50D42-C9CD-4801-B293-61D1F53EC57E}" type="datetimeFigureOut">
               <a:rPr lang="de-DE" smtClean="0"/>
-              <a:t>03.07.2013</a:t>
+              <a:t>04.07.2013</a:t>
             </a:fld>
             <a:endParaRPr lang="de-DE"/>
           </a:p>
@@ -1874,7 +1876,7 @@
           <a:p>
             <a:fld id="{1BA50D42-C9CD-4801-B293-61D1F53EC57E}" type="datetimeFigureOut">
               <a:rPr lang="de-DE" smtClean="0"/>
-              <a:t>03.07.2013</a:t>
+              <a:t>04.07.2013</a:t>
             </a:fld>
             <a:endParaRPr lang="de-DE"/>
           </a:p>
@@ -1964,7 +1966,7 @@
           <a:p>
             <a:fld id="{1BA50D42-C9CD-4801-B293-61D1F53EC57E}" type="datetimeFigureOut">
               <a:rPr lang="de-DE" smtClean="0"/>
-              <a:t>03.07.2013</a:t>
+              <a:t>04.07.2013</a:t>
             </a:fld>
             <a:endParaRPr lang="de-DE"/>
           </a:p>
@@ -2236,7 +2238,7 @@
           <a:p>
             <a:fld id="{1BA50D42-C9CD-4801-B293-61D1F53EC57E}" type="datetimeFigureOut">
               <a:rPr lang="de-DE" smtClean="0"/>
-              <a:t>03.07.2013</a:t>
+              <a:t>04.07.2013</a:t>
             </a:fld>
             <a:endParaRPr lang="de-DE"/>
           </a:p>
@@ -2484,7 +2486,7 @@
           <a:p>
             <a:fld id="{1BA50D42-C9CD-4801-B293-61D1F53EC57E}" type="datetimeFigureOut">
               <a:rPr lang="de-DE" smtClean="0"/>
-              <a:t>03.07.2013</a:t>
+              <a:t>04.07.2013</a:t>
             </a:fld>
             <a:endParaRPr lang="de-DE"/>
           </a:p>
@@ -2692,7 +2694,7 @@
           <a:p>
             <a:fld id="{1BA50D42-C9CD-4801-B293-61D1F53EC57E}" type="datetimeFigureOut">
               <a:rPr lang="de-DE" smtClean="0"/>
-              <a:t>03.07.2013</a:t>
+              <a:t>04.07.2013</a:t>
             </a:fld>
             <a:endParaRPr lang="de-DE"/>
           </a:p>
@@ -4370,12 +4372,8 @@
           <a:lstStyle/>
           <a:p>
             <a:r>
-              <a:rPr lang="de-DE" dirty="0" err="1" smtClean="0"/>
-              <a:t>Scintilla</a:t>
-            </a:r>
-            <a:r>
-              <a:rPr lang="de-DE" dirty="0" smtClean="0"/>
-              <a:t> Integration</a:t>
+              <a:rPr lang="en-GB" dirty="0" smtClean="0"/>
+              <a:t>Win32</a:t>
             </a:r>
             <a:endParaRPr lang="de-DE" dirty="0"/>
           </a:p>
@@ -4396,57 +4394,105 @@
           <a:bodyPr/>
           <a:lstStyle/>
           <a:p>
-            <a:pPr marL="0" indent="0">
-              <a:buNone/>
-            </a:pPr>
-            <a:endParaRPr lang="de-DE" dirty="0" smtClean="0"/>
-          </a:p>
-          <a:p>
-            <a:r>
-              <a:rPr lang="de-DE" dirty="0" err="1" smtClean="0"/>
-              <a:t>Scintilla.h</a:t>
-            </a:r>
-            <a:r>
-              <a:rPr lang="de-DE" dirty="0"/>
-              <a:t/>
-            </a:r>
-            <a:br>
-              <a:rPr lang="de-DE" dirty="0"/>
-            </a:br>
-            <a:r>
-              <a:rPr lang="de-DE" dirty="0" smtClean="0"/>
-              <a:t>	muss </a:t>
-            </a:r>
-            <a:r>
-              <a:rPr lang="de-DE" dirty="0" err="1" smtClean="0"/>
-              <a:t>includiert</a:t>
-            </a:r>
-            <a:r>
-              <a:rPr lang="de-DE" dirty="0" smtClean="0"/>
-              <a:t> werden</a:t>
-            </a:r>
-          </a:p>
-          <a:p>
-            <a:endParaRPr lang="de-DE" dirty="0"/>
-          </a:p>
-          <a:p>
-            <a:r>
-              <a:rPr lang="de-DE" dirty="0" smtClean="0"/>
-              <a:t>Scintilla.dll</a:t>
-            </a:r>
-            <a:br>
-              <a:rPr lang="de-DE" dirty="0" smtClean="0"/>
-            </a:br>
-            <a:r>
-              <a:rPr lang="de-DE" dirty="0" smtClean="0"/>
-              <a:t>	brauch nicht eingebunden werden</a:t>
-            </a:r>
-            <a:br>
-              <a:rPr lang="de-DE" dirty="0" smtClean="0"/>
-            </a:br>
-            <a:r>
-              <a:rPr lang="de-DE" dirty="0" smtClean="0"/>
-              <a:t>	muss nur in Ordner sein</a:t>
+            <a:endParaRPr lang="en-GB" dirty="0" smtClean="0"/>
+          </a:p>
+          <a:p>
+            <a:pPr marL="0" indent="0">
+              <a:buNone/>
+            </a:pPr>
+            <a:r>
+              <a:rPr lang="en-GB" dirty="0" smtClean="0"/>
+              <a:t>DWORD WINAPI </a:t>
+            </a:r>
+            <a:r>
+              <a:rPr lang="en-GB" dirty="0" err="1" smtClean="0"/>
+              <a:t>GetLastError</a:t>
+            </a:r>
+            <a:r>
+              <a:rPr lang="en-GB" dirty="0" smtClean="0"/>
+              <a:t>()</a:t>
+            </a:r>
+          </a:p>
+          <a:p>
+            <a:pPr marL="0" indent="0">
+              <a:buNone/>
+            </a:pPr>
+            <a:endParaRPr lang="en-GB" dirty="0"/>
+          </a:p>
+          <a:p>
+            <a:pPr marL="0" indent="0">
+              <a:buNone/>
+            </a:pPr>
+            <a:r>
+              <a:rPr lang="en-GB" dirty="0" smtClean="0"/>
+              <a:t> - Holt </a:t>
+            </a:r>
+            <a:r>
+              <a:rPr lang="en-GB" dirty="0" err="1" smtClean="0"/>
+              <a:t>letzten</a:t>
+            </a:r>
+            <a:r>
+              <a:rPr lang="en-GB" dirty="0" smtClean="0"/>
+              <a:t> </a:t>
+            </a:r>
+            <a:r>
+              <a:rPr lang="en-GB" dirty="0" err="1" smtClean="0"/>
+              <a:t>Fehler</a:t>
+            </a:r>
+            <a:r>
+              <a:rPr lang="en-GB" dirty="0" smtClean="0"/>
+              <a:t> des Threads</a:t>
+            </a:r>
+          </a:p>
+          <a:p>
+            <a:pPr marL="0" indent="0">
+              <a:buNone/>
+            </a:pPr>
+            <a:endParaRPr lang="en-GB" dirty="0"/>
+          </a:p>
+          <a:p>
+            <a:pPr marL="0" indent="0">
+              <a:buNone/>
+            </a:pPr>
+            <a:r>
+              <a:rPr lang="en-GB" dirty="0" smtClean="0"/>
+              <a:t> - </a:t>
+            </a:r>
+            <a:r>
+              <a:rPr lang="en-GB" dirty="0" err="1" smtClean="0"/>
+              <a:t>eine</a:t>
+            </a:r>
+            <a:r>
+              <a:rPr lang="en-GB" dirty="0" smtClean="0"/>
+              <a:t> </a:t>
+            </a:r>
+            <a:r>
+              <a:rPr lang="en-GB" dirty="0" err="1" smtClean="0"/>
+              <a:t>Kennnummer</a:t>
+            </a:r>
+            <a:r>
+              <a:rPr lang="en-GB" dirty="0" smtClean="0"/>
+              <a:t> </a:t>
+            </a:r>
+            <a:r>
+              <a:rPr lang="en-GB" dirty="0" err="1" smtClean="0"/>
+              <a:t>wird</a:t>
+            </a:r>
+            <a:r>
+              <a:rPr lang="en-GB" dirty="0" smtClean="0"/>
+              <a:t> </a:t>
+            </a:r>
+            <a:r>
+              <a:rPr lang="en-GB" dirty="0" err="1" smtClean="0"/>
+              <a:t>zurück</a:t>
+            </a:r>
+            <a:r>
+              <a:rPr lang="en-GB" dirty="0" smtClean="0"/>
+              <a:t> </a:t>
+            </a:r>
+            <a:r>
+              <a:rPr lang="en-GB" dirty="0" err="1" smtClean="0"/>
+              <a:t>gegeben</a:t>
             </a:r>
             <a:endParaRPr lang="de-DE" dirty="0"/>
           </a:p>
@@ -4455,7 +4501,7 @@
     </p:spTree>
     <p:extLst>
       <p:ext uri="{BB962C8B-B14F-4D97-AF65-F5344CB8AC3E}">
-        <p14:creationId xmlns:p14="http://schemas.microsoft.com/office/powerpoint/2010/main" val="2755479760"/>
+        <p14:creationId xmlns:p14="http://schemas.microsoft.com/office/powerpoint/2010/main" val="2664663383"/>
       </p:ext>
     </p:extLst>
   </p:cSld>
@@ -4622,12 +4668,8 @@
           <a:lstStyle/>
           <a:p>
             <a:r>
-              <a:rPr lang="de-DE" dirty="0" err="1" smtClean="0"/>
-              <a:t>Scintilla</a:t>
-            </a:r>
-            <a:r>
-              <a:rPr lang="de-DE" dirty="0" smtClean="0"/>
-              <a:t> Integration</a:t>
+              <a:rPr lang="en-GB" dirty="0" smtClean="0"/>
+              <a:t>Win32</a:t>
             </a:r>
             <a:endParaRPr lang="de-DE" dirty="0"/>
           </a:p>
@@ -4648,57 +4690,78 @@
           <a:bodyPr/>
           <a:lstStyle/>
           <a:p>
-            <a:endParaRPr lang="de-DE" dirty="0" smtClean="0"/>
-          </a:p>
-          <a:p>
-            <a:r>
-              <a:rPr lang="de-DE" dirty="0" smtClean="0"/>
-              <a:t>Neuer Editor mit </a:t>
-            </a:r>
-            <a:r>
-              <a:rPr lang="de-DE" dirty="0" err="1" smtClean="0"/>
-              <a:t>CreateWindow</a:t>
-            </a:r>
-            <a:endParaRPr lang="de-DE" dirty="0" smtClean="0"/>
-          </a:p>
-          <a:p>
-            <a:endParaRPr lang="de-DE" dirty="0"/>
-          </a:p>
-          <a:p>
-            <a:r>
-              <a:rPr lang="de-DE" dirty="0" err="1" smtClean="0"/>
-              <a:t>lpClassName</a:t>
-            </a:r>
-            <a:r>
-              <a:rPr lang="de-DE" dirty="0" smtClean="0"/>
-              <a:t> = </a:t>
-            </a:r>
-            <a:r>
-              <a:rPr lang="de-DE" dirty="0" err="1" smtClean="0"/>
-              <a:t>L“Scintilla</a:t>
-            </a:r>
-            <a:r>
-              <a:rPr lang="de-DE" dirty="0" smtClean="0"/>
-              <a:t>“</a:t>
-            </a:r>
-            <a:br>
-              <a:rPr lang="de-DE" dirty="0" smtClean="0"/>
-            </a:br>
-            <a:r>
-              <a:rPr lang="de-DE" dirty="0" err="1" smtClean="0"/>
-              <a:t>lpWindowName</a:t>
-            </a:r>
-            <a:r>
-              <a:rPr lang="de-DE" dirty="0" smtClean="0"/>
-              <a:t> = </a:t>
-            </a:r>
-            <a:r>
-              <a:rPr lang="de-DE" dirty="0" err="1" smtClean="0"/>
-              <a:t>L“Source</a:t>
-            </a:r>
-            <a:r>
-              <a:rPr lang="de-DE" dirty="0" smtClean="0"/>
-              <a:t>“</a:t>
+            <a:endParaRPr lang="en-GB" dirty="0" smtClean="0"/>
+          </a:p>
+          <a:p>
+            <a:pPr marL="0" indent="0">
+              <a:buNone/>
+            </a:pPr>
+            <a:r>
+              <a:rPr lang="en-GB" dirty="0" smtClean="0"/>
+              <a:t>DWORD WINAPI </a:t>
+            </a:r>
+            <a:r>
+              <a:rPr lang="en-GB" dirty="0" err="1" smtClean="0"/>
+              <a:t>FormatMessage</a:t>
+            </a:r>
+            <a:r>
+              <a:rPr lang="en-GB" dirty="0" smtClean="0"/>
+              <a:t>([...])</a:t>
+            </a:r>
+          </a:p>
+          <a:p>
+            <a:pPr marL="0" indent="0">
+              <a:buNone/>
+            </a:pPr>
+            <a:endParaRPr lang="en-GB" dirty="0"/>
+          </a:p>
+          <a:p>
+            <a:pPr marL="0" indent="0">
+              <a:buNone/>
+            </a:pPr>
+            <a:r>
+              <a:rPr lang="en-GB" dirty="0" smtClean="0"/>
+              <a:t> - </a:t>
+            </a:r>
+            <a:r>
+              <a:rPr lang="en-GB" dirty="0" err="1" smtClean="0"/>
+              <a:t>Fehler</a:t>
+            </a:r>
+            <a:r>
+              <a:rPr lang="en-GB" dirty="0" smtClean="0"/>
+              <a:t> </a:t>
+            </a:r>
+            <a:r>
+              <a:rPr lang="en-GB" dirty="0" err="1" smtClean="0"/>
+              <a:t>Kennnummer</a:t>
+            </a:r>
+            <a:r>
+              <a:rPr lang="en-GB" dirty="0" smtClean="0"/>
+              <a:t> =&gt; </a:t>
+            </a:r>
+            <a:r>
+              <a:rPr lang="en-GB" dirty="0" err="1" smtClean="0"/>
+              <a:t>Fehlermeldung</a:t>
+            </a:r>
+            <a:endParaRPr lang="en-GB" dirty="0" smtClean="0"/>
+          </a:p>
+          <a:p>
+            <a:pPr marL="0" indent="0">
+              <a:buNone/>
+            </a:pPr>
+            <a:endParaRPr lang="en-GB" dirty="0"/>
+          </a:p>
+          <a:p>
+            <a:pPr marL="0" indent="0">
+              <a:buNone/>
+            </a:pPr>
+            <a:r>
+              <a:rPr lang="en-GB" dirty="0" smtClean="0"/>
+              <a:t> - </a:t>
+            </a:r>
+            <a:r>
+              <a:rPr lang="de-DE" dirty="0" smtClean="0"/>
+              <a:t>Rückgabe in einem Parameter</a:t>
             </a:r>
             <a:endParaRPr lang="de-DE" dirty="0"/>
           </a:p>
@@ -4707,7 +4770,7 @@
     </p:spTree>
     <p:extLst>
       <p:ext uri="{BB962C8B-B14F-4D97-AF65-F5344CB8AC3E}">
-        <p14:creationId xmlns:p14="http://schemas.microsoft.com/office/powerpoint/2010/main" val="2892151715"/>
+        <p14:creationId xmlns:p14="http://schemas.microsoft.com/office/powerpoint/2010/main" val="2176457987"/>
       </p:ext>
     </p:extLst>
   </p:cSld>
@@ -4783,41 +4846,66 @@
           <a:bodyPr/>
           <a:lstStyle/>
           <a:p>
+            <a:pPr marL="0" indent="0">
+              <a:buNone/>
+            </a:pPr>
             <a:endParaRPr lang="de-DE" dirty="0" smtClean="0"/>
           </a:p>
           <a:p>
             <a:r>
               <a:rPr lang="de-DE" dirty="0" err="1" smtClean="0"/>
-              <a:t>SciLexer.h</a:t>
-            </a:r>
-            <a:r>
-              <a:rPr lang="de-DE" dirty="0" smtClean="0"/>
-              <a:t> muss eingebunden sein</a:t>
-            </a:r>
-          </a:p>
-          <a:p>
-            <a:endParaRPr lang="de-DE" dirty="0"/>
-          </a:p>
-          <a:p>
-            <a:r>
-              <a:rPr lang="de-DE" dirty="0" smtClean="0"/>
-              <a:t>SciLexer.DLL muss mit </a:t>
+              <a:t>Scintilla.h</a:t>
+            </a:r>
+            <a:r>
+              <a:rPr lang="de-DE" dirty="0"/>
+              <a:t/>
+            </a:r>
+            <a:br>
+              <a:rPr lang="de-DE" dirty="0"/>
+            </a:br>
+            <a:r>
+              <a:rPr lang="de-DE" dirty="0" smtClean="0"/>
+              <a:t>	muss </a:t>
             </a:r>
             <a:r>
               <a:rPr lang="de-DE" dirty="0" err="1" smtClean="0"/>
-              <a:t>LoadLibrary</a:t>
-            </a:r>
-            <a:r>
-              <a:rPr lang="de-DE" dirty="0" smtClean="0"/>
-              <a:t> geladen werden</a:t>
-            </a:r>
+              <a:t>includiert</a:t>
+            </a:r>
+            <a:r>
+              <a:rPr lang="de-DE" dirty="0" smtClean="0"/>
+              <a:t> werden</a:t>
+            </a:r>
+          </a:p>
+          <a:p>
+            <a:endParaRPr lang="de-DE" dirty="0"/>
+          </a:p>
+          <a:p>
+            <a:r>
+              <a:rPr lang="de-DE" dirty="0" smtClean="0"/>
+              <a:t>Scintilla.dll</a:t>
+            </a:r>
+            <a:br>
+              <a:rPr lang="de-DE" dirty="0" smtClean="0"/>
+            </a:br>
+            <a:r>
+              <a:rPr lang="de-DE" dirty="0" smtClean="0"/>
+              <a:t>	brauch nicht eingebunden werden</a:t>
+            </a:r>
+            <a:br>
+              <a:rPr lang="de-DE" dirty="0" smtClean="0"/>
+            </a:br>
+            <a:r>
+              <a:rPr lang="de-DE" dirty="0" smtClean="0"/>
+              <a:t>	muss nur in Ordner sein</a:t>
+            </a:r>
+            <a:endParaRPr lang="de-DE" dirty="0"/>
           </a:p>
         </p:txBody>
       </p:sp>
     </p:spTree>
     <p:extLst>
       <p:ext uri="{BB962C8B-B14F-4D97-AF65-F5344CB8AC3E}">
-        <p14:creationId xmlns:p14="http://schemas.microsoft.com/office/powerpoint/2010/main" val="2018442675"/>
+        <p14:creationId xmlns:p14="http://schemas.microsoft.com/office/powerpoint/2010/main" val="2755479760"/>
       </p:ext>
     </p:extLst>
   </p:cSld>
@@ -4898,16 +4986,13 @@
           <a:p>
             <a:r>
               <a:rPr lang="de-DE" dirty="0" smtClean="0"/>
-              <a:t>MMIX </a:t>
+              <a:t>Neuer Editor mit </a:t>
             </a:r>
             <a:r>
               <a:rPr lang="de-DE" dirty="0" err="1" smtClean="0"/>
-              <a:t>Lexer</a:t>
-            </a:r>
-            <a:r>
-              <a:rPr lang="de-DE" dirty="0" smtClean="0"/>
-              <a:t> existiert bereits</a:t>
-            </a:r>
+              <a:t>CreateWindow</a:t>
+            </a:r>
+            <a:endParaRPr lang="de-DE" dirty="0" smtClean="0"/>
           </a:p>
           <a:p>
             <a:endParaRPr lang="de-DE" dirty="0"/>
@@ -4915,25 +5000,19 @@
           <a:p>
             <a:r>
               <a:rPr lang="de-DE" dirty="0" err="1" smtClean="0"/>
-              <a:t>SendMessage</a:t>
-            </a:r>
-            <a:r>
-              <a:rPr lang="de-DE" dirty="0" smtClean="0"/>
-              <a:t> zum Ändern des </a:t>
+              <a:t>lpClassName</a:t>
+            </a:r>
+            <a:r>
+              <a:rPr lang="de-DE" dirty="0" smtClean="0"/>
+              <a:t> = </a:t>
             </a:r>
             <a:r>
               <a:rPr lang="de-DE" dirty="0" err="1" smtClean="0"/>
-              <a:t>Lexers</a:t>
-            </a:r>
-            <a:endParaRPr lang="de-DE" dirty="0" smtClean="0"/>
-          </a:p>
-          <a:p>
-            <a:endParaRPr lang="de-DE" dirty="0"/>
-          </a:p>
-          <a:p>
-            <a:r>
-              <a:rPr lang="de-DE" dirty="0" smtClean="0"/>
-              <a:t>SCI_SETLEXER und SCLEX_MMIXAL</a:t>
+              <a:t>L“Scintilla</a:t>
+            </a:r>
+            <a:r>
+              <a:rPr lang="de-DE" dirty="0" smtClean="0"/>
+              <a:t>“</a:t>
             </a:r>
             <a:endParaRPr lang="de-DE" dirty="0"/>
           </a:p>
@@ -4942,7 +5021,7 @@
     </p:spTree>
     <p:extLst>
       <p:ext uri="{BB962C8B-B14F-4D97-AF65-F5344CB8AC3E}">
-        <p14:creationId xmlns:p14="http://schemas.microsoft.com/office/powerpoint/2010/main" val="2147253744"/>
+        <p14:creationId xmlns:p14="http://schemas.microsoft.com/office/powerpoint/2010/main" val="2892151715"/>
       </p:ext>
     </p:extLst>
   </p:cSld>
@@ -4992,8 +5071,12 @@
           <a:lstStyle/>
           <a:p>
             <a:r>
-              <a:rPr lang="de-DE" dirty="0" smtClean="0"/>
-              <a:t>MMIX Integration</a:t>
+              <a:rPr lang="de-DE" dirty="0" err="1" smtClean="0"/>
+              <a:t>Scintilla</a:t>
+            </a:r>
+            <a:r>
+              <a:rPr lang="de-DE" dirty="0" smtClean="0"/>
+              <a:t> Integration</a:t>
             </a:r>
             <a:endParaRPr lang="de-DE" dirty="0"/>
           </a:p>
@@ -5018,59 +5101,37 @@
           </a:p>
           <a:p>
             <a:r>
-              <a:rPr lang="de-DE" dirty="0" smtClean="0"/>
-              <a:t>MMIX Quellcode in .w Dateien</a:t>
-            </a:r>
-          </a:p>
-          <a:p>
-            <a:endParaRPr lang="de-DE" dirty="0"/>
-          </a:p>
-          <a:p>
-            <a:r>
-              <a:rPr lang="de-DE" dirty="0" smtClean="0"/>
-              <a:t>Change </a:t>
-            </a:r>
-            <a:r>
               <a:rPr lang="de-DE" dirty="0" err="1" smtClean="0"/>
-              <a:t>files</a:t>
-            </a:r>
-            <a:r>
-              <a:rPr lang="de-DE" dirty="0" smtClean="0"/>
-              <a:t> in .</a:t>
+              <a:t>SciLexer.h</a:t>
+            </a:r>
+            <a:r>
+              <a:rPr lang="de-DE" dirty="0" smtClean="0"/>
+              <a:t> muss eingebunden sein</a:t>
+            </a:r>
+          </a:p>
+          <a:p>
+            <a:endParaRPr lang="de-DE" dirty="0"/>
+          </a:p>
+          <a:p>
+            <a:r>
+              <a:rPr lang="de-DE" dirty="0" smtClean="0"/>
+              <a:t>SciLexer.DLL muss mit </a:t>
             </a:r>
             <a:r>
               <a:rPr lang="de-DE" dirty="0" err="1" smtClean="0"/>
-              <a:t>ch</a:t>
-            </a:r>
-            <a:r>
-              <a:rPr lang="de-DE" dirty="0" smtClean="0"/>
-              <a:t> Dateien</a:t>
-            </a:r>
-          </a:p>
-          <a:p>
-            <a:endParaRPr lang="de-DE" dirty="0"/>
-          </a:p>
-          <a:p>
-            <a:r>
-              <a:rPr lang="de-DE" dirty="0" smtClean="0"/>
-              <a:t>Mit </a:t>
-            </a:r>
-            <a:r>
-              <a:rPr lang="de-DE" dirty="0" err="1" smtClean="0"/>
-              <a:t>Ctangle</a:t>
-            </a:r>
-            <a:r>
-              <a:rPr lang="de-DE" dirty="0" smtClean="0"/>
-              <a:t> zu .c Dateien kompilieren</a:t>
-            </a:r>
-            <a:endParaRPr lang="de-DE" dirty="0"/>
+              <a:t>LoadLibrary</a:t>
+            </a:r>
+            <a:r>
+              <a:rPr lang="de-DE" dirty="0" smtClean="0"/>
+              <a:t> geladen werden</a:t>
+            </a:r>
           </a:p>
         </p:txBody>
       </p:sp>
     </p:spTree>
     <p:extLst>
       <p:ext uri="{BB962C8B-B14F-4D97-AF65-F5344CB8AC3E}">
-        <p14:creationId xmlns:p14="http://schemas.microsoft.com/office/powerpoint/2010/main" val="1669658461"/>
+        <p14:creationId xmlns:p14="http://schemas.microsoft.com/office/powerpoint/2010/main" val="2018442675"/>
       </p:ext>
     </p:extLst>
   </p:cSld>
@@ -5120,8 +5181,12 @@
           <a:lstStyle/>
           <a:p>
             <a:r>
-              <a:rPr lang="de-DE" dirty="0" smtClean="0"/>
-              <a:t>MMIX Integration</a:t>
+              <a:rPr lang="de-DE" dirty="0" err="1" smtClean="0"/>
+              <a:t>Scintilla</a:t>
+            </a:r>
+            <a:r>
+              <a:rPr lang="de-DE" dirty="0" smtClean="0"/>
+              <a:t> Integration</a:t>
             </a:r>
             <a:endParaRPr lang="de-DE" dirty="0"/>
           </a:p>
@@ -5145,52 +5210,44 @@
             <a:endParaRPr lang="de-DE" dirty="0" smtClean="0"/>
           </a:p>
           <a:p>
-            <a:pPr marL="0" indent="0">
-              <a:buNone/>
-            </a:pPr>
-            <a:r>
-              <a:rPr lang="de-DE" dirty="0" smtClean="0"/>
-              <a:t>@x</a:t>
-            </a:r>
-          </a:p>
-          <a:p>
-            <a:pPr marL="0" indent="0">
-              <a:buNone/>
-            </a:pPr>
-            <a:r>
-              <a:rPr lang="de-DE" dirty="0" smtClean="0"/>
-              <a:t>original Text</a:t>
-            </a:r>
-          </a:p>
-          <a:p>
-            <a:pPr marL="0" indent="0">
-              <a:buNone/>
-            </a:pPr>
-            <a:r>
-              <a:rPr lang="de-DE" dirty="0" smtClean="0"/>
-              <a:t>@y</a:t>
-            </a:r>
-          </a:p>
-          <a:p>
-            <a:pPr marL="0" indent="0">
-              <a:buNone/>
-            </a:pPr>
-            <a:r>
-              <a:rPr lang="de-DE" dirty="0"/>
-              <a:t>n</a:t>
-            </a:r>
-            <a:r>
-              <a:rPr lang="de-DE" dirty="0" smtClean="0"/>
-              <a:t>euer Text</a:t>
-            </a:r>
-          </a:p>
-          <a:p>
-            <a:pPr marL="0" indent="0">
-              <a:buNone/>
-            </a:pPr>
-            <a:r>
-              <a:rPr lang="de-DE" dirty="0" smtClean="0"/>
-              <a:t>@z</a:t>
+            <a:r>
+              <a:rPr lang="de-DE" dirty="0" smtClean="0"/>
+              <a:t>MMIX </a:t>
+            </a:r>
+            <a:r>
+              <a:rPr lang="de-DE" dirty="0" err="1" smtClean="0"/>
+              <a:t>Lexer</a:t>
+            </a:r>
+            <a:r>
+              <a:rPr lang="de-DE" dirty="0" smtClean="0"/>
+              <a:t> existiert bereits</a:t>
+            </a:r>
+          </a:p>
+          <a:p>
+            <a:endParaRPr lang="de-DE" dirty="0"/>
+          </a:p>
+          <a:p>
+            <a:r>
+              <a:rPr lang="de-DE" dirty="0" err="1" smtClean="0"/>
+              <a:t>SendMessage</a:t>
+            </a:r>
+            <a:r>
+              <a:rPr lang="de-DE" dirty="0" smtClean="0"/>
+              <a:t> zum Ändern des </a:t>
+            </a:r>
+            <a:r>
+              <a:rPr lang="de-DE" dirty="0" err="1" smtClean="0"/>
+              <a:t>Lexers</a:t>
+            </a:r>
+            <a:endParaRPr lang="de-DE" dirty="0" smtClean="0"/>
+          </a:p>
+          <a:p>
+            <a:endParaRPr lang="de-DE" dirty="0"/>
+          </a:p>
+          <a:p>
+            <a:r>
+              <a:rPr lang="de-DE" dirty="0" smtClean="0"/>
+              <a:t>SCI_SETLEXER und SCLEX_MMIXAL</a:t>
             </a:r>
             <a:endParaRPr lang="de-DE" dirty="0"/>
           </a:p>
@@ -5199,7 +5256,7 @@
     </p:spTree>
     <p:extLst>
       <p:ext uri="{BB962C8B-B14F-4D97-AF65-F5344CB8AC3E}">
-        <p14:creationId xmlns:p14="http://schemas.microsoft.com/office/powerpoint/2010/main" val="3461029720"/>
+        <p14:creationId xmlns:p14="http://schemas.microsoft.com/office/powerpoint/2010/main" val="2147253744"/>
       </p:ext>
     </p:extLst>
   </p:cSld>
@@ -5276,13 +5333,46 @@
           <a:p>
             <a:r>
               <a:rPr lang="de-DE" dirty="0" smtClean="0"/>
-              <a:t>Änderungen müssen in richtiger Reihenfolge sein</a:t>
-            </a:r>
-          </a:p>
-          <a:p>
-            <a:endParaRPr lang="de-DE" dirty="0"/>
-          </a:p>
-          <a:p>
+              <a:t>MMIX Quellcode in .w Dateien</a:t>
+            </a:r>
+          </a:p>
+          <a:p>
+            <a:endParaRPr lang="de-DE" dirty="0"/>
+          </a:p>
+          <a:p>
+            <a:r>
+              <a:rPr lang="de-DE" dirty="0" smtClean="0"/>
+              <a:t>Änderungen in </a:t>
+            </a:r>
+            <a:r>
+              <a:rPr lang="de-DE" dirty="0" smtClean="0"/>
+              <a:t>.</a:t>
+            </a:r>
+            <a:r>
+              <a:rPr lang="de-DE" dirty="0" err="1" smtClean="0"/>
+              <a:t>ch</a:t>
+            </a:r>
+            <a:r>
+              <a:rPr lang="de-DE" dirty="0" smtClean="0"/>
+              <a:t> Dateien</a:t>
+            </a:r>
+          </a:p>
+          <a:p>
+            <a:endParaRPr lang="de-DE" dirty="0"/>
+          </a:p>
+          <a:p>
+            <a:r>
+              <a:rPr lang="de-DE" dirty="0" smtClean="0"/>
+              <a:t>Mit </a:t>
+            </a:r>
+            <a:r>
+              <a:rPr lang="de-DE" dirty="0" err="1" smtClean="0"/>
+              <a:t>Ctangle</a:t>
+            </a:r>
+            <a:r>
+              <a:rPr lang="de-DE" dirty="0" smtClean="0"/>
+              <a:t> zu .c Dateien kompilieren</a:t>
+            </a:r>
             <a:endParaRPr lang="de-DE" dirty="0"/>
           </a:p>
         </p:txBody>
@@ -5290,7 +5380,7 @@
     </p:spTree>
     <p:extLst>
       <p:ext uri="{BB962C8B-B14F-4D97-AF65-F5344CB8AC3E}">
-        <p14:creationId xmlns:p14="http://schemas.microsoft.com/office/powerpoint/2010/main" val="786868818"/>
+        <p14:creationId xmlns:p14="http://schemas.microsoft.com/office/powerpoint/2010/main" val="1669658461"/>
       </p:ext>
     </p:extLst>
   </p:cSld>
@@ -5365,22 +5455,57 @@
             <a:endParaRPr lang="de-DE" dirty="0" smtClean="0"/>
           </a:p>
           <a:p>
-            <a:r>
-              <a:rPr lang="de-DE" dirty="0" smtClean="0"/>
-              <a:t>Exit und Return müssen geändert werden</a:t>
-            </a:r>
-          </a:p>
-          <a:p>
-            <a:endParaRPr lang="de-DE" dirty="0"/>
-          </a:p>
-          <a:p>
-            <a:r>
-              <a:rPr lang="de-DE" dirty="0" err="1" smtClean="0"/>
-              <a:t>Sourcecode</a:t>
-            </a:r>
-            <a:r>
-              <a:rPr lang="de-DE" dirty="0" smtClean="0"/>
-              <a:t> muss direkt übergeben werden können</a:t>
+            <a:pPr marL="0" indent="0">
+              <a:buNone/>
+            </a:pPr>
+            <a:r>
+              <a:rPr lang="de-DE" dirty="0" smtClean="0"/>
+              <a:t>@x</a:t>
+            </a:r>
+          </a:p>
+          <a:p>
+            <a:pPr marL="0" indent="0">
+              <a:buNone/>
+            </a:pPr>
+            <a:r>
+              <a:rPr lang="de-DE" dirty="0"/>
+              <a:t>a</a:t>
+            </a:r>
+            <a:r>
+              <a:rPr lang="de-DE" dirty="0" smtClean="0"/>
+              <a:t>lter Text</a:t>
+            </a:r>
+            <a:endParaRPr lang="de-DE" dirty="0" smtClean="0"/>
+          </a:p>
+          <a:p>
+            <a:pPr marL="0" indent="0">
+              <a:buNone/>
+            </a:pPr>
+            <a:r>
+              <a:rPr lang="de-DE" dirty="0" smtClean="0"/>
+              <a:t>@y</a:t>
+            </a:r>
+          </a:p>
+          <a:p>
+            <a:pPr marL="0" indent="0">
+              <a:buNone/>
+            </a:pPr>
+            <a:r>
+              <a:rPr lang="de-DE" dirty="0"/>
+              <a:t>n</a:t>
+            </a:r>
+            <a:r>
+              <a:rPr lang="de-DE" dirty="0" smtClean="0"/>
+              <a:t>euer Text</a:t>
+            </a:r>
+          </a:p>
+          <a:p>
+            <a:pPr marL="0" indent="0">
+              <a:buNone/>
+            </a:pPr>
+            <a:r>
+              <a:rPr lang="de-DE" dirty="0" smtClean="0"/>
+              <a:t>@z</a:t>
             </a:r>
             <a:endParaRPr lang="de-DE" dirty="0"/>
           </a:p>
@@ -5389,7 +5514,7 @@
     </p:spTree>
     <p:extLst>
       <p:ext uri="{BB962C8B-B14F-4D97-AF65-F5344CB8AC3E}">
-        <p14:creationId xmlns:p14="http://schemas.microsoft.com/office/powerpoint/2010/main" val="890052578"/>
+        <p14:creationId xmlns:p14="http://schemas.microsoft.com/office/powerpoint/2010/main" val="3461029720"/>
       </p:ext>
     </p:extLst>
   </p:cSld>
@@ -5466,33 +5591,21 @@
           <a:p>
             <a:r>
               <a:rPr lang="de-DE" dirty="0" smtClean="0"/>
-              <a:t>Einstiegsfunktionen müssen Prototyp in </a:t>
-            </a:r>
-            <a:r>
-              <a:rPr lang="de-DE" dirty="0" err="1" smtClean="0"/>
-              <a:t>cpp</a:t>
-            </a:r>
-            <a:r>
-              <a:rPr lang="de-DE" dirty="0" smtClean="0"/>
-              <a:t> haben</a:t>
-            </a:r>
-            <a:endParaRPr lang="de-DE" dirty="0"/>
-          </a:p>
-          <a:p>
-            <a:endParaRPr lang="de-DE" dirty="0" smtClean="0"/>
-          </a:p>
-          <a:p>
-            <a:r>
-              <a:rPr lang="de-DE" dirty="0" smtClean="0"/>
-              <a:t>Einbindung als EXTERN_C Funktion</a:t>
-            </a:r>
+              <a:t>Änderungen müssen in richtiger Reihenfolge sein</a:t>
+            </a:r>
+          </a:p>
+          <a:p>
+            <a:endParaRPr lang="de-DE" dirty="0"/>
+          </a:p>
+          <a:p>
+            <a:endParaRPr lang="de-DE" dirty="0"/>
           </a:p>
         </p:txBody>
       </p:sp>
     </p:spTree>
     <p:extLst>
       <p:ext uri="{BB962C8B-B14F-4D97-AF65-F5344CB8AC3E}">
-        <p14:creationId xmlns:p14="http://schemas.microsoft.com/office/powerpoint/2010/main" val="2369464624"/>
+        <p14:creationId xmlns:p14="http://schemas.microsoft.com/office/powerpoint/2010/main" val="786868818"/>
       </p:ext>
     </p:extLst>
   </p:cSld>
@@ -5536,30 +5649,165 @@
             <p:ph type="title"/>
           </p:nvPr>
         </p:nvSpPr>
-        <p:spPr>
-          <a:xfrm>
-            <a:off x="467544" y="242325"/>
-            <a:ext cx="8229600" cy="6355027"/>
-          </a:xfrm>
-        </p:spPr>
-        <p:txBody>
-          <a:bodyPr>
-            <a:normAutofit/>
-          </a:bodyPr>
-          <a:lstStyle/>
-          <a:p>
-            <a:r>
-              <a:rPr lang="de-DE" sz="5400" dirty="0" smtClean="0"/>
-              <a:t>Fragen!</a:t>
-            </a:r>
-            <a:endParaRPr lang="de-DE" sz="5400" dirty="0"/>
+        <p:spPr/>
+        <p:txBody>
+          <a:bodyPr/>
+          <a:lstStyle/>
+          <a:p>
+            <a:r>
+              <a:rPr lang="de-DE" dirty="0" smtClean="0"/>
+              <a:t>MMIX Integration</a:t>
+            </a:r>
+            <a:endParaRPr lang="de-DE" dirty="0"/>
+          </a:p>
+        </p:txBody>
+      </p:sp>
+      <p:sp>
+        <p:nvSpPr>
+          <p:cNvPr id="3" name="Inhaltsplatzhalter 2"/>
+          <p:cNvSpPr>
+            <a:spLocks noGrp="1"/>
+          </p:cNvSpPr>
+          <p:nvPr>
+            <p:ph idx="1"/>
+          </p:nvPr>
+        </p:nvSpPr>
+        <p:spPr/>
+        <p:txBody>
+          <a:bodyPr/>
+          <a:lstStyle/>
+          <a:p>
+            <a:endParaRPr lang="de-DE" dirty="0" smtClean="0"/>
+          </a:p>
+          <a:p>
+            <a:r>
+              <a:rPr lang="de-DE" dirty="0" smtClean="0"/>
+              <a:t>Exit und Return müssen geändert werden</a:t>
+            </a:r>
+          </a:p>
+          <a:p>
+            <a:endParaRPr lang="de-DE" dirty="0"/>
+          </a:p>
+          <a:p>
+            <a:r>
+              <a:rPr lang="de-DE" dirty="0" err="1" smtClean="0"/>
+              <a:t>Sourcecode</a:t>
+            </a:r>
+            <a:r>
+              <a:rPr lang="de-DE" dirty="0" smtClean="0"/>
+              <a:t> muss direkt übergeben werden können</a:t>
+            </a:r>
+            <a:endParaRPr lang="de-DE" dirty="0"/>
           </a:p>
         </p:txBody>
       </p:sp>
     </p:spTree>
     <p:extLst>
       <p:ext uri="{BB962C8B-B14F-4D97-AF65-F5344CB8AC3E}">
-        <p14:creationId xmlns:p14="http://schemas.microsoft.com/office/powerpoint/2010/main" val="1033685459"/>
+        <p14:creationId xmlns:p14="http://schemas.microsoft.com/office/powerpoint/2010/main" val="890052578"/>
+      </p:ext>
+    </p:extLst>
+  </p:cSld>
+  <p:clrMapOvr>
+    <a:masterClrMapping/>
+  </p:clrMapOvr>
+  <p:timing>
+    <p:tnLst>
+      <p:par>
+        <p:cTn id="1" dur="indefinite" restart="never" nodeType="tmRoot"/>
+      </p:par>
+    </p:tnLst>
+  </p:timing>
+</p:sld>
+</file>
+
+<file path=ppt/slides/slide29.xml><?xml version="1.0" encoding="utf-8"?>
+<p:sld xmlns:a="http://schemas.openxmlformats.org/drawingml/2006/main" xmlns:r="http://schemas.openxmlformats.org/officeDocument/2006/relationships" xmlns:p="http://schemas.openxmlformats.org/presentationml/2006/main">
+  <p:cSld>
+    <p:spTree>
+      <p:nvGrpSpPr>
+        <p:cNvPr id="1" name=""/>
+        <p:cNvGrpSpPr/>
+        <p:nvPr/>
+      </p:nvGrpSpPr>
+      <p:grpSpPr>
+        <a:xfrm>
+          <a:off x="0" y="0"/>
+          <a:ext cx="0" cy="0"/>
+          <a:chOff x="0" y="0"/>
+          <a:chExt cx="0" cy="0"/>
+        </a:xfrm>
+      </p:grpSpPr>
+      <p:sp>
+        <p:nvSpPr>
+          <p:cNvPr id="2" name="Titel 1"/>
+          <p:cNvSpPr>
+            <a:spLocks noGrp="1"/>
+          </p:cNvSpPr>
+          <p:nvPr>
+            <p:ph type="title"/>
+          </p:nvPr>
+        </p:nvSpPr>
+        <p:spPr/>
+        <p:txBody>
+          <a:bodyPr/>
+          <a:lstStyle/>
+          <a:p>
+            <a:r>
+              <a:rPr lang="de-DE" dirty="0" smtClean="0"/>
+              <a:t>MMIX Integration</a:t>
+            </a:r>
+            <a:endParaRPr lang="de-DE" dirty="0"/>
+          </a:p>
+        </p:txBody>
+      </p:sp>
+      <p:sp>
+        <p:nvSpPr>
+          <p:cNvPr id="3" name="Inhaltsplatzhalter 2"/>
+          <p:cNvSpPr>
+            <a:spLocks noGrp="1"/>
+          </p:cNvSpPr>
+          <p:nvPr>
+            <p:ph idx="1"/>
+          </p:nvPr>
+        </p:nvSpPr>
+        <p:spPr/>
+        <p:txBody>
+          <a:bodyPr/>
+          <a:lstStyle/>
+          <a:p>
+            <a:endParaRPr lang="de-DE" dirty="0" smtClean="0"/>
+          </a:p>
+          <a:p>
+            <a:r>
+              <a:rPr lang="de-DE" dirty="0" smtClean="0"/>
+              <a:t>Einstiegsfunktionen müssen Prototyp in </a:t>
+            </a:r>
+            <a:r>
+              <a:rPr lang="de-DE" dirty="0" err="1" smtClean="0"/>
+              <a:t>cpp</a:t>
+            </a:r>
+            <a:r>
+              <a:rPr lang="de-DE" dirty="0" smtClean="0"/>
+              <a:t> haben</a:t>
+            </a:r>
+            <a:endParaRPr lang="de-DE" dirty="0"/>
+          </a:p>
+          <a:p>
+            <a:endParaRPr lang="de-DE" dirty="0" smtClean="0"/>
+          </a:p>
+          <a:p>
+            <a:r>
+              <a:rPr lang="de-DE" dirty="0" smtClean="0"/>
+              <a:t>Einbindung als EXTERN_C Funktion</a:t>
+            </a:r>
+          </a:p>
+        </p:txBody>
+      </p:sp>
+    </p:spTree>
+    <p:extLst>
+      <p:ext uri="{BB962C8B-B14F-4D97-AF65-F5344CB8AC3E}">
+        <p14:creationId xmlns:p14="http://schemas.microsoft.com/office/powerpoint/2010/main" val="2369464624"/>
       </p:ext>
     </p:extLst>
   </p:cSld>
@@ -5659,6 +5907,73 @@
     <p:extLst>
       <p:ext uri="{BB962C8B-B14F-4D97-AF65-F5344CB8AC3E}">
         <p14:creationId xmlns:p14="http://schemas.microsoft.com/office/powerpoint/2010/main" val="1293772593"/>
+      </p:ext>
+    </p:extLst>
+  </p:cSld>
+  <p:clrMapOvr>
+    <a:masterClrMapping/>
+  </p:clrMapOvr>
+  <p:timing>
+    <p:tnLst>
+      <p:par>
+        <p:cTn id="1" dur="indefinite" restart="never" nodeType="tmRoot"/>
+      </p:par>
+    </p:tnLst>
+  </p:timing>
+</p:sld>
+</file>
+
+<file path=ppt/slides/slide30.xml><?xml version="1.0" encoding="utf-8"?>
+<p:sld xmlns:a="http://schemas.openxmlformats.org/drawingml/2006/main" xmlns:r="http://schemas.openxmlformats.org/officeDocument/2006/relationships" xmlns:p="http://schemas.openxmlformats.org/presentationml/2006/main">
+  <p:cSld>
+    <p:spTree>
+      <p:nvGrpSpPr>
+        <p:cNvPr id="1" name=""/>
+        <p:cNvGrpSpPr/>
+        <p:nvPr/>
+      </p:nvGrpSpPr>
+      <p:grpSpPr>
+        <a:xfrm>
+          <a:off x="0" y="0"/>
+          <a:ext cx="0" cy="0"/>
+          <a:chOff x="0" y="0"/>
+          <a:chExt cx="0" cy="0"/>
+        </a:xfrm>
+      </p:grpSpPr>
+      <p:sp>
+        <p:nvSpPr>
+          <p:cNvPr id="2" name="Titel 1"/>
+          <p:cNvSpPr>
+            <a:spLocks noGrp="1"/>
+          </p:cNvSpPr>
+          <p:nvPr>
+            <p:ph type="title"/>
+          </p:nvPr>
+        </p:nvSpPr>
+        <p:spPr>
+          <a:xfrm>
+            <a:off x="467544" y="242325"/>
+            <a:ext cx="8229600" cy="6355027"/>
+          </a:xfrm>
+        </p:spPr>
+        <p:txBody>
+          <a:bodyPr>
+            <a:normAutofit/>
+          </a:bodyPr>
+          <a:lstStyle/>
+          <a:p>
+            <a:r>
+              <a:rPr lang="de-DE" sz="5400" dirty="0" smtClean="0"/>
+              <a:t>Fragen!</a:t>
+            </a:r>
+            <a:endParaRPr lang="de-DE" sz="5400" dirty="0"/>
+          </a:p>
+        </p:txBody>
+      </p:sp>
+    </p:spTree>
+    <p:extLst>
+      <p:ext uri="{BB962C8B-B14F-4D97-AF65-F5344CB8AC3E}">
+        <p14:creationId xmlns:p14="http://schemas.microsoft.com/office/powerpoint/2010/main" val="1033685459"/>
       </p:ext>
     </p:extLst>
   </p:cSld>
@@ -6195,13 +6510,13 @@
   <p:clrMapOvr>
     <a:masterClrMapping/>
   </p:clrMapOvr>
-  <mc:AlternateContent xmlns:mc="http://schemas.openxmlformats.org/markup-compatibility/2006">
-    <mc:Choice xmlns:p14="http://schemas.microsoft.com/office/powerpoint/2010/main" Requires="p14">
+  <mc:AlternateContent xmlns:mc="http://schemas.openxmlformats.org/markup-compatibility/2006" xmlns:p14="http://schemas.microsoft.com/office/powerpoint/2010/main">
+    <mc:Choice Requires="p14">
       <p:transition p14:dur="100">
         <p:cut/>
       </p:transition>
     </mc:Choice>
-    <mc:Fallback>
+    <mc:Fallback xmlns="">
       <p:transition>
         <p:cut/>
       </p:transition>

</xml_diff>